<commit_message>
20230708 Adra Sakka vs Mustangs
</commit_message>
<xml_diff>
--- a/Manage/Rocket singh.pptx
+++ b/Manage/Rocket singh.pptx
@@ -262,7 +262,7 @@
           </a:ln>
           <a:extLst>
             <a:ext uri="{C572A759-6A51-4108-AA02-DFA0A04FC94B}">
-              <ma14:wrappingTextBoxFlag xmlns="" xmlns:m="http://schemas.openxmlformats.org/officeDocument/2006/math" xmlns:a14="http://schemas.microsoft.com/office/drawing/2010/main" xmlns:ma14="http://schemas.microsoft.com/office/mac/drawingml/2011/main" val="1"/>
+              <ma14:wrappingTextBoxFlag xmlns:ma14="http://schemas.microsoft.com/office/mac/drawingml/2011/main" xmlns:a14="http://schemas.microsoft.com/office/drawing/2010/main" xmlns:m="http://schemas.openxmlformats.org/officeDocument/2006/math" xmlns="" val="1"/>
             </a:ext>
           </a:extLst>
         </p:spPr>
@@ -320,7 +320,7 @@
           </a:ln>
           <a:extLst>
             <a:ext uri="{C572A759-6A51-4108-AA02-DFA0A04FC94B}">
-              <ma14:wrappingTextBoxFlag xmlns="" xmlns:m="http://schemas.openxmlformats.org/officeDocument/2006/math" xmlns:a14="http://schemas.microsoft.com/office/drawing/2010/main" xmlns:ma14="http://schemas.microsoft.com/office/mac/drawingml/2011/main" val="1"/>
+              <ma14:wrappingTextBoxFlag xmlns:ma14="http://schemas.microsoft.com/office/mac/drawingml/2011/main" xmlns:a14="http://schemas.microsoft.com/office/drawing/2010/main" xmlns:m="http://schemas.openxmlformats.org/officeDocument/2006/math" xmlns="" val="1"/>
             </a:ext>
           </a:extLst>
         </p:spPr>
@@ -357,7 +357,7 @@
           </a:ln>
           <a:extLst>
             <a:ext uri="{C572A759-6A51-4108-AA02-DFA0A04FC94B}">
-              <ma14:wrappingTextBoxFlag xmlns="" xmlns:m="http://schemas.openxmlformats.org/officeDocument/2006/math" xmlns:a14="http://schemas.microsoft.com/office/drawing/2010/main" xmlns:ma14="http://schemas.microsoft.com/office/mac/drawingml/2011/main" val="1"/>
+              <ma14:wrappingTextBoxFlag xmlns:ma14="http://schemas.microsoft.com/office/mac/drawingml/2011/main" xmlns:a14="http://schemas.microsoft.com/office/drawing/2010/main" xmlns:m="http://schemas.openxmlformats.org/officeDocument/2006/math" xmlns="" val="1"/>
             </a:ext>
           </a:extLst>
         </p:spPr>
@@ -1824,7 +1824,7 @@
           <a:lstStyle/>
           <a:p>
             <a:pPr algn="ctr"/>
-            <a:endParaRPr/>
+            <a:endParaRPr dirty="0"/>
           </a:p>
         </p:txBody>
       </p:sp>
@@ -2350,7 +2350,7 @@
         </p:nvSpPr>
         <p:spPr>
           <a:xfrm flipH="1">
-            <a:off x="8561658" y="2248092"/>
+            <a:off x="8518274" y="2238404"/>
             <a:ext cx="2092719" cy="747180"/>
           </a:xfrm>
           <a:prstGeom prst="roundRect">
@@ -2615,7 +2615,7 @@
         <p:spPr>
           <a:xfrm>
             <a:off x="1701744" y="1441827"/>
-            <a:ext cx="1127216" cy="400105"/>
+            <a:ext cx="1127216" cy="461661"/>
           </a:xfrm>
           <a:prstGeom prst="rect">
             <a:avLst/>
@@ -2625,7 +2625,7 @@
           </a:ln>
           <a:extLst>
             <a:ext uri="{C572A759-6A51-4108-AA02-DFA0A04FC94B}">
-              <ma14:wrappingTextBoxFlag xmlns="" xmlns:m="http://schemas.openxmlformats.org/officeDocument/2006/math" xmlns:a14="http://schemas.microsoft.com/office/drawing/2010/main" xmlns:ma14="http://schemas.microsoft.com/office/mac/drawingml/2011/main" val="1"/>
+              <ma14:wrappingTextBoxFlag xmlns:ma14="http://schemas.microsoft.com/office/mac/drawingml/2011/main" xmlns:a14="http://schemas.microsoft.com/office/drawing/2010/main" xmlns:m="http://schemas.openxmlformats.org/officeDocument/2006/math" xmlns="" val="1"/>
             </a:ext>
           </a:extLst>
         </p:spPr>
@@ -2648,8 +2648,8 @@
           </a:lstStyle>
           <a:p>
             <a:r>
-              <a:rPr lang="en-US" dirty="0"/>
-              <a:t>43</a:t>
+              <a:rPr lang="en-US" sz="2400" b="1" dirty="0"/>
+              <a:t>-</a:t>
             </a:r>
             <a:r>
               <a:rPr dirty="0"/>
@@ -2677,7 +2677,7 @@
           </a:ln>
           <a:extLst>
             <a:ext uri="{C572A759-6A51-4108-AA02-DFA0A04FC94B}">
-              <ma14:wrappingTextBoxFlag xmlns="" xmlns:m="http://schemas.openxmlformats.org/officeDocument/2006/math" xmlns:a14="http://schemas.microsoft.com/office/drawing/2010/main" xmlns:ma14="http://schemas.microsoft.com/office/mac/drawingml/2011/main" val="1"/>
+              <ma14:wrappingTextBoxFlag xmlns:ma14="http://schemas.microsoft.com/office/mac/drawingml/2011/main" xmlns:a14="http://schemas.microsoft.com/office/drawing/2010/main" xmlns:m="http://schemas.openxmlformats.org/officeDocument/2006/math" xmlns="" val="1"/>
             </a:ext>
           </a:extLst>
         </p:spPr>
@@ -2719,7 +2719,7 @@
         <p:spPr>
           <a:xfrm>
             <a:off x="1701744" y="2524473"/>
-            <a:ext cx="1127216" cy="400105"/>
+            <a:ext cx="1127216" cy="461661"/>
           </a:xfrm>
           <a:prstGeom prst="rect">
             <a:avLst/>
@@ -2729,7 +2729,7 @@
           </a:ln>
           <a:extLst>
             <a:ext uri="{C572A759-6A51-4108-AA02-DFA0A04FC94B}">
-              <ma14:wrappingTextBoxFlag xmlns="" xmlns:m="http://schemas.openxmlformats.org/officeDocument/2006/math" xmlns:a14="http://schemas.microsoft.com/office/drawing/2010/main" xmlns:ma14="http://schemas.microsoft.com/office/mac/drawingml/2011/main" val="1"/>
+              <ma14:wrappingTextBoxFlag xmlns:ma14="http://schemas.microsoft.com/office/mac/drawingml/2011/main" xmlns:a14="http://schemas.microsoft.com/office/drawing/2010/main" xmlns:m="http://schemas.openxmlformats.org/officeDocument/2006/math" xmlns="" val="1"/>
             </a:ext>
           </a:extLst>
         </p:spPr>
@@ -2752,8 +2752,8 @@
           </a:lstStyle>
           <a:p>
             <a:r>
-              <a:rPr lang="en-US" dirty="0"/>
-              <a:t>26</a:t>
+              <a:rPr lang="en-US" sz="2400" b="1" dirty="0"/>
+              <a:t>-</a:t>
             </a:r>
             <a:r>
               <a:rPr dirty="0"/>
@@ -2781,7 +2781,7 @@
           </a:ln>
           <a:extLst>
             <a:ext uri="{C572A759-6A51-4108-AA02-DFA0A04FC94B}">
-              <ma14:wrappingTextBoxFlag xmlns="" xmlns:m="http://schemas.openxmlformats.org/officeDocument/2006/math" xmlns:a14="http://schemas.microsoft.com/office/drawing/2010/main" xmlns:ma14="http://schemas.microsoft.com/office/mac/drawingml/2011/main" val="1"/>
+              <ma14:wrappingTextBoxFlag xmlns:ma14="http://schemas.microsoft.com/office/mac/drawingml/2011/main" xmlns:a14="http://schemas.microsoft.com/office/drawing/2010/main" xmlns:m="http://schemas.openxmlformats.org/officeDocument/2006/math" xmlns="" val="1"/>
             </a:ext>
           </a:extLst>
         </p:spPr>
@@ -2823,7 +2823,7 @@
         <p:spPr>
           <a:xfrm>
             <a:off x="1739355" y="3648840"/>
-            <a:ext cx="1127214" cy="400105"/>
+            <a:ext cx="1127214" cy="461661"/>
           </a:xfrm>
           <a:prstGeom prst="rect">
             <a:avLst/>
@@ -2833,7 +2833,7 @@
           </a:ln>
           <a:extLst>
             <a:ext uri="{C572A759-6A51-4108-AA02-DFA0A04FC94B}">
-              <ma14:wrappingTextBoxFlag xmlns="" xmlns:m="http://schemas.openxmlformats.org/officeDocument/2006/math" xmlns:a14="http://schemas.microsoft.com/office/drawing/2010/main" xmlns:ma14="http://schemas.microsoft.com/office/mac/drawingml/2011/main" val="1"/>
+              <ma14:wrappingTextBoxFlag xmlns:ma14="http://schemas.microsoft.com/office/mac/drawingml/2011/main" xmlns:a14="http://schemas.microsoft.com/office/drawing/2010/main" xmlns:m="http://schemas.openxmlformats.org/officeDocument/2006/math" xmlns="" val="1"/>
             </a:ext>
           </a:extLst>
         </p:spPr>
@@ -2856,8 +2856,8 @@
           </a:lstStyle>
           <a:p>
             <a:r>
-              <a:rPr lang="en-US" dirty="0"/>
-              <a:t>0</a:t>
+              <a:rPr lang="en-US" sz="2400" b="1" dirty="0"/>
+              <a:t>-</a:t>
             </a:r>
             <a:r>
               <a:rPr dirty="0"/>
@@ -2885,7 +2885,7 @@
           </a:ln>
           <a:extLst>
             <a:ext uri="{C572A759-6A51-4108-AA02-DFA0A04FC94B}">
-              <ma14:wrappingTextBoxFlag xmlns="" xmlns:m="http://schemas.openxmlformats.org/officeDocument/2006/math" xmlns:a14="http://schemas.microsoft.com/office/drawing/2010/main" xmlns:ma14="http://schemas.microsoft.com/office/mac/drawingml/2011/main" val="1"/>
+              <ma14:wrappingTextBoxFlag xmlns:ma14="http://schemas.microsoft.com/office/mac/drawingml/2011/main" xmlns:a14="http://schemas.microsoft.com/office/drawing/2010/main" xmlns:m="http://schemas.openxmlformats.org/officeDocument/2006/math" xmlns="" val="1"/>
             </a:ext>
           </a:extLst>
         </p:spPr>
@@ -2927,7 +2927,7 @@
         <p:spPr>
           <a:xfrm>
             <a:off x="1739355" y="4731484"/>
-            <a:ext cx="1127214" cy="400105"/>
+            <a:ext cx="1127214" cy="461661"/>
           </a:xfrm>
           <a:prstGeom prst="rect">
             <a:avLst/>
@@ -2937,7 +2937,7 @@
           </a:ln>
           <a:extLst>
             <a:ext uri="{C572A759-6A51-4108-AA02-DFA0A04FC94B}">
-              <ma14:wrappingTextBoxFlag xmlns="" xmlns:m="http://schemas.openxmlformats.org/officeDocument/2006/math" xmlns:a14="http://schemas.microsoft.com/office/drawing/2010/main" xmlns:ma14="http://schemas.microsoft.com/office/mac/drawingml/2011/main" val="1"/>
+              <ma14:wrappingTextBoxFlag xmlns:ma14="http://schemas.microsoft.com/office/mac/drawingml/2011/main" xmlns:a14="http://schemas.microsoft.com/office/drawing/2010/main" xmlns:m="http://schemas.openxmlformats.org/officeDocument/2006/math" xmlns="" val="1"/>
             </a:ext>
           </a:extLst>
         </p:spPr>
@@ -2960,8 +2960,8 @@
           </a:lstStyle>
           <a:p>
             <a:r>
-              <a:rPr lang="en-US" dirty="0"/>
-              <a:t>5</a:t>
+              <a:rPr lang="en-US" sz="2400" b="1" dirty="0"/>
+              <a:t>-</a:t>
             </a:r>
             <a:r>
               <a:rPr dirty="0"/>
@@ -2989,7 +2989,7 @@
           </a:ln>
           <a:extLst>
             <a:ext uri="{C572A759-6A51-4108-AA02-DFA0A04FC94B}">
-              <ma14:wrappingTextBoxFlag xmlns="" xmlns:m="http://schemas.openxmlformats.org/officeDocument/2006/math" xmlns:a14="http://schemas.microsoft.com/office/drawing/2010/main" xmlns:ma14="http://schemas.microsoft.com/office/mac/drawingml/2011/main" val="1"/>
+              <ma14:wrappingTextBoxFlag xmlns:ma14="http://schemas.microsoft.com/office/mac/drawingml/2011/main" xmlns:a14="http://schemas.microsoft.com/office/drawing/2010/main" xmlns:m="http://schemas.openxmlformats.org/officeDocument/2006/math" xmlns="" val="1"/>
             </a:ext>
           </a:extLst>
         </p:spPr>
@@ -3031,7 +3031,7 @@
         <p:spPr>
           <a:xfrm>
             <a:off x="9345600" y="1426757"/>
-            <a:ext cx="1127215" cy="400105"/>
+            <a:ext cx="1127215" cy="461661"/>
           </a:xfrm>
           <a:prstGeom prst="rect">
             <a:avLst/>
@@ -3041,7 +3041,7 @@
           </a:ln>
           <a:extLst>
             <a:ext uri="{C572A759-6A51-4108-AA02-DFA0A04FC94B}">
-              <ma14:wrappingTextBoxFlag xmlns="" xmlns:m="http://schemas.openxmlformats.org/officeDocument/2006/math" xmlns:a14="http://schemas.microsoft.com/office/drawing/2010/main" xmlns:ma14="http://schemas.microsoft.com/office/mac/drawingml/2011/main" val="1"/>
+              <ma14:wrappingTextBoxFlag xmlns:ma14="http://schemas.microsoft.com/office/mac/drawingml/2011/main" xmlns:a14="http://schemas.microsoft.com/office/drawing/2010/main" xmlns:m="http://schemas.openxmlformats.org/officeDocument/2006/math" xmlns="" val="1"/>
             </a:ext>
           </a:extLst>
         </p:spPr>
@@ -3064,8 +3064,8 @@
           </a:lstStyle>
           <a:p>
             <a:r>
-              <a:rPr lang="en-US" dirty="0"/>
-              <a:t>-</a:t>
+              <a:rPr lang="en-US" sz="2400" b="1" dirty="0"/>
+              <a:t>4</a:t>
             </a:r>
             <a:r>
               <a:rPr dirty="0"/>
@@ -3093,7 +3093,7 @@
           </a:ln>
           <a:extLst>
             <a:ext uri="{C572A759-6A51-4108-AA02-DFA0A04FC94B}">
-              <ma14:wrappingTextBoxFlag xmlns="" xmlns:m="http://schemas.openxmlformats.org/officeDocument/2006/math" xmlns:a14="http://schemas.microsoft.com/office/drawing/2010/main" xmlns:ma14="http://schemas.microsoft.com/office/mac/drawingml/2011/main" val="1"/>
+              <ma14:wrappingTextBoxFlag xmlns:ma14="http://schemas.microsoft.com/office/mac/drawingml/2011/main" xmlns:a14="http://schemas.microsoft.com/office/drawing/2010/main" xmlns:m="http://schemas.openxmlformats.org/officeDocument/2006/math" xmlns="" val="1"/>
             </a:ext>
           </a:extLst>
         </p:spPr>
@@ -3135,7 +3135,7 @@
         <p:spPr>
           <a:xfrm>
             <a:off x="9345600" y="2509403"/>
-            <a:ext cx="1127215" cy="400105"/>
+            <a:ext cx="1127215" cy="461661"/>
           </a:xfrm>
           <a:prstGeom prst="rect">
             <a:avLst/>
@@ -3145,7 +3145,7 @@
           </a:ln>
           <a:extLst>
             <a:ext uri="{C572A759-6A51-4108-AA02-DFA0A04FC94B}">
-              <ma14:wrappingTextBoxFlag xmlns="" xmlns:m="http://schemas.openxmlformats.org/officeDocument/2006/math" xmlns:a14="http://schemas.microsoft.com/office/drawing/2010/main" xmlns:ma14="http://schemas.microsoft.com/office/mac/drawingml/2011/main" val="1"/>
+              <ma14:wrappingTextBoxFlag xmlns:ma14="http://schemas.microsoft.com/office/mac/drawingml/2011/main" xmlns:a14="http://schemas.microsoft.com/office/drawing/2010/main" xmlns:m="http://schemas.openxmlformats.org/officeDocument/2006/math" xmlns="" val="1"/>
             </a:ext>
           </a:extLst>
         </p:spPr>
@@ -3168,13 +3168,10 @@
           </a:lstStyle>
           <a:p>
             <a:r>
-              <a:rPr lang="en-US" dirty="0"/>
-              <a:t>-</a:t>
+              <a:rPr lang="en-US" sz="2400" b="1" dirty="0"/>
+              <a:t>0</a:t>
             </a:r>
-            <a:r>
-              <a:rPr dirty="0"/>
-              <a:t>     </a:t>
-            </a:r>
+            <a:endParaRPr sz="2400" b="1" dirty="0"/>
           </a:p>
         </p:txBody>
       </p:sp>
@@ -3197,7 +3194,7 @@
           </a:ln>
           <a:extLst>
             <a:ext uri="{C572A759-6A51-4108-AA02-DFA0A04FC94B}">
-              <ma14:wrappingTextBoxFlag xmlns="" xmlns:m="http://schemas.openxmlformats.org/officeDocument/2006/math" xmlns:a14="http://schemas.microsoft.com/office/drawing/2010/main" xmlns:ma14="http://schemas.microsoft.com/office/mac/drawingml/2011/main" val="1"/>
+              <ma14:wrappingTextBoxFlag xmlns:ma14="http://schemas.microsoft.com/office/mac/drawingml/2011/main" xmlns:a14="http://schemas.microsoft.com/office/drawing/2010/main" xmlns:m="http://schemas.openxmlformats.org/officeDocument/2006/math" xmlns="" val="1"/>
             </a:ext>
           </a:extLst>
         </p:spPr>
@@ -3239,7 +3236,7 @@
         <p:spPr>
           <a:xfrm>
             <a:off x="9383210" y="3633770"/>
-            <a:ext cx="1127214" cy="400105"/>
+            <a:ext cx="1127214" cy="461661"/>
           </a:xfrm>
           <a:prstGeom prst="rect">
             <a:avLst/>
@@ -3249,7 +3246,7 @@
           </a:ln>
           <a:extLst>
             <a:ext uri="{C572A759-6A51-4108-AA02-DFA0A04FC94B}">
-              <ma14:wrappingTextBoxFlag xmlns="" xmlns:m="http://schemas.openxmlformats.org/officeDocument/2006/math" xmlns:a14="http://schemas.microsoft.com/office/drawing/2010/main" xmlns:ma14="http://schemas.microsoft.com/office/mac/drawingml/2011/main" val="1"/>
+              <ma14:wrappingTextBoxFlag xmlns:ma14="http://schemas.microsoft.com/office/mac/drawingml/2011/main" xmlns:a14="http://schemas.microsoft.com/office/drawing/2010/main" xmlns:m="http://schemas.openxmlformats.org/officeDocument/2006/math" xmlns="" val="1"/>
             </a:ext>
           </a:extLst>
         </p:spPr>
@@ -3272,8 +3269,8 @@
           </a:lstStyle>
           <a:p>
             <a:r>
-              <a:rPr lang="en-US" dirty="0"/>
-              <a:t>-</a:t>
+              <a:rPr lang="en-US" sz="2400" b="1" dirty="0"/>
+              <a:t>10</a:t>
             </a:r>
             <a:r>
               <a:rPr dirty="0"/>
@@ -3301,7 +3298,7 @@
           </a:ln>
           <a:extLst>
             <a:ext uri="{C572A759-6A51-4108-AA02-DFA0A04FC94B}">
-              <ma14:wrappingTextBoxFlag xmlns="" xmlns:m="http://schemas.openxmlformats.org/officeDocument/2006/math" xmlns:a14="http://schemas.microsoft.com/office/drawing/2010/main" xmlns:ma14="http://schemas.microsoft.com/office/mac/drawingml/2011/main" val="1"/>
+              <ma14:wrappingTextBoxFlag xmlns:ma14="http://schemas.microsoft.com/office/mac/drawingml/2011/main" xmlns:a14="http://schemas.microsoft.com/office/drawing/2010/main" xmlns:m="http://schemas.openxmlformats.org/officeDocument/2006/math" xmlns="" val="1"/>
             </a:ext>
           </a:extLst>
         </p:spPr>
@@ -3343,7 +3340,7 @@
         <p:spPr>
           <a:xfrm>
             <a:off x="9383210" y="4716414"/>
-            <a:ext cx="1127214" cy="400105"/>
+            <a:ext cx="1127214" cy="461661"/>
           </a:xfrm>
           <a:prstGeom prst="rect">
             <a:avLst/>
@@ -3353,7 +3350,7 @@
           </a:ln>
           <a:extLst>
             <a:ext uri="{C572A759-6A51-4108-AA02-DFA0A04FC94B}">
-              <ma14:wrappingTextBoxFlag xmlns="" xmlns:m="http://schemas.openxmlformats.org/officeDocument/2006/math" xmlns:a14="http://schemas.microsoft.com/office/drawing/2010/main" xmlns:ma14="http://schemas.microsoft.com/office/mac/drawingml/2011/main" val="1"/>
+              <ma14:wrappingTextBoxFlag xmlns:ma14="http://schemas.microsoft.com/office/mac/drawingml/2011/main" xmlns:a14="http://schemas.microsoft.com/office/drawing/2010/main" xmlns:m="http://schemas.openxmlformats.org/officeDocument/2006/math" xmlns="" val="1"/>
             </a:ext>
           </a:extLst>
         </p:spPr>
@@ -3376,8 +3373,8 @@
           </a:lstStyle>
           <a:p>
             <a:r>
-              <a:rPr lang="en-US" dirty="0"/>
-              <a:t>-</a:t>
+              <a:rPr lang="en-US" sz="2400" b="1" dirty="0"/>
+              <a:t>4</a:t>
             </a:r>
             <a:r>
               <a:rPr dirty="0"/>
@@ -3405,7 +3402,7 @@
           </a:ln>
           <a:extLst>
             <a:ext uri="{C572A759-6A51-4108-AA02-DFA0A04FC94B}">
-              <ma14:wrappingTextBoxFlag xmlns="" xmlns:m="http://schemas.openxmlformats.org/officeDocument/2006/math" xmlns:a14="http://schemas.microsoft.com/office/drawing/2010/main" xmlns:ma14="http://schemas.microsoft.com/office/mac/drawingml/2011/main" val="1"/>
+              <ma14:wrappingTextBoxFlag xmlns:ma14="http://schemas.microsoft.com/office/mac/drawingml/2011/main" xmlns:a14="http://schemas.microsoft.com/office/drawing/2010/main" xmlns:m="http://schemas.openxmlformats.org/officeDocument/2006/math" xmlns="" val="1"/>
             </a:ext>
           </a:extLst>
         </p:spPr>
@@ -3726,41 +3723,6 @@
           </a:prstGeom>
         </p:spPr>
       </p:pic>
-      <p:pic>
-        <p:nvPicPr>
-          <p:cNvPr id="29" name="Picture 28">
-            <a:extLst>
-              <a:ext uri="{FF2B5EF4-FFF2-40B4-BE49-F238E27FC236}">
-                <a16:creationId xmlns:a16="http://schemas.microsoft.com/office/drawing/2014/main" id="{2812CC49-458B-5807-9EF3-9E4EBE7C530C}"/>
-              </a:ext>
-            </a:extLst>
-          </p:cNvPr>
-          <p:cNvPicPr>
-            <a:picLocks noChangeAspect="1"/>
-          </p:cNvPicPr>
-          <p:nvPr/>
-        </p:nvPicPr>
-        <p:blipFill rotWithShape="1">
-          <a:blip r:embed="rId10" cstate="print">
-            <a:extLst>
-              <a:ext uri="{28A0092B-C50C-407E-A947-70E740481C1C}">
-                <a14:useLocalDpi xmlns:a14="http://schemas.microsoft.com/office/drawing/2010/main" val="0"/>
-              </a:ext>
-            </a:extLst>
-          </a:blip>
-          <a:srcRect/>
-          <a:stretch/>
-        </p:blipFill>
-        <p:spPr>
-          <a:xfrm>
-            <a:off x="4967586" y="1984744"/>
-            <a:ext cx="2335049" cy="2455364"/>
-          </a:xfrm>
-          <a:prstGeom prst="flowChartConnector">
-            <a:avLst/>
-          </a:prstGeom>
-        </p:spPr>
-      </p:pic>
       <p:sp>
         <p:nvSpPr>
           <p:cNvPr id="30" name="TextBox 29">
@@ -3836,7 +3798,7 @@
                 <a:latin typeface="Avenir Next Regular"/>
                 <a:sym typeface="Helvetica"/>
               </a:rPr>
-              <a:t>PRAKASH PRAMAR</a:t>
+              <a:t>SIKANDER BASHA</a:t>
             </a:r>
           </a:p>
         </p:txBody>
@@ -3856,7 +3818,7 @@
           <p:nvPr/>
         </p:nvPicPr>
         <p:blipFill>
-          <a:blip r:embed="rId11" cstate="print">
+          <a:blip r:embed="rId10" cstate="print">
             <a:extLst>
               <a:ext uri="{28A0092B-C50C-407E-A947-70E740481C1C}">
                 <a14:useLocalDpi xmlns:a14="http://schemas.microsoft.com/office/drawing/2010/main" val="0"/>
@@ -3986,7 +3948,7 @@
         <p:spPr>
           <a:xfrm>
             <a:off x="4597631" y="4543050"/>
-            <a:ext cx="3132378" cy="338550"/>
+            <a:ext cx="3132378" cy="400105"/>
           </a:xfrm>
           <a:prstGeom prst="rect">
             <a:avLst/>
@@ -4034,7 +3996,7 @@
               <a:tabLst/>
             </a:pPr>
             <a:r>
-              <a:rPr lang="en-US" sz="1600" b="1" dirty="0">
+              <a:rPr lang="en-US" sz="2000" b="1" dirty="0">
                 <a:solidFill>
                   <a:srgbClr val="6A3B81"/>
                 </a:solidFill>
@@ -4043,7 +4005,7 @@
               </a:rPr>
               <a:t>Rocket Singh of the Match</a:t>
             </a:r>
-            <a:endParaRPr kumimoji="0" lang="en-US" sz="1600" b="1" i="0" u="none" strike="noStrike" cap="none" spc="0" normalizeH="0" baseline="0" dirty="0">
+            <a:endParaRPr kumimoji="0" lang="en-US" sz="2000" b="1" i="0" u="none" strike="noStrike" cap="none" spc="0" normalizeH="0" baseline="0" dirty="0">
               <a:ln>
                 <a:noFill/>
               </a:ln>
@@ -4121,6 +4083,21 @@
               <a:tabLst/>
             </a:pPr>
             <a:r>
+              <a:rPr kumimoji="0" lang="en-US" sz="2000" b="1" i="0" u="none" strike="noStrike" cap="none" spc="0" normalizeH="0" baseline="0" dirty="0" err="1">
+                <a:ln>
+                  <a:noFill/>
+                </a:ln>
+                <a:solidFill>
+                  <a:srgbClr val="7EBF00"/>
+                </a:solidFill>
+                <a:effectLst/>
+                <a:uFillTx/>
+                <a:latin typeface="Avenir Next Regular"/>
+                <a:sym typeface="Helvetica"/>
+              </a:rPr>
+              <a:t>Adra</a:t>
+            </a:r>
+            <a:r>
               <a:rPr kumimoji="0" lang="en-US" sz="2000" b="1" i="0" u="none" strike="noStrike" cap="none" spc="0" normalizeH="0" baseline="0" dirty="0">
                 <a:ln>
                   <a:noFill/>
@@ -4133,7 +4110,37 @@
                 <a:latin typeface="Avenir Next Regular"/>
                 <a:sym typeface="Helvetica"/>
               </a:rPr>
-              <a:t>Demolishers vs Stunners</a:t>
+              <a:t> </a:t>
+            </a:r>
+            <a:r>
+              <a:rPr kumimoji="0" lang="en-US" sz="2000" b="1" i="0" u="none" strike="noStrike" cap="none" spc="0" normalizeH="0" baseline="0" dirty="0" err="1">
+                <a:ln>
+                  <a:noFill/>
+                </a:ln>
+                <a:solidFill>
+                  <a:srgbClr val="7EBF00"/>
+                </a:solidFill>
+                <a:effectLst/>
+                <a:uFillTx/>
+                <a:latin typeface="Avenir Next Regular"/>
+                <a:sym typeface="Helvetica"/>
+              </a:rPr>
+              <a:t>Sakka</a:t>
+            </a:r>
+            <a:r>
+              <a:rPr kumimoji="0" lang="en-US" sz="2000" b="1" i="0" u="none" strike="noStrike" cap="none" spc="0" normalizeH="0" baseline="0" dirty="0">
+                <a:ln>
+                  <a:noFill/>
+                </a:ln>
+                <a:solidFill>
+                  <a:srgbClr val="7EBF00"/>
+                </a:solidFill>
+                <a:effectLst/>
+                <a:uFillTx/>
+                <a:latin typeface="Avenir Next Regular"/>
+                <a:sym typeface="Helvetica"/>
+              </a:rPr>
+              <a:t> vs Demolishers</a:t>
             </a:r>
           </a:p>
           <a:p>
@@ -4166,11 +4173,47 @@
                 <a:latin typeface="Avenir Next Regular"/>
                 <a:sym typeface="Helvetica"/>
               </a:rPr>
-              <a:t>01-Jul-2023</a:t>
+              <a:t>07-Jul-2023</a:t>
             </a:r>
           </a:p>
         </p:txBody>
       </p:sp>
+      <p:pic>
+        <p:nvPicPr>
+          <p:cNvPr id="10" name="Picture 9">
+            <a:extLst>
+              <a:ext uri="{FF2B5EF4-FFF2-40B4-BE49-F238E27FC236}">
+                <a16:creationId xmlns:a16="http://schemas.microsoft.com/office/drawing/2014/main" id="{08BFEA00-4ECB-43BD-A939-CE7B6C6E6E25}"/>
+              </a:ext>
+            </a:extLst>
+          </p:cNvPr>
+          <p:cNvPicPr>
+            <a:picLocks noChangeAspect="1"/>
+          </p:cNvPicPr>
+          <p:nvPr/>
+        </p:nvPicPr>
+        <p:blipFill>
+          <a:blip r:embed="rId11" cstate="print">
+            <a:extLst>
+              <a:ext uri="{28A0092B-C50C-407E-A947-70E740481C1C}">
+                <a14:useLocalDpi xmlns:a14="http://schemas.microsoft.com/office/drawing/2010/main" val="0"/>
+              </a:ext>
+            </a:extLst>
+          </a:blip>
+          <a:stretch>
+            <a:fillRect/>
+          </a:stretch>
+        </p:blipFill>
+        <p:spPr>
+          <a:xfrm>
+            <a:off x="4891873" y="1957972"/>
+            <a:ext cx="2428016" cy="2458495"/>
+          </a:xfrm>
+          <a:prstGeom prst="flowChartConnector">
+            <a:avLst/>
+          </a:prstGeom>
+        </p:spPr>
+      </p:pic>
     </p:spTree>
     <p:extLst>
       <p:ext uri="{BB962C8B-B14F-4D97-AF65-F5344CB8AC3E}">

</xml_diff>

<commit_message>
20230716 Mustangs vs Alpha
</commit_message>
<xml_diff>
--- a/Manage/Rocket singh.pptx
+++ b/Manage/Rocket singh.pptx
@@ -4,6 +4,9 @@
   <p:sldMasterIdLst>
     <p:sldMasterId id="2147483648" r:id="rId1"/>
   </p:sldMasterIdLst>
+  <p:notesMasterIdLst>
+    <p:notesMasterId r:id="rId3"/>
+  </p:notesMasterIdLst>
   <p:sldIdLst>
     <p:sldId id="256" r:id="rId2"/>
   </p:sldIdLst>
@@ -112,6 +115,439 @@
 </p:presentation>
 </file>
 
+<file path=ppt/notesMasters/notesMaster1.xml><?xml version="1.0" encoding="utf-8"?>
+<p:notesMaster xmlns:a="http://schemas.openxmlformats.org/drawingml/2006/main" xmlns:r="http://schemas.openxmlformats.org/officeDocument/2006/relationships" xmlns:p="http://schemas.openxmlformats.org/presentationml/2006/main">
+  <p:cSld>
+    <p:bg>
+      <p:bgRef idx="1001">
+        <a:schemeClr val="bg1"/>
+      </p:bgRef>
+    </p:bg>
+    <p:spTree>
+      <p:nvGrpSpPr>
+        <p:cNvPr id="1" name=""/>
+        <p:cNvGrpSpPr/>
+        <p:nvPr/>
+      </p:nvGrpSpPr>
+      <p:grpSpPr>
+        <a:xfrm>
+          <a:off x="0" y="0"/>
+          <a:ext cx="0" cy="0"/>
+          <a:chOff x="0" y="0"/>
+          <a:chExt cx="0" cy="0"/>
+        </a:xfrm>
+      </p:grpSpPr>
+      <p:sp>
+        <p:nvSpPr>
+          <p:cNvPr id="2" name="Header Placeholder 1"/>
+          <p:cNvSpPr>
+            <a:spLocks noGrp="1"/>
+          </p:cNvSpPr>
+          <p:nvPr>
+            <p:ph type="hdr" sz="quarter"/>
+          </p:nvPr>
+        </p:nvSpPr>
+        <p:spPr>
+          <a:xfrm>
+            <a:off x="0" y="0"/>
+            <a:ext cx="2971800" cy="458788"/>
+          </a:xfrm>
+          <a:prstGeom prst="rect">
+            <a:avLst/>
+          </a:prstGeom>
+        </p:spPr>
+        <p:txBody>
+          <a:bodyPr vert="horz" lIns="91440" tIns="45720" rIns="91440" bIns="45720" rtlCol="0"/>
+          <a:lstStyle>
+            <a:lvl1pPr algn="l">
+              <a:defRPr sz="1200"/>
+            </a:lvl1pPr>
+          </a:lstStyle>
+          <a:p>
+            <a:endParaRPr lang="en-US"/>
+          </a:p>
+        </p:txBody>
+      </p:sp>
+      <p:sp>
+        <p:nvSpPr>
+          <p:cNvPr id="3" name="Date Placeholder 2"/>
+          <p:cNvSpPr>
+            <a:spLocks noGrp="1"/>
+          </p:cNvSpPr>
+          <p:nvPr>
+            <p:ph type="dt" idx="1"/>
+          </p:nvPr>
+        </p:nvSpPr>
+        <p:spPr>
+          <a:xfrm>
+            <a:off x="3884613" y="0"/>
+            <a:ext cx="2971800" cy="458788"/>
+          </a:xfrm>
+          <a:prstGeom prst="rect">
+            <a:avLst/>
+          </a:prstGeom>
+        </p:spPr>
+        <p:txBody>
+          <a:bodyPr vert="horz" lIns="91440" tIns="45720" rIns="91440" bIns="45720" rtlCol="0"/>
+          <a:lstStyle>
+            <a:lvl1pPr algn="r">
+              <a:defRPr sz="1200"/>
+            </a:lvl1pPr>
+          </a:lstStyle>
+          <a:p>
+            <a:fld id="{292C6D61-626B-4E73-943C-6526CCA7F53A}" type="datetimeFigureOut">
+              <a:rPr lang="en-US" smtClean="0"/>
+              <a:t>7/10/2023</a:t>
+            </a:fld>
+            <a:endParaRPr lang="en-US"/>
+          </a:p>
+        </p:txBody>
+      </p:sp>
+      <p:sp>
+        <p:nvSpPr>
+          <p:cNvPr id="4" name="Slide Image Placeholder 3"/>
+          <p:cNvSpPr>
+            <a:spLocks noGrp="1" noRot="1" noChangeAspect="1"/>
+          </p:cNvSpPr>
+          <p:nvPr>
+            <p:ph type="sldImg" idx="2"/>
+          </p:nvPr>
+        </p:nvSpPr>
+        <p:spPr>
+          <a:xfrm>
+            <a:off x="685800" y="1143000"/>
+            <a:ext cx="5486400" cy="3086100"/>
+          </a:xfrm>
+          <a:prstGeom prst="rect">
+            <a:avLst/>
+          </a:prstGeom>
+          <a:noFill/>
+          <a:ln w="12700">
+            <a:solidFill>
+              <a:prstClr val="black"/>
+            </a:solidFill>
+          </a:ln>
+        </p:spPr>
+        <p:txBody>
+          <a:bodyPr vert="horz" lIns="91440" tIns="45720" rIns="91440" bIns="45720" rtlCol="0" anchor="ctr"/>
+          <a:lstStyle/>
+          <a:p>
+            <a:endParaRPr lang="en-US"/>
+          </a:p>
+        </p:txBody>
+      </p:sp>
+      <p:sp>
+        <p:nvSpPr>
+          <p:cNvPr id="5" name="Notes Placeholder 4"/>
+          <p:cNvSpPr>
+            <a:spLocks noGrp="1"/>
+          </p:cNvSpPr>
+          <p:nvPr>
+            <p:ph type="body" sz="quarter" idx="3"/>
+          </p:nvPr>
+        </p:nvSpPr>
+        <p:spPr>
+          <a:xfrm>
+            <a:off x="685800" y="4400550"/>
+            <a:ext cx="5486400" cy="3600450"/>
+          </a:xfrm>
+          <a:prstGeom prst="rect">
+            <a:avLst/>
+          </a:prstGeom>
+        </p:spPr>
+        <p:txBody>
+          <a:bodyPr vert="horz" lIns="91440" tIns="45720" rIns="91440" bIns="45720" rtlCol="0"/>
+          <a:lstStyle/>
+          <a:p>
+            <a:pPr lvl="0"/>
+            <a:r>
+              <a:rPr lang="en-US"/>
+              <a:t>Click to edit Master text styles</a:t>
+            </a:r>
+          </a:p>
+          <a:p>
+            <a:pPr lvl="1"/>
+            <a:r>
+              <a:rPr lang="en-US"/>
+              <a:t>Second level</a:t>
+            </a:r>
+          </a:p>
+          <a:p>
+            <a:pPr lvl="2"/>
+            <a:r>
+              <a:rPr lang="en-US"/>
+              <a:t>Third level</a:t>
+            </a:r>
+          </a:p>
+          <a:p>
+            <a:pPr lvl="3"/>
+            <a:r>
+              <a:rPr lang="en-US"/>
+              <a:t>Fourth level</a:t>
+            </a:r>
+          </a:p>
+          <a:p>
+            <a:pPr lvl="4"/>
+            <a:r>
+              <a:rPr lang="en-US"/>
+              <a:t>Fifth level</a:t>
+            </a:r>
+          </a:p>
+        </p:txBody>
+      </p:sp>
+      <p:sp>
+        <p:nvSpPr>
+          <p:cNvPr id="6" name="Footer Placeholder 5"/>
+          <p:cNvSpPr>
+            <a:spLocks noGrp="1"/>
+          </p:cNvSpPr>
+          <p:nvPr>
+            <p:ph type="ftr" sz="quarter" idx="4"/>
+          </p:nvPr>
+        </p:nvSpPr>
+        <p:spPr>
+          <a:xfrm>
+            <a:off x="0" y="8685213"/>
+            <a:ext cx="2971800" cy="458787"/>
+          </a:xfrm>
+          <a:prstGeom prst="rect">
+            <a:avLst/>
+          </a:prstGeom>
+        </p:spPr>
+        <p:txBody>
+          <a:bodyPr vert="horz" lIns="91440" tIns="45720" rIns="91440" bIns="45720" rtlCol="0" anchor="b"/>
+          <a:lstStyle>
+            <a:lvl1pPr algn="l">
+              <a:defRPr sz="1200"/>
+            </a:lvl1pPr>
+          </a:lstStyle>
+          <a:p>
+            <a:endParaRPr lang="en-US"/>
+          </a:p>
+        </p:txBody>
+      </p:sp>
+      <p:sp>
+        <p:nvSpPr>
+          <p:cNvPr id="7" name="Slide Number Placeholder 6"/>
+          <p:cNvSpPr>
+            <a:spLocks noGrp="1"/>
+          </p:cNvSpPr>
+          <p:nvPr>
+            <p:ph type="sldNum" sz="quarter" idx="5"/>
+          </p:nvPr>
+        </p:nvSpPr>
+        <p:spPr>
+          <a:xfrm>
+            <a:off x="3884613" y="8685213"/>
+            <a:ext cx="2971800" cy="458787"/>
+          </a:xfrm>
+          <a:prstGeom prst="rect">
+            <a:avLst/>
+          </a:prstGeom>
+        </p:spPr>
+        <p:txBody>
+          <a:bodyPr vert="horz" lIns="91440" tIns="45720" rIns="91440" bIns="45720" rtlCol="0" anchor="b"/>
+          <a:lstStyle>
+            <a:lvl1pPr algn="r">
+              <a:defRPr sz="1200"/>
+            </a:lvl1pPr>
+          </a:lstStyle>
+          <a:p>
+            <a:fld id="{511C634C-0E8B-4D75-851C-EED0FC314C0C}" type="slidenum">
+              <a:rPr lang="en-US" smtClean="0"/>
+              <a:t>‹#›</a:t>
+            </a:fld>
+            <a:endParaRPr lang="en-US"/>
+          </a:p>
+        </p:txBody>
+      </p:sp>
+    </p:spTree>
+    <p:extLst>
+      <p:ext uri="{BB962C8B-B14F-4D97-AF65-F5344CB8AC3E}">
+        <p14:creationId xmlns:p14="http://schemas.microsoft.com/office/powerpoint/2010/main" val="284368750"/>
+      </p:ext>
+    </p:extLst>
+  </p:cSld>
+  <p:clrMap bg1="lt1" tx1="dk1" bg2="lt2" tx2="dk2" accent1="accent1" accent2="accent2" accent3="accent3" accent4="accent4" accent5="accent5" accent6="accent6" hlink="hlink" folHlink="folHlink"/>
+  <p:notesStyle>
+    <a:lvl1pPr marL="0" algn="l" defTabSz="914400" rtl="0" eaLnBrk="1" latinLnBrk="0" hangingPunct="1">
+      <a:defRPr sz="1200" kern="1200">
+        <a:solidFill>
+          <a:schemeClr val="tx1"/>
+        </a:solidFill>
+        <a:latin typeface="+mn-lt"/>
+        <a:ea typeface="+mn-ea"/>
+        <a:cs typeface="+mn-cs"/>
+      </a:defRPr>
+    </a:lvl1pPr>
+    <a:lvl2pPr marL="457200" algn="l" defTabSz="914400" rtl="0" eaLnBrk="1" latinLnBrk="0" hangingPunct="1">
+      <a:defRPr sz="1200" kern="1200">
+        <a:solidFill>
+          <a:schemeClr val="tx1"/>
+        </a:solidFill>
+        <a:latin typeface="+mn-lt"/>
+        <a:ea typeface="+mn-ea"/>
+        <a:cs typeface="+mn-cs"/>
+      </a:defRPr>
+    </a:lvl2pPr>
+    <a:lvl3pPr marL="914400" algn="l" defTabSz="914400" rtl="0" eaLnBrk="1" latinLnBrk="0" hangingPunct="1">
+      <a:defRPr sz="1200" kern="1200">
+        <a:solidFill>
+          <a:schemeClr val="tx1"/>
+        </a:solidFill>
+        <a:latin typeface="+mn-lt"/>
+        <a:ea typeface="+mn-ea"/>
+        <a:cs typeface="+mn-cs"/>
+      </a:defRPr>
+    </a:lvl3pPr>
+    <a:lvl4pPr marL="1371600" algn="l" defTabSz="914400" rtl="0" eaLnBrk="1" latinLnBrk="0" hangingPunct="1">
+      <a:defRPr sz="1200" kern="1200">
+        <a:solidFill>
+          <a:schemeClr val="tx1"/>
+        </a:solidFill>
+        <a:latin typeface="+mn-lt"/>
+        <a:ea typeface="+mn-ea"/>
+        <a:cs typeface="+mn-cs"/>
+      </a:defRPr>
+    </a:lvl4pPr>
+    <a:lvl5pPr marL="1828800" algn="l" defTabSz="914400" rtl="0" eaLnBrk="1" latinLnBrk="0" hangingPunct="1">
+      <a:defRPr sz="1200" kern="1200">
+        <a:solidFill>
+          <a:schemeClr val="tx1"/>
+        </a:solidFill>
+        <a:latin typeface="+mn-lt"/>
+        <a:ea typeface="+mn-ea"/>
+        <a:cs typeface="+mn-cs"/>
+      </a:defRPr>
+    </a:lvl5pPr>
+    <a:lvl6pPr marL="2286000" algn="l" defTabSz="914400" rtl="0" eaLnBrk="1" latinLnBrk="0" hangingPunct="1">
+      <a:defRPr sz="1200" kern="1200">
+        <a:solidFill>
+          <a:schemeClr val="tx1"/>
+        </a:solidFill>
+        <a:latin typeface="+mn-lt"/>
+        <a:ea typeface="+mn-ea"/>
+        <a:cs typeface="+mn-cs"/>
+      </a:defRPr>
+    </a:lvl6pPr>
+    <a:lvl7pPr marL="2743200" algn="l" defTabSz="914400" rtl="0" eaLnBrk="1" latinLnBrk="0" hangingPunct="1">
+      <a:defRPr sz="1200" kern="1200">
+        <a:solidFill>
+          <a:schemeClr val="tx1"/>
+        </a:solidFill>
+        <a:latin typeface="+mn-lt"/>
+        <a:ea typeface="+mn-ea"/>
+        <a:cs typeface="+mn-cs"/>
+      </a:defRPr>
+    </a:lvl7pPr>
+    <a:lvl8pPr marL="3200400" algn="l" defTabSz="914400" rtl="0" eaLnBrk="1" latinLnBrk="0" hangingPunct="1">
+      <a:defRPr sz="1200" kern="1200">
+        <a:solidFill>
+          <a:schemeClr val="tx1"/>
+        </a:solidFill>
+        <a:latin typeface="+mn-lt"/>
+        <a:ea typeface="+mn-ea"/>
+        <a:cs typeface="+mn-cs"/>
+      </a:defRPr>
+    </a:lvl8pPr>
+    <a:lvl9pPr marL="3657600" algn="l" defTabSz="914400" rtl="0" eaLnBrk="1" latinLnBrk="0" hangingPunct="1">
+      <a:defRPr sz="1200" kern="1200">
+        <a:solidFill>
+          <a:schemeClr val="tx1"/>
+        </a:solidFill>
+        <a:latin typeface="+mn-lt"/>
+        <a:ea typeface="+mn-ea"/>
+        <a:cs typeface="+mn-cs"/>
+      </a:defRPr>
+    </a:lvl9pPr>
+  </p:notesStyle>
+</p:notesMaster>
+</file>
+
+<file path=ppt/notesSlides/notesSlide1.xml><?xml version="1.0" encoding="utf-8"?>
+<p:notes xmlns:a="http://schemas.openxmlformats.org/drawingml/2006/main" xmlns:r="http://schemas.openxmlformats.org/officeDocument/2006/relationships" xmlns:p="http://schemas.openxmlformats.org/presentationml/2006/main">
+  <p:cSld>
+    <p:spTree>
+      <p:nvGrpSpPr>
+        <p:cNvPr id="1" name=""/>
+        <p:cNvGrpSpPr/>
+        <p:nvPr/>
+      </p:nvGrpSpPr>
+      <p:grpSpPr>
+        <a:xfrm>
+          <a:off x="0" y="0"/>
+          <a:ext cx="0" cy="0"/>
+          <a:chOff x="0" y="0"/>
+          <a:chExt cx="0" cy="0"/>
+        </a:xfrm>
+      </p:grpSpPr>
+      <p:sp>
+        <p:nvSpPr>
+          <p:cNvPr id="2" name="Slide Image Placeholder 1"/>
+          <p:cNvSpPr>
+            <a:spLocks noGrp="1" noRot="1" noChangeAspect="1"/>
+          </p:cNvSpPr>
+          <p:nvPr>
+            <p:ph type="sldImg"/>
+          </p:nvPr>
+        </p:nvSpPr>
+        <p:spPr/>
+      </p:sp>
+      <p:sp>
+        <p:nvSpPr>
+          <p:cNvPr id="3" name="Notes Placeholder 2"/>
+          <p:cNvSpPr>
+            <a:spLocks noGrp="1"/>
+          </p:cNvSpPr>
+          <p:nvPr>
+            <p:ph type="body" idx="1"/>
+          </p:nvPr>
+        </p:nvSpPr>
+        <p:spPr/>
+        <p:txBody>
+          <a:bodyPr/>
+          <a:lstStyle/>
+          <a:p>
+            <a:endParaRPr lang="en-US" dirty="0"/>
+          </a:p>
+        </p:txBody>
+      </p:sp>
+      <p:sp>
+        <p:nvSpPr>
+          <p:cNvPr id="4" name="Slide Number Placeholder 3"/>
+          <p:cNvSpPr>
+            <a:spLocks noGrp="1"/>
+          </p:cNvSpPr>
+          <p:nvPr>
+            <p:ph type="sldNum" sz="quarter" idx="5"/>
+          </p:nvPr>
+        </p:nvSpPr>
+        <p:spPr/>
+        <p:txBody>
+          <a:bodyPr/>
+          <a:lstStyle/>
+          <a:p>
+            <a:fld id="{511C634C-0E8B-4D75-851C-EED0FC314C0C}" type="slidenum">
+              <a:rPr lang="en-US" smtClean="0"/>
+              <a:t>1</a:t>
+            </a:fld>
+            <a:endParaRPr lang="en-US"/>
+          </a:p>
+        </p:txBody>
+      </p:sp>
+    </p:spTree>
+    <p:extLst>
+      <p:ext uri="{BB962C8B-B14F-4D97-AF65-F5344CB8AC3E}">
+        <p14:creationId xmlns:p14="http://schemas.microsoft.com/office/powerpoint/2010/main" val="921252046"/>
+      </p:ext>
+    </p:extLst>
+  </p:cSld>
+  <p:clrMapOvr>
+    <a:masterClrMapping/>
+  </p:clrMapOvr>
+</p:notes>
+</file>
+
 <file path=ppt/slideLayouts/slideLayout1.xml><?xml version="1.0" encoding="utf-8"?>
 <p:sldLayout xmlns:a="http://schemas.openxmlformats.org/drawingml/2006/main" xmlns:r="http://schemas.openxmlformats.org/officeDocument/2006/relationships" xmlns:p="http://schemas.openxmlformats.org/presentationml/2006/main" type="tx">
   <p:cSld name="TinyPPT.com">
@@ -262,7 +698,7 @@
           </a:ln>
           <a:extLst>
             <a:ext uri="{C572A759-6A51-4108-AA02-DFA0A04FC94B}">
-              <ma14:wrappingTextBoxFlag xmlns:ma14="http://schemas.microsoft.com/office/mac/drawingml/2011/main" xmlns:a14="http://schemas.microsoft.com/office/drawing/2010/main" xmlns:m="http://schemas.openxmlformats.org/officeDocument/2006/math" xmlns="" val="1"/>
+              <ma14:wrappingTextBoxFlag xmlns="" xmlns:m="http://schemas.openxmlformats.org/officeDocument/2006/math" xmlns:a14="http://schemas.microsoft.com/office/drawing/2010/main" xmlns:ma14="http://schemas.microsoft.com/office/mac/drawingml/2011/main" val="1"/>
             </a:ext>
           </a:extLst>
         </p:spPr>
@@ -320,7 +756,7 @@
           </a:ln>
           <a:extLst>
             <a:ext uri="{C572A759-6A51-4108-AA02-DFA0A04FC94B}">
-              <ma14:wrappingTextBoxFlag xmlns:ma14="http://schemas.microsoft.com/office/mac/drawingml/2011/main" xmlns:a14="http://schemas.microsoft.com/office/drawing/2010/main" xmlns:m="http://schemas.openxmlformats.org/officeDocument/2006/math" xmlns="" val="1"/>
+              <ma14:wrappingTextBoxFlag xmlns="" xmlns:m="http://schemas.openxmlformats.org/officeDocument/2006/math" xmlns:a14="http://schemas.microsoft.com/office/drawing/2010/main" xmlns:ma14="http://schemas.microsoft.com/office/mac/drawingml/2011/main" val="1"/>
             </a:ext>
           </a:extLst>
         </p:spPr>
@@ -357,7 +793,7 @@
           </a:ln>
           <a:extLst>
             <a:ext uri="{C572A759-6A51-4108-AA02-DFA0A04FC94B}">
-              <ma14:wrappingTextBoxFlag xmlns:ma14="http://schemas.microsoft.com/office/mac/drawingml/2011/main" xmlns:a14="http://schemas.microsoft.com/office/drawing/2010/main" xmlns:m="http://schemas.openxmlformats.org/officeDocument/2006/math" xmlns="" val="1"/>
+              <ma14:wrappingTextBoxFlag xmlns="" xmlns:m="http://schemas.openxmlformats.org/officeDocument/2006/math" xmlns:a14="http://schemas.microsoft.com/office/drawing/2010/main" xmlns:ma14="http://schemas.microsoft.com/office/mac/drawingml/2011/main" val="1"/>
             </a:ext>
           </a:extLst>
         </p:spPr>
@@ -2625,7 +3061,7 @@
           </a:ln>
           <a:extLst>
             <a:ext uri="{C572A759-6A51-4108-AA02-DFA0A04FC94B}">
-              <ma14:wrappingTextBoxFlag xmlns:ma14="http://schemas.microsoft.com/office/mac/drawingml/2011/main" xmlns:a14="http://schemas.microsoft.com/office/drawing/2010/main" xmlns:m="http://schemas.openxmlformats.org/officeDocument/2006/math" xmlns="" val="1"/>
+              <ma14:wrappingTextBoxFlag xmlns="" xmlns:m="http://schemas.openxmlformats.org/officeDocument/2006/math" xmlns:a14="http://schemas.microsoft.com/office/drawing/2010/main" xmlns:ma14="http://schemas.microsoft.com/office/mac/drawingml/2011/main" val="1"/>
             </a:ext>
           </a:extLst>
         </p:spPr>
@@ -2649,7 +3085,7 @@
           <a:p>
             <a:r>
               <a:rPr lang="en-US" sz="2400" b="1" dirty="0"/>
-              <a:t>-</a:t>
+              <a:t>37</a:t>
             </a:r>
             <a:r>
               <a:rPr dirty="0"/>
@@ -2677,7 +3113,7 @@
           </a:ln>
           <a:extLst>
             <a:ext uri="{C572A759-6A51-4108-AA02-DFA0A04FC94B}">
-              <ma14:wrappingTextBoxFlag xmlns:ma14="http://schemas.microsoft.com/office/mac/drawingml/2011/main" xmlns:a14="http://schemas.microsoft.com/office/drawing/2010/main" xmlns:m="http://schemas.openxmlformats.org/officeDocument/2006/math" xmlns="" val="1"/>
+              <ma14:wrappingTextBoxFlag xmlns="" xmlns:m="http://schemas.openxmlformats.org/officeDocument/2006/math" xmlns:a14="http://schemas.microsoft.com/office/drawing/2010/main" xmlns:ma14="http://schemas.microsoft.com/office/mac/drawingml/2011/main" val="1"/>
             </a:ext>
           </a:extLst>
         </p:spPr>
@@ -2729,7 +3165,7 @@
           </a:ln>
           <a:extLst>
             <a:ext uri="{C572A759-6A51-4108-AA02-DFA0A04FC94B}">
-              <ma14:wrappingTextBoxFlag xmlns:ma14="http://schemas.microsoft.com/office/mac/drawingml/2011/main" xmlns:a14="http://schemas.microsoft.com/office/drawing/2010/main" xmlns:m="http://schemas.openxmlformats.org/officeDocument/2006/math" xmlns="" val="1"/>
+              <ma14:wrappingTextBoxFlag xmlns="" xmlns:m="http://schemas.openxmlformats.org/officeDocument/2006/math" xmlns:a14="http://schemas.microsoft.com/office/drawing/2010/main" xmlns:ma14="http://schemas.microsoft.com/office/mac/drawingml/2011/main" val="1"/>
             </a:ext>
           </a:extLst>
         </p:spPr>
@@ -2753,7 +3189,7 @@
           <a:p>
             <a:r>
               <a:rPr lang="en-US" sz="2400" b="1" dirty="0"/>
-              <a:t>-</a:t>
+              <a:t>44</a:t>
             </a:r>
             <a:r>
               <a:rPr dirty="0"/>
@@ -2781,7 +3217,7 @@
           </a:ln>
           <a:extLst>
             <a:ext uri="{C572A759-6A51-4108-AA02-DFA0A04FC94B}">
-              <ma14:wrappingTextBoxFlag xmlns:ma14="http://schemas.microsoft.com/office/mac/drawingml/2011/main" xmlns:a14="http://schemas.microsoft.com/office/drawing/2010/main" xmlns:m="http://schemas.openxmlformats.org/officeDocument/2006/math" xmlns="" val="1"/>
+              <ma14:wrappingTextBoxFlag xmlns="" xmlns:m="http://schemas.openxmlformats.org/officeDocument/2006/math" xmlns:a14="http://schemas.microsoft.com/office/drawing/2010/main" xmlns:ma14="http://schemas.microsoft.com/office/mac/drawingml/2011/main" val="1"/>
             </a:ext>
           </a:extLst>
         </p:spPr>
@@ -2833,7 +3269,7 @@
           </a:ln>
           <a:extLst>
             <a:ext uri="{C572A759-6A51-4108-AA02-DFA0A04FC94B}">
-              <ma14:wrappingTextBoxFlag xmlns:ma14="http://schemas.microsoft.com/office/mac/drawingml/2011/main" xmlns:a14="http://schemas.microsoft.com/office/drawing/2010/main" xmlns:m="http://schemas.openxmlformats.org/officeDocument/2006/math" xmlns="" val="1"/>
+              <ma14:wrappingTextBoxFlag xmlns="" xmlns:m="http://schemas.openxmlformats.org/officeDocument/2006/math" xmlns:a14="http://schemas.microsoft.com/office/drawing/2010/main" xmlns:ma14="http://schemas.microsoft.com/office/mac/drawingml/2011/main" val="1"/>
             </a:ext>
           </a:extLst>
         </p:spPr>
@@ -2857,7 +3293,7 @@
           <a:p>
             <a:r>
               <a:rPr lang="en-US" sz="2400" b="1" dirty="0"/>
-              <a:t>-</a:t>
+              <a:t>1</a:t>
             </a:r>
             <a:r>
               <a:rPr dirty="0"/>
@@ -2885,7 +3321,7 @@
           </a:ln>
           <a:extLst>
             <a:ext uri="{C572A759-6A51-4108-AA02-DFA0A04FC94B}">
-              <ma14:wrappingTextBoxFlag xmlns:ma14="http://schemas.microsoft.com/office/mac/drawingml/2011/main" xmlns:a14="http://schemas.microsoft.com/office/drawing/2010/main" xmlns:m="http://schemas.openxmlformats.org/officeDocument/2006/math" xmlns="" val="1"/>
+              <ma14:wrappingTextBoxFlag xmlns="" xmlns:m="http://schemas.openxmlformats.org/officeDocument/2006/math" xmlns:a14="http://schemas.microsoft.com/office/drawing/2010/main" xmlns:ma14="http://schemas.microsoft.com/office/mac/drawingml/2011/main" val="1"/>
             </a:ext>
           </a:extLst>
         </p:spPr>
@@ -2937,7 +3373,7 @@
           </a:ln>
           <a:extLst>
             <a:ext uri="{C572A759-6A51-4108-AA02-DFA0A04FC94B}">
-              <ma14:wrappingTextBoxFlag xmlns:ma14="http://schemas.microsoft.com/office/mac/drawingml/2011/main" xmlns:a14="http://schemas.microsoft.com/office/drawing/2010/main" xmlns:m="http://schemas.openxmlformats.org/officeDocument/2006/math" xmlns="" val="1"/>
+              <ma14:wrappingTextBoxFlag xmlns="" xmlns:m="http://schemas.openxmlformats.org/officeDocument/2006/math" xmlns:a14="http://schemas.microsoft.com/office/drawing/2010/main" xmlns:ma14="http://schemas.microsoft.com/office/mac/drawingml/2011/main" val="1"/>
             </a:ext>
           </a:extLst>
         </p:spPr>
@@ -2961,7 +3397,7 @@
           <a:p>
             <a:r>
               <a:rPr lang="en-US" sz="2400" b="1" dirty="0"/>
-              <a:t>-</a:t>
+              <a:t>4</a:t>
             </a:r>
             <a:r>
               <a:rPr dirty="0"/>
@@ -2989,7 +3425,7 @@
           </a:ln>
           <a:extLst>
             <a:ext uri="{C572A759-6A51-4108-AA02-DFA0A04FC94B}">
-              <ma14:wrappingTextBoxFlag xmlns:ma14="http://schemas.microsoft.com/office/mac/drawingml/2011/main" xmlns:a14="http://schemas.microsoft.com/office/drawing/2010/main" xmlns:m="http://schemas.openxmlformats.org/officeDocument/2006/math" xmlns="" val="1"/>
+              <ma14:wrappingTextBoxFlag xmlns="" xmlns:m="http://schemas.openxmlformats.org/officeDocument/2006/math" xmlns:a14="http://schemas.microsoft.com/office/drawing/2010/main" xmlns:ma14="http://schemas.microsoft.com/office/mac/drawingml/2011/main" val="1"/>
             </a:ext>
           </a:extLst>
         </p:spPr>
@@ -3041,7 +3477,7 @@
           </a:ln>
           <a:extLst>
             <a:ext uri="{C572A759-6A51-4108-AA02-DFA0A04FC94B}">
-              <ma14:wrappingTextBoxFlag xmlns:ma14="http://schemas.microsoft.com/office/mac/drawingml/2011/main" xmlns:a14="http://schemas.microsoft.com/office/drawing/2010/main" xmlns:m="http://schemas.openxmlformats.org/officeDocument/2006/math" xmlns="" val="1"/>
+              <ma14:wrappingTextBoxFlag xmlns="" xmlns:m="http://schemas.openxmlformats.org/officeDocument/2006/math" xmlns:a14="http://schemas.microsoft.com/office/drawing/2010/main" xmlns:ma14="http://schemas.microsoft.com/office/mac/drawingml/2011/main" val="1"/>
             </a:ext>
           </a:extLst>
         </p:spPr>
@@ -3065,7 +3501,7 @@
           <a:p>
             <a:r>
               <a:rPr lang="en-US" sz="2400" b="1" dirty="0"/>
-              <a:t>4</a:t>
+              <a:t>NA</a:t>
             </a:r>
             <a:r>
               <a:rPr dirty="0"/>
@@ -3093,7 +3529,7 @@
           </a:ln>
           <a:extLst>
             <a:ext uri="{C572A759-6A51-4108-AA02-DFA0A04FC94B}">
-              <ma14:wrappingTextBoxFlag xmlns:ma14="http://schemas.microsoft.com/office/mac/drawingml/2011/main" xmlns:a14="http://schemas.microsoft.com/office/drawing/2010/main" xmlns:m="http://schemas.openxmlformats.org/officeDocument/2006/math" xmlns="" val="1"/>
+              <ma14:wrappingTextBoxFlag xmlns="" xmlns:m="http://schemas.openxmlformats.org/officeDocument/2006/math" xmlns:a14="http://schemas.microsoft.com/office/drawing/2010/main" xmlns:ma14="http://schemas.microsoft.com/office/mac/drawingml/2011/main" val="1"/>
             </a:ext>
           </a:extLst>
         </p:spPr>
@@ -3145,7 +3581,7 @@
           </a:ln>
           <a:extLst>
             <a:ext uri="{C572A759-6A51-4108-AA02-DFA0A04FC94B}">
-              <ma14:wrappingTextBoxFlag xmlns:ma14="http://schemas.microsoft.com/office/mac/drawingml/2011/main" xmlns:a14="http://schemas.microsoft.com/office/drawing/2010/main" xmlns:m="http://schemas.openxmlformats.org/officeDocument/2006/math" xmlns="" val="1"/>
+              <ma14:wrappingTextBoxFlag xmlns="" xmlns:m="http://schemas.openxmlformats.org/officeDocument/2006/math" xmlns:a14="http://schemas.microsoft.com/office/drawing/2010/main" xmlns:ma14="http://schemas.microsoft.com/office/mac/drawingml/2011/main" val="1"/>
             </a:ext>
           </a:extLst>
         </p:spPr>
@@ -3169,7 +3605,7 @@
           <a:p>
             <a:r>
               <a:rPr lang="en-US" sz="2400" b="1" dirty="0"/>
-              <a:t>0</a:t>
+              <a:t>NA</a:t>
             </a:r>
             <a:endParaRPr sz="2400" b="1" dirty="0"/>
           </a:p>
@@ -3194,7 +3630,7 @@
           </a:ln>
           <a:extLst>
             <a:ext uri="{C572A759-6A51-4108-AA02-DFA0A04FC94B}">
-              <ma14:wrappingTextBoxFlag xmlns:ma14="http://schemas.microsoft.com/office/mac/drawingml/2011/main" xmlns:a14="http://schemas.microsoft.com/office/drawing/2010/main" xmlns:m="http://schemas.openxmlformats.org/officeDocument/2006/math" xmlns="" val="1"/>
+              <ma14:wrappingTextBoxFlag xmlns="" xmlns:m="http://schemas.openxmlformats.org/officeDocument/2006/math" xmlns:a14="http://schemas.microsoft.com/office/drawing/2010/main" xmlns:ma14="http://schemas.microsoft.com/office/mac/drawingml/2011/main" val="1"/>
             </a:ext>
           </a:extLst>
         </p:spPr>
@@ -3246,7 +3682,7 @@
           </a:ln>
           <a:extLst>
             <a:ext uri="{C572A759-6A51-4108-AA02-DFA0A04FC94B}">
-              <ma14:wrappingTextBoxFlag xmlns:ma14="http://schemas.microsoft.com/office/mac/drawingml/2011/main" xmlns:a14="http://schemas.microsoft.com/office/drawing/2010/main" xmlns:m="http://schemas.openxmlformats.org/officeDocument/2006/math" xmlns="" val="1"/>
+              <ma14:wrappingTextBoxFlag xmlns="" xmlns:m="http://schemas.openxmlformats.org/officeDocument/2006/math" xmlns:a14="http://schemas.microsoft.com/office/drawing/2010/main" xmlns:ma14="http://schemas.microsoft.com/office/mac/drawingml/2011/main" val="1"/>
             </a:ext>
           </a:extLst>
         </p:spPr>
@@ -3270,7 +3706,7 @@
           <a:p>
             <a:r>
               <a:rPr lang="en-US" sz="2400" b="1" dirty="0"/>
-              <a:t>10</a:t>
+              <a:t>NA</a:t>
             </a:r>
             <a:r>
               <a:rPr dirty="0"/>
@@ -3298,7 +3734,7 @@
           </a:ln>
           <a:extLst>
             <a:ext uri="{C572A759-6A51-4108-AA02-DFA0A04FC94B}">
-              <ma14:wrappingTextBoxFlag xmlns:ma14="http://schemas.microsoft.com/office/mac/drawingml/2011/main" xmlns:a14="http://schemas.microsoft.com/office/drawing/2010/main" xmlns:m="http://schemas.openxmlformats.org/officeDocument/2006/math" xmlns="" val="1"/>
+              <ma14:wrappingTextBoxFlag xmlns="" xmlns:m="http://schemas.openxmlformats.org/officeDocument/2006/math" xmlns:a14="http://schemas.microsoft.com/office/drawing/2010/main" xmlns:ma14="http://schemas.microsoft.com/office/mac/drawingml/2011/main" val="1"/>
             </a:ext>
           </a:extLst>
         </p:spPr>
@@ -3350,7 +3786,7 @@
           </a:ln>
           <a:extLst>
             <a:ext uri="{C572A759-6A51-4108-AA02-DFA0A04FC94B}">
-              <ma14:wrappingTextBoxFlag xmlns:ma14="http://schemas.microsoft.com/office/mac/drawingml/2011/main" xmlns:a14="http://schemas.microsoft.com/office/drawing/2010/main" xmlns:m="http://schemas.openxmlformats.org/officeDocument/2006/math" xmlns="" val="1"/>
+              <ma14:wrappingTextBoxFlag xmlns="" xmlns:m="http://schemas.openxmlformats.org/officeDocument/2006/math" xmlns:a14="http://schemas.microsoft.com/office/drawing/2010/main" xmlns:ma14="http://schemas.microsoft.com/office/mac/drawingml/2011/main" val="1"/>
             </a:ext>
           </a:extLst>
         </p:spPr>
@@ -3374,7 +3810,7 @@
           <a:p>
             <a:r>
               <a:rPr lang="en-US" sz="2400" b="1" dirty="0"/>
-              <a:t>4</a:t>
+              <a:t>NA</a:t>
             </a:r>
             <a:r>
               <a:rPr dirty="0"/>
@@ -3402,7 +3838,7 @@
           </a:ln>
           <a:extLst>
             <a:ext uri="{C572A759-6A51-4108-AA02-DFA0A04FC94B}">
-              <ma14:wrappingTextBoxFlag xmlns:ma14="http://schemas.microsoft.com/office/mac/drawingml/2011/main" xmlns:a14="http://schemas.microsoft.com/office/drawing/2010/main" xmlns:m="http://schemas.openxmlformats.org/officeDocument/2006/math" xmlns="" val="1"/>
+              <ma14:wrappingTextBoxFlag xmlns="" xmlns:m="http://schemas.openxmlformats.org/officeDocument/2006/math" xmlns:a14="http://schemas.microsoft.com/office/drawing/2010/main" xmlns:ma14="http://schemas.microsoft.com/office/mac/drawingml/2011/main" val="1"/>
             </a:ext>
           </a:extLst>
         </p:spPr>
@@ -3450,7 +3886,7 @@
           <p:nvPr/>
         </p:nvPicPr>
         <p:blipFill>
-          <a:blip r:embed="rId2" cstate="print">
+          <a:blip r:embed="rId3" cstate="print">
             <a:extLst>
               <a:ext uri="{28A0092B-C50C-407E-A947-70E740481C1C}">
                 <a14:useLocalDpi xmlns:a14="http://schemas.microsoft.com/office/drawing/2010/main" val="0"/>
@@ -3486,7 +3922,7 @@
           <p:nvPr/>
         </p:nvPicPr>
         <p:blipFill>
-          <a:blip r:embed="rId3" cstate="print">
+          <a:blip r:embed="rId4" cstate="print">
             <a:extLst>
               <a:ext uri="{28A0092B-C50C-407E-A947-70E740481C1C}">
                 <a14:useLocalDpi xmlns:a14="http://schemas.microsoft.com/office/drawing/2010/main" val="0"/>
@@ -3522,7 +3958,7 @@
           <p:nvPr/>
         </p:nvPicPr>
         <p:blipFill>
-          <a:blip r:embed="rId4" cstate="print">
+          <a:blip r:embed="rId5" cstate="print">
             <a:extLst>
               <a:ext uri="{28A0092B-C50C-407E-A947-70E740481C1C}">
                 <a14:useLocalDpi xmlns:a14="http://schemas.microsoft.com/office/drawing/2010/main" val="0"/>
@@ -3558,7 +3994,7 @@
           <p:nvPr/>
         </p:nvPicPr>
         <p:blipFill>
-          <a:blip r:embed="rId5" cstate="print">
+          <a:blip r:embed="rId6" cstate="print">
             <a:extLst>
               <a:ext uri="{28A0092B-C50C-407E-A947-70E740481C1C}">
                 <a14:useLocalDpi xmlns:a14="http://schemas.microsoft.com/office/drawing/2010/main" val="0"/>
@@ -3594,7 +4030,7 @@
           <p:nvPr/>
         </p:nvPicPr>
         <p:blipFill>
-          <a:blip r:embed="rId6" cstate="print">
+          <a:blip r:embed="rId7" cstate="print">
             <a:extLst>
               <a:ext uri="{28A0092B-C50C-407E-A947-70E740481C1C}">
                 <a14:useLocalDpi xmlns:a14="http://schemas.microsoft.com/office/drawing/2010/main" val="0"/>
@@ -3630,7 +4066,7 @@
           <p:nvPr/>
         </p:nvPicPr>
         <p:blipFill>
-          <a:blip r:embed="rId7" cstate="print">
+          <a:blip r:embed="rId8" cstate="print">
             <a:extLst>
               <a:ext uri="{28A0092B-C50C-407E-A947-70E740481C1C}">
                 <a14:useLocalDpi xmlns:a14="http://schemas.microsoft.com/office/drawing/2010/main" val="0"/>
@@ -3666,7 +4102,7 @@
           <p:nvPr/>
         </p:nvPicPr>
         <p:blipFill>
-          <a:blip r:embed="rId8" cstate="print">
+          <a:blip r:embed="rId9" cstate="print">
             <a:extLst>
               <a:ext uri="{28A0092B-C50C-407E-A947-70E740481C1C}">
                 <a14:useLocalDpi xmlns:a14="http://schemas.microsoft.com/office/drawing/2010/main" val="0"/>
@@ -3702,7 +4138,7 @@
           <p:nvPr/>
         </p:nvPicPr>
         <p:blipFill>
-          <a:blip r:embed="rId9" cstate="print">
+          <a:blip r:embed="rId10" cstate="print">
             <a:extLst>
               <a:ext uri="{28A0092B-C50C-407E-A947-70E740481C1C}">
                 <a14:useLocalDpi xmlns:a14="http://schemas.microsoft.com/office/drawing/2010/main" val="0"/>
@@ -3798,7 +4234,7 @@
                 <a:latin typeface="Avenir Next Regular"/>
                 <a:sym typeface="Helvetica"/>
               </a:rPr>
-              <a:t>SIKANDER BASHA</a:t>
+              <a:t>JAI BALAJI</a:t>
             </a:r>
           </a:p>
         </p:txBody>
@@ -3818,7 +4254,7 @@
           <p:nvPr/>
         </p:nvPicPr>
         <p:blipFill>
-          <a:blip r:embed="rId10" cstate="print">
+          <a:blip r:embed="rId11" cstate="print">
             <a:extLst>
               <a:ext uri="{28A0092B-C50C-407E-A947-70E740481C1C}">
                 <a14:useLocalDpi xmlns:a14="http://schemas.microsoft.com/office/drawing/2010/main" val="0"/>
@@ -4083,21 +4519,6 @@
               <a:tabLst/>
             </a:pPr>
             <a:r>
-              <a:rPr kumimoji="0" lang="en-US" sz="2000" b="1" i="0" u="none" strike="noStrike" cap="none" spc="0" normalizeH="0" baseline="0" dirty="0" err="1">
-                <a:ln>
-                  <a:noFill/>
-                </a:ln>
-                <a:solidFill>
-                  <a:srgbClr val="7EBF00"/>
-                </a:solidFill>
-                <a:effectLst/>
-                <a:uFillTx/>
-                <a:latin typeface="Avenir Next Regular"/>
-                <a:sym typeface="Helvetica"/>
-              </a:rPr>
-              <a:t>Adra</a:t>
-            </a:r>
-            <a:r>
               <a:rPr kumimoji="0" lang="en-US" sz="2000" b="1" i="0" u="none" strike="noStrike" cap="none" spc="0" normalizeH="0" baseline="0" dirty="0">
                 <a:ln>
                   <a:noFill/>
@@ -4110,37 +4531,7 @@
                 <a:latin typeface="Avenir Next Regular"/>
                 <a:sym typeface="Helvetica"/>
               </a:rPr>
-              <a:t> </a:t>
-            </a:r>
-            <a:r>
-              <a:rPr kumimoji="0" lang="en-US" sz="2000" b="1" i="0" u="none" strike="noStrike" cap="none" spc="0" normalizeH="0" baseline="0" dirty="0" err="1">
-                <a:ln>
-                  <a:noFill/>
-                </a:ln>
-                <a:solidFill>
-                  <a:srgbClr val="7EBF00"/>
-                </a:solidFill>
-                <a:effectLst/>
-                <a:uFillTx/>
-                <a:latin typeface="Avenir Next Regular"/>
-                <a:sym typeface="Helvetica"/>
-              </a:rPr>
-              <a:t>Sakka</a:t>
-            </a:r>
-            <a:r>
-              <a:rPr kumimoji="0" lang="en-US" sz="2000" b="1" i="0" u="none" strike="noStrike" cap="none" spc="0" normalizeH="0" baseline="0" dirty="0">
-                <a:ln>
-                  <a:noFill/>
-                </a:ln>
-                <a:solidFill>
-                  <a:srgbClr val="7EBF00"/>
-                </a:solidFill>
-                <a:effectLst/>
-                <a:uFillTx/>
-                <a:latin typeface="Avenir Next Regular"/>
-                <a:sym typeface="Helvetica"/>
-              </a:rPr>
-              <a:t> vs Demolishers</a:t>
+              <a:t>Alpha vs Demolishers</a:t>
             </a:r>
           </a:p>
           <a:p>
@@ -4173,17 +4564,17 @@
                 <a:latin typeface="Avenir Next Regular"/>
                 <a:sym typeface="Helvetica"/>
               </a:rPr>
-              <a:t>07-Jul-2023</a:t>
+              <a:t>09-Jul-2023</a:t>
             </a:r>
           </a:p>
         </p:txBody>
       </p:sp>
       <p:pic>
         <p:nvPicPr>
-          <p:cNvPr id="10" name="Picture 9">
+          <p:cNvPr id="7" name="Picture 6">
             <a:extLst>
               <a:ext uri="{FF2B5EF4-FFF2-40B4-BE49-F238E27FC236}">
-                <a16:creationId xmlns:a16="http://schemas.microsoft.com/office/drawing/2014/main" id="{08BFEA00-4ECB-43BD-A939-CE7B6C6E6E25}"/>
+                <a16:creationId xmlns:a16="http://schemas.microsoft.com/office/drawing/2014/main" id="{DA4EC876-85AB-D99C-585A-F715174154D4}"/>
               </a:ext>
             </a:extLst>
           </p:cNvPr>
@@ -4193,7 +4584,7 @@
           <p:nvPr/>
         </p:nvPicPr>
         <p:blipFill>
-          <a:blip r:embed="rId11" cstate="print">
+          <a:blip r:embed="rId12" cstate="print">
             <a:extLst>
               <a:ext uri="{28A0092B-C50C-407E-A947-70E740481C1C}">
                 <a14:useLocalDpi xmlns:a14="http://schemas.microsoft.com/office/drawing/2010/main" val="0"/>
@@ -4206,14 +4597,146 @@
         </p:blipFill>
         <p:spPr>
           <a:xfrm>
-            <a:off x="4891873" y="1957972"/>
-            <a:ext cx="2428016" cy="2458495"/>
+            <a:off x="4824326" y="1918059"/>
+            <a:ext cx="2554380" cy="2530483"/>
           </a:xfrm>
           <a:prstGeom prst="flowChartConnector">
             <a:avLst/>
           </a:prstGeom>
         </p:spPr>
       </p:pic>
+      <p:sp>
+        <p:nvSpPr>
+          <p:cNvPr id="6" name="TextBox 52">
+            <a:extLst>
+              <a:ext uri="{FF2B5EF4-FFF2-40B4-BE49-F238E27FC236}">
+                <a16:creationId xmlns:a16="http://schemas.microsoft.com/office/drawing/2014/main" id="{35E4B720-1D21-88CB-10E4-BAB790B798B1}"/>
+              </a:ext>
+            </a:extLst>
+          </p:cNvPr>
+          <p:cNvSpPr txBox="1"/>
+          <p:nvPr/>
+        </p:nvSpPr>
+        <p:spPr>
+          <a:xfrm>
+            <a:off x="0" y="6263516"/>
+            <a:ext cx="12192000" cy="1077214"/>
+          </a:xfrm>
+          <a:prstGeom prst="rect">
+            <a:avLst/>
+          </a:prstGeom>
+          <a:ln w="12700">
+            <a:miter lim="400000"/>
+          </a:ln>
+          <a:extLst>
+            <a:ext uri="{C572A759-6A51-4108-AA02-DFA0A04FC94B}">
+              <ma14:wrappingTextBoxFlag xmlns="" xmlns:m="http://schemas.openxmlformats.org/officeDocument/2006/math" xmlns:a14="http://schemas.microsoft.com/office/drawing/2010/main" xmlns:ma14="http://schemas.microsoft.com/office/mac/drawingml/2011/main" val="1"/>
+            </a:ext>
+          </a:extLst>
+        </p:spPr>
+        <p:txBody>
+          <a:bodyPr wrap="square" lIns="45718" tIns="45718" rIns="45718" bIns="45718">
+            <a:spAutoFit/>
+          </a:bodyPr>
+          <a:lstStyle>
+            <a:lvl1pPr algn="ctr">
+              <a:defRPr sz="2000">
+                <a:solidFill>
+                  <a:srgbClr val="FFFFFF"/>
+                </a:solidFill>
+                <a:latin typeface="Avenir Next Regular"/>
+                <a:ea typeface="Avenir Next Regular"/>
+                <a:cs typeface="Avenir Next Regular"/>
+                <a:sym typeface="Avenir Next Regular"/>
+              </a:defRPr>
+            </a:lvl1pPr>
+          </a:lstStyle>
+          <a:p>
+            <a:r>
+              <a:rPr lang="en-US" sz="800" dirty="0">
+                <a:solidFill>
+                  <a:srgbClr val="002060"/>
+                </a:solidFill>
+              </a:rPr>
+              <a:t>RIVERVALE ROCKETS CRICKET CLUB RIVERVALE ROCKETS CRICKET CLUB RIVERVALE ROCKETS CRICKET CLUB RIVERVALE ROCKETS CRICKET CLUB RIVERVALE ROCKETS CRICKET CLUB RIVERVALE ROCKETS CRICKET CLUB RIVERVALE ROCKETS CRICKET CLUB RIVERVALE ROCKETS CRICKET CLUB     </a:t>
+            </a:r>
+          </a:p>
+          <a:p>
+            <a:pPr algn="l"/>
+            <a:r>
+              <a:rPr lang="en-US" sz="800" dirty="0">
+                <a:solidFill>
+                  <a:srgbClr val="002060"/>
+                </a:solidFill>
+              </a:rPr>
+              <a:t>    </a:t>
+            </a:r>
+          </a:p>
+          <a:p>
+            <a:pPr algn="l"/>
+            <a:r>
+              <a:rPr lang="en-US" sz="800" dirty="0">
+                <a:solidFill>
+                  <a:srgbClr val="002060"/>
+                </a:solidFill>
+              </a:rPr>
+              <a:t> </a:t>
+            </a:r>
+          </a:p>
+          <a:p>
+            <a:pPr algn="l"/>
+            <a:r>
+              <a:rPr lang="en-US" sz="800" dirty="0">
+                <a:solidFill>
+                  <a:srgbClr val="002060"/>
+                </a:solidFill>
+              </a:rPr>
+              <a:t>  </a:t>
+            </a:r>
+          </a:p>
+          <a:p>
+            <a:pPr algn="l"/>
+            <a:r>
+              <a:rPr lang="en-US" sz="800" dirty="0">
+                <a:solidFill>
+                  <a:srgbClr val="002060"/>
+                </a:solidFill>
+              </a:rPr>
+              <a:t>    </a:t>
+            </a:r>
+          </a:p>
+          <a:p>
+            <a:pPr algn="l"/>
+            <a:r>
+              <a:rPr lang="en-US" sz="800" dirty="0">
+                <a:solidFill>
+                  <a:srgbClr val="002060"/>
+                </a:solidFill>
+              </a:rPr>
+              <a:t>   </a:t>
+            </a:r>
+          </a:p>
+          <a:p>
+            <a:pPr algn="l"/>
+            <a:r>
+              <a:rPr lang="en-US" sz="800" dirty="0">
+                <a:solidFill>
+                  <a:srgbClr val="002060"/>
+                </a:solidFill>
+              </a:rPr>
+              <a:t>     </a:t>
+            </a:r>
+          </a:p>
+          <a:p>
+            <a:pPr algn="l"/>
+            <a:endParaRPr lang="en-US" sz="800" dirty="0">
+              <a:solidFill>
+                <a:srgbClr val="002060"/>
+              </a:solidFill>
+            </a:endParaRPr>
+          </a:p>
+        </p:txBody>
+      </p:sp>
     </p:spTree>
     <p:extLst>
       <p:ext uri="{BB962C8B-B14F-4D97-AF65-F5344CB8AC3E}">
@@ -5993,6 +6516,49 @@
                                         <p:cTn id="167" dur="600"/>
                                         <p:tgtEl>
                                           <p:spTgt spid="1131"/>
+                                        </p:tgtEl>
+                                      </p:cBhvr>
+                                    </p:animEffect>
+                                  </p:childTnLst>
+                                </p:cTn>
+                              </p:par>
+                            </p:childTnLst>
+                          </p:cTn>
+                        </p:par>
+                        <p:par>
+                          <p:cTn id="168" fill="hold">
+                            <p:stCondLst>
+                              <p:cond delay="24600"/>
+                            </p:stCondLst>
+                            <p:childTnLst>
+                              <p:par>
+                                <p:cTn id="169" presetID="22" presetClass="entr" presetSubtype="1" fill="hold" grpId="0" nodeType="afterEffect">
+                                  <p:stCondLst>
+                                    <p:cond delay="0"/>
+                                  </p:stCondLst>
+                                  <p:iterate>
+                                    <p:tmAbs val="0"/>
+                                  </p:iterate>
+                                  <p:childTnLst>
+                                    <p:set>
+                                      <p:cBhvr>
+                                        <p:cTn id="170" fill="hold"/>
+                                        <p:tgtEl>
+                                          <p:spTgt spid="6"/>
+                                        </p:tgtEl>
+                                        <p:attrNameLst>
+                                          <p:attrName>style.visibility</p:attrName>
+                                        </p:attrNameLst>
+                                      </p:cBhvr>
+                                      <p:to>
+                                        <p:strVal val="visible"/>
+                                      </p:to>
+                                    </p:set>
+                                    <p:animEffect transition="in" filter="wipe(up)">
+                                      <p:cBhvr>
+                                        <p:cTn id="171" dur="600"/>
+                                        <p:tgtEl>
+                                          <p:spTgt spid="6"/>
                                         </p:tgtEl>
                                       </p:cBhvr>
                                     </p:animEffect>
@@ -6068,6 +6634,7 @@
       <p:bldP spid="1130" grpId="0" animBg="1" advAuto="0"/>
       <p:bldP spid="1131" grpId="0" animBg="1" advAuto="0"/>
       <p:bldP spid="1132" grpId="0" animBg="1" advAuto="0"/>
+      <p:bldP spid="6" grpId="0" animBg="1" advAuto="0"/>
     </p:bldLst>
   </p:timing>
 </p:sld>
@@ -7143,4 +7710,299 @@
   </a:objectDefaults>
   <a:extraClrSchemeLst/>
 </a:theme>
+</file>
+
+<file path=ppt/theme/theme2.xml><?xml version="1.0" encoding="utf-8"?>
+<a:theme xmlns:a="http://schemas.openxmlformats.org/drawingml/2006/main" name="Office Theme">
+  <a:themeElements>
+    <a:clrScheme name="Office">
+      <a:dk1>
+        <a:sysClr val="windowText" lastClr="000000"/>
+      </a:dk1>
+      <a:lt1>
+        <a:sysClr val="window" lastClr="FFFFFF"/>
+      </a:lt1>
+      <a:dk2>
+        <a:srgbClr val="44546A"/>
+      </a:dk2>
+      <a:lt2>
+        <a:srgbClr val="E7E6E6"/>
+      </a:lt2>
+      <a:accent1>
+        <a:srgbClr val="4472C4"/>
+      </a:accent1>
+      <a:accent2>
+        <a:srgbClr val="ED7D31"/>
+      </a:accent2>
+      <a:accent3>
+        <a:srgbClr val="A5A5A5"/>
+      </a:accent3>
+      <a:accent4>
+        <a:srgbClr val="FFC000"/>
+      </a:accent4>
+      <a:accent5>
+        <a:srgbClr val="5B9BD5"/>
+      </a:accent5>
+      <a:accent6>
+        <a:srgbClr val="70AD47"/>
+      </a:accent6>
+      <a:hlink>
+        <a:srgbClr val="0563C1"/>
+      </a:hlink>
+      <a:folHlink>
+        <a:srgbClr val="954F72"/>
+      </a:folHlink>
+    </a:clrScheme>
+    <a:fontScheme name="Office">
+      <a:majorFont>
+        <a:latin typeface="Calibri Light" panose="020F0302020204030204"/>
+        <a:ea typeface=""/>
+        <a:cs typeface=""/>
+        <a:font script="Jpan" typeface="游ゴシック Light"/>
+        <a:font script="Hang" typeface="맑은 고딕"/>
+        <a:font script="Hans" typeface="等线 Light"/>
+        <a:font script="Hant" typeface="新細明體"/>
+        <a:font script="Arab" typeface="Times New Roman"/>
+        <a:font script="Hebr" typeface="Times New Roman"/>
+        <a:font script="Thai" typeface="Angsana New"/>
+        <a:font script="Ethi" typeface="Nyala"/>
+        <a:font script="Beng" typeface="Vrinda"/>
+        <a:font script="Gujr" typeface="Shruti"/>
+        <a:font script="Khmr" typeface="MoolBoran"/>
+        <a:font script="Knda" typeface="Tunga"/>
+        <a:font script="Guru" typeface="Raavi"/>
+        <a:font script="Cans" typeface="Euphemia"/>
+        <a:font script="Cher" typeface="Plantagenet Cherokee"/>
+        <a:font script="Yiii" typeface="Microsoft Yi Baiti"/>
+        <a:font script="Tibt" typeface="Microsoft Himalaya"/>
+        <a:font script="Thaa" typeface="MV Boli"/>
+        <a:font script="Deva" typeface="Mangal"/>
+        <a:font script="Telu" typeface="Gautami"/>
+        <a:font script="Taml" typeface="Latha"/>
+        <a:font script="Syrc" typeface="Estrangelo Edessa"/>
+        <a:font script="Orya" typeface="Kalinga"/>
+        <a:font script="Mlym" typeface="Kartika"/>
+        <a:font script="Laoo" typeface="DokChampa"/>
+        <a:font script="Sinh" typeface="Iskoola Pota"/>
+        <a:font script="Mong" typeface="Mongolian Baiti"/>
+        <a:font script="Viet" typeface="Times New Roman"/>
+        <a:font script="Uigh" typeface="Microsoft Uighur"/>
+        <a:font script="Geor" typeface="Sylfaen"/>
+        <a:font script="Armn" typeface="Arial"/>
+        <a:font script="Bugi" typeface="Leelawadee UI"/>
+        <a:font script="Bopo" typeface="Microsoft JhengHei"/>
+        <a:font script="Java" typeface="Javanese Text"/>
+        <a:font script="Lisu" typeface="Segoe UI"/>
+        <a:font script="Mymr" typeface="Myanmar Text"/>
+        <a:font script="Nkoo" typeface="Ebrima"/>
+        <a:font script="Olck" typeface="Nirmala UI"/>
+        <a:font script="Osma" typeface="Ebrima"/>
+        <a:font script="Phag" typeface="Phagspa"/>
+        <a:font script="Syrn" typeface="Estrangelo Edessa"/>
+        <a:font script="Syrj" typeface="Estrangelo Edessa"/>
+        <a:font script="Syre" typeface="Estrangelo Edessa"/>
+        <a:font script="Sora" typeface="Nirmala UI"/>
+        <a:font script="Tale" typeface="Microsoft Tai Le"/>
+        <a:font script="Talu" typeface="Microsoft New Tai Lue"/>
+        <a:font script="Tfng" typeface="Ebrima"/>
+      </a:majorFont>
+      <a:minorFont>
+        <a:latin typeface="Calibri" panose="020F0502020204030204"/>
+        <a:ea typeface=""/>
+        <a:cs typeface=""/>
+        <a:font script="Jpan" typeface="游ゴシック"/>
+        <a:font script="Hang" typeface="맑은 고딕"/>
+        <a:font script="Hans" typeface="等线"/>
+        <a:font script="Hant" typeface="新細明體"/>
+        <a:font script="Arab" typeface="Arial"/>
+        <a:font script="Hebr" typeface="Arial"/>
+        <a:font script="Thai" typeface="Cordia New"/>
+        <a:font script="Ethi" typeface="Nyala"/>
+        <a:font script="Beng" typeface="Vrinda"/>
+        <a:font script="Gujr" typeface="Shruti"/>
+        <a:font script="Khmr" typeface="DaunPenh"/>
+        <a:font script="Knda" typeface="Tunga"/>
+        <a:font script="Guru" typeface="Raavi"/>
+        <a:font script="Cans" typeface="Euphemia"/>
+        <a:font script="Cher" typeface="Plantagenet Cherokee"/>
+        <a:font script="Yiii" typeface="Microsoft Yi Baiti"/>
+        <a:font script="Tibt" typeface="Microsoft Himalaya"/>
+        <a:font script="Thaa" typeface="MV Boli"/>
+        <a:font script="Deva" typeface="Mangal"/>
+        <a:font script="Telu" typeface="Gautami"/>
+        <a:font script="Taml" typeface="Latha"/>
+        <a:font script="Syrc" typeface="Estrangelo Edessa"/>
+        <a:font script="Orya" typeface="Kalinga"/>
+        <a:font script="Mlym" typeface="Kartika"/>
+        <a:font script="Laoo" typeface="DokChampa"/>
+        <a:font script="Sinh" typeface="Iskoola Pota"/>
+        <a:font script="Mong" typeface="Mongolian Baiti"/>
+        <a:font script="Viet" typeface="Arial"/>
+        <a:font script="Uigh" typeface="Microsoft Uighur"/>
+        <a:font script="Geor" typeface="Sylfaen"/>
+        <a:font script="Armn" typeface="Arial"/>
+        <a:font script="Bugi" typeface="Leelawadee UI"/>
+        <a:font script="Bopo" typeface="Microsoft JhengHei"/>
+        <a:font script="Java" typeface="Javanese Text"/>
+        <a:font script="Lisu" typeface="Segoe UI"/>
+        <a:font script="Mymr" typeface="Myanmar Text"/>
+        <a:font script="Nkoo" typeface="Ebrima"/>
+        <a:font script="Olck" typeface="Nirmala UI"/>
+        <a:font script="Osma" typeface="Ebrima"/>
+        <a:font script="Phag" typeface="Phagspa"/>
+        <a:font script="Syrn" typeface="Estrangelo Edessa"/>
+        <a:font script="Syrj" typeface="Estrangelo Edessa"/>
+        <a:font script="Syre" typeface="Estrangelo Edessa"/>
+        <a:font script="Sora" typeface="Nirmala UI"/>
+        <a:font script="Tale" typeface="Microsoft Tai Le"/>
+        <a:font script="Talu" typeface="Microsoft New Tai Lue"/>
+        <a:font script="Tfng" typeface="Ebrima"/>
+      </a:minorFont>
+    </a:fontScheme>
+    <a:fmtScheme name="Office">
+      <a:fillStyleLst>
+        <a:solidFill>
+          <a:schemeClr val="phClr"/>
+        </a:solidFill>
+        <a:gradFill rotWithShape="1">
+          <a:gsLst>
+            <a:gs pos="0">
+              <a:schemeClr val="phClr">
+                <a:lumMod val="110000"/>
+                <a:satMod val="105000"/>
+                <a:tint val="67000"/>
+              </a:schemeClr>
+            </a:gs>
+            <a:gs pos="50000">
+              <a:schemeClr val="phClr">
+                <a:lumMod val="105000"/>
+                <a:satMod val="103000"/>
+                <a:tint val="73000"/>
+              </a:schemeClr>
+            </a:gs>
+            <a:gs pos="100000">
+              <a:schemeClr val="phClr">
+                <a:lumMod val="105000"/>
+                <a:satMod val="109000"/>
+                <a:tint val="81000"/>
+              </a:schemeClr>
+            </a:gs>
+          </a:gsLst>
+          <a:lin ang="5400000" scaled="0"/>
+        </a:gradFill>
+        <a:gradFill rotWithShape="1">
+          <a:gsLst>
+            <a:gs pos="0">
+              <a:schemeClr val="phClr">
+                <a:satMod val="103000"/>
+                <a:lumMod val="102000"/>
+                <a:tint val="94000"/>
+              </a:schemeClr>
+            </a:gs>
+            <a:gs pos="50000">
+              <a:schemeClr val="phClr">
+                <a:satMod val="110000"/>
+                <a:lumMod val="100000"/>
+                <a:shade val="100000"/>
+              </a:schemeClr>
+            </a:gs>
+            <a:gs pos="100000">
+              <a:schemeClr val="phClr">
+                <a:lumMod val="99000"/>
+                <a:satMod val="120000"/>
+                <a:shade val="78000"/>
+              </a:schemeClr>
+            </a:gs>
+          </a:gsLst>
+          <a:lin ang="5400000" scaled="0"/>
+        </a:gradFill>
+      </a:fillStyleLst>
+      <a:lnStyleLst>
+        <a:ln w="6350" cap="flat" cmpd="sng" algn="ctr">
+          <a:solidFill>
+            <a:schemeClr val="phClr"/>
+          </a:solidFill>
+          <a:prstDash val="solid"/>
+          <a:miter lim="800000"/>
+        </a:ln>
+        <a:ln w="12700" cap="flat" cmpd="sng" algn="ctr">
+          <a:solidFill>
+            <a:schemeClr val="phClr"/>
+          </a:solidFill>
+          <a:prstDash val="solid"/>
+          <a:miter lim="800000"/>
+        </a:ln>
+        <a:ln w="19050" cap="flat" cmpd="sng" algn="ctr">
+          <a:solidFill>
+            <a:schemeClr val="phClr"/>
+          </a:solidFill>
+          <a:prstDash val="solid"/>
+          <a:miter lim="800000"/>
+        </a:ln>
+      </a:lnStyleLst>
+      <a:effectStyleLst>
+        <a:effectStyle>
+          <a:effectLst/>
+        </a:effectStyle>
+        <a:effectStyle>
+          <a:effectLst/>
+        </a:effectStyle>
+        <a:effectStyle>
+          <a:effectLst>
+            <a:outerShdw blurRad="57150" dist="19050" dir="5400000" algn="ctr" rotWithShape="0">
+              <a:srgbClr val="000000">
+                <a:alpha val="63000"/>
+              </a:srgbClr>
+            </a:outerShdw>
+          </a:effectLst>
+        </a:effectStyle>
+      </a:effectStyleLst>
+      <a:bgFillStyleLst>
+        <a:solidFill>
+          <a:schemeClr val="phClr"/>
+        </a:solidFill>
+        <a:solidFill>
+          <a:schemeClr val="phClr">
+            <a:tint val="95000"/>
+            <a:satMod val="170000"/>
+          </a:schemeClr>
+        </a:solidFill>
+        <a:gradFill rotWithShape="1">
+          <a:gsLst>
+            <a:gs pos="0">
+              <a:schemeClr val="phClr">
+                <a:tint val="93000"/>
+                <a:satMod val="150000"/>
+                <a:shade val="98000"/>
+                <a:lumMod val="102000"/>
+              </a:schemeClr>
+            </a:gs>
+            <a:gs pos="50000">
+              <a:schemeClr val="phClr">
+                <a:tint val="98000"/>
+                <a:satMod val="130000"/>
+                <a:shade val="90000"/>
+                <a:lumMod val="103000"/>
+              </a:schemeClr>
+            </a:gs>
+            <a:gs pos="100000">
+              <a:schemeClr val="phClr">
+                <a:shade val="63000"/>
+                <a:satMod val="120000"/>
+              </a:schemeClr>
+            </a:gs>
+          </a:gsLst>
+          <a:lin ang="5400000" scaled="0"/>
+        </a:gradFill>
+      </a:bgFillStyleLst>
+    </a:fmtScheme>
+  </a:themeElements>
+  <a:objectDefaults/>
+  <a:extraClrSchemeLst/>
+  <a:extLst>
+    <a:ext uri="{05A4C25C-085E-4340-85A3-A5531E510DB2}">
+      <thm15:themeFamily xmlns:thm15="http://schemas.microsoft.com/office/thememl/2012/main" name="Office Theme" id="{62F939B6-93AF-4DB8-9C6B-D6C7DFDC589F}" vid="{4A3C46E8-61CC-4603-A589-7422A47A8E4A}"/>
+    </a:ext>
+  </a:extLst>
+</a:theme>
 </file>
</xml_diff>

<commit_message>
Rocket Singh update Kamlesh
</commit_message>
<xml_diff>
--- a/Manage/Rocket singh.pptx
+++ b/Manage/Rocket singh.pptx
@@ -197,7 +197,7 @@
           <a:p>
             <a:fld id="{292C6D61-626B-4E73-943C-6526CCA7F53A}" type="datetimeFigureOut">
               <a:rPr lang="en-US" smtClean="0"/>
-              <a:t>7/10/2023</a:t>
+              <a:t>7/17/2023</a:t>
             </a:fld>
             <a:endParaRPr lang="en-US"/>
           </a:p>
@@ -698,7 +698,7 @@
           </a:ln>
           <a:extLst>
             <a:ext uri="{C572A759-6A51-4108-AA02-DFA0A04FC94B}">
-              <ma14:wrappingTextBoxFlag xmlns="" xmlns:m="http://schemas.openxmlformats.org/officeDocument/2006/math" xmlns:a14="http://schemas.microsoft.com/office/drawing/2010/main" xmlns:ma14="http://schemas.microsoft.com/office/mac/drawingml/2011/main" val="1"/>
+              <ma14:wrappingTextBoxFlag xmlns:ma14="http://schemas.microsoft.com/office/mac/drawingml/2011/main" xmlns:a14="http://schemas.microsoft.com/office/drawing/2010/main" xmlns:m="http://schemas.openxmlformats.org/officeDocument/2006/math" xmlns="" val="1"/>
             </a:ext>
           </a:extLst>
         </p:spPr>
@@ -756,7 +756,7 @@
           </a:ln>
           <a:extLst>
             <a:ext uri="{C572A759-6A51-4108-AA02-DFA0A04FC94B}">
-              <ma14:wrappingTextBoxFlag xmlns="" xmlns:m="http://schemas.openxmlformats.org/officeDocument/2006/math" xmlns:a14="http://schemas.microsoft.com/office/drawing/2010/main" xmlns:ma14="http://schemas.microsoft.com/office/mac/drawingml/2011/main" val="1"/>
+              <ma14:wrappingTextBoxFlag xmlns:ma14="http://schemas.microsoft.com/office/mac/drawingml/2011/main" xmlns:a14="http://schemas.microsoft.com/office/drawing/2010/main" xmlns:m="http://schemas.openxmlformats.org/officeDocument/2006/math" xmlns="" val="1"/>
             </a:ext>
           </a:extLst>
         </p:spPr>
@@ -793,7 +793,7 @@
           </a:ln>
           <a:extLst>
             <a:ext uri="{C572A759-6A51-4108-AA02-DFA0A04FC94B}">
-              <ma14:wrappingTextBoxFlag xmlns="" xmlns:m="http://schemas.openxmlformats.org/officeDocument/2006/math" xmlns:a14="http://schemas.microsoft.com/office/drawing/2010/main" xmlns:ma14="http://schemas.microsoft.com/office/mac/drawingml/2011/main" val="1"/>
+              <ma14:wrappingTextBoxFlag xmlns:ma14="http://schemas.microsoft.com/office/mac/drawingml/2011/main" xmlns:a14="http://schemas.microsoft.com/office/drawing/2010/main" xmlns:m="http://schemas.openxmlformats.org/officeDocument/2006/math" xmlns="" val="1"/>
             </a:ext>
           </a:extLst>
         </p:spPr>
@@ -3061,7 +3061,7 @@
           </a:ln>
           <a:extLst>
             <a:ext uri="{C572A759-6A51-4108-AA02-DFA0A04FC94B}">
-              <ma14:wrappingTextBoxFlag xmlns="" xmlns:m="http://schemas.openxmlformats.org/officeDocument/2006/math" xmlns:a14="http://schemas.microsoft.com/office/drawing/2010/main" xmlns:ma14="http://schemas.microsoft.com/office/mac/drawingml/2011/main" val="1"/>
+              <ma14:wrappingTextBoxFlag xmlns:ma14="http://schemas.microsoft.com/office/mac/drawingml/2011/main" xmlns:a14="http://schemas.microsoft.com/office/drawing/2010/main" xmlns:m="http://schemas.openxmlformats.org/officeDocument/2006/math" xmlns="" val="1"/>
             </a:ext>
           </a:extLst>
         </p:spPr>
@@ -3085,7 +3085,7 @@
           <a:p>
             <a:r>
               <a:rPr lang="en-US" sz="2400" b="1" dirty="0"/>
-              <a:t>37</a:t>
+              <a:t>30</a:t>
             </a:r>
             <a:r>
               <a:rPr dirty="0"/>
@@ -3113,7 +3113,7 @@
           </a:ln>
           <a:extLst>
             <a:ext uri="{C572A759-6A51-4108-AA02-DFA0A04FC94B}">
-              <ma14:wrappingTextBoxFlag xmlns="" xmlns:m="http://schemas.openxmlformats.org/officeDocument/2006/math" xmlns:a14="http://schemas.microsoft.com/office/drawing/2010/main" xmlns:ma14="http://schemas.microsoft.com/office/mac/drawingml/2011/main" val="1"/>
+              <ma14:wrappingTextBoxFlag xmlns:ma14="http://schemas.microsoft.com/office/mac/drawingml/2011/main" xmlns:a14="http://schemas.microsoft.com/office/drawing/2010/main" xmlns:m="http://schemas.openxmlformats.org/officeDocument/2006/math" xmlns="" val="1"/>
             </a:ext>
           </a:extLst>
         </p:spPr>
@@ -3165,7 +3165,7 @@
           </a:ln>
           <a:extLst>
             <a:ext uri="{C572A759-6A51-4108-AA02-DFA0A04FC94B}">
-              <ma14:wrappingTextBoxFlag xmlns="" xmlns:m="http://schemas.openxmlformats.org/officeDocument/2006/math" xmlns:a14="http://schemas.microsoft.com/office/drawing/2010/main" xmlns:ma14="http://schemas.microsoft.com/office/mac/drawingml/2011/main" val="1"/>
+              <ma14:wrappingTextBoxFlag xmlns:ma14="http://schemas.microsoft.com/office/mac/drawingml/2011/main" xmlns:a14="http://schemas.microsoft.com/office/drawing/2010/main" xmlns:m="http://schemas.openxmlformats.org/officeDocument/2006/math" xmlns="" val="1"/>
             </a:ext>
           </a:extLst>
         </p:spPr>
@@ -3189,7 +3189,7 @@
           <a:p>
             <a:r>
               <a:rPr lang="en-US" sz="2400" b="1" dirty="0"/>
-              <a:t>44</a:t>
+              <a:t>35</a:t>
             </a:r>
             <a:r>
               <a:rPr dirty="0"/>
@@ -3217,7 +3217,7 @@
           </a:ln>
           <a:extLst>
             <a:ext uri="{C572A759-6A51-4108-AA02-DFA0A04FC94B}">
-              <ma14:wrappingTextBoxFlag xmlns="" xmlns:m="http://schemas.openxmlformats.org/officeDocument/2006/math" xmlns:a14="http://schemas.microsoft.com/office/drawing/2010/main" xmlns:ma14="http://schemas.microsoft.com/office/mac/drawingml/2011/main" val="1"/>
+              <ma14:wrappingTextBoxFlag xmlns:ma14="http://schemas.microsoft.com/office/mac/drawingml/2011/main" xmlns:a14="http://schemas.microsoft.com/office/drawing/2010/main" xmlns:m="http://schemas.openxmlformats.org/officeDocument/2006/math" xmlns="" val="1"/>
             </a:ext>
           </a:extLst>
         </p:spPr>
@@ -3269,7 +3269,7 @@
           </a:ln>
           <a:extLst>
             <a:ext uri="{C572A759-6A51-4108-AA02-DFA0A04FC94B}">
-              <ma14:wrappingTextBoxFlag xmlns="" xmlns:m="http://schemas.openxmlformats.org/officeDocument/2006/math" xmlns:a14="http://schemas.microsoft.com/office/drawing/2010/main" xmlns:ma14="http://schemas.microsoft.com/office/mac/drawingml/2011/main" val="1"/>
+              <ma14:wrappingTextBoxFlag xmlns:ma14="http://schemas.microsoft.com/office/mac/drawingml/2011/main" xmlns:a14="http://schemas.microsoft.com/office/drawing/2010/main" xmlns:m="http://schemas.openxmlformats.org/officeDocument/2006/math" xmlns="" val="1"/>
             </a:ext>
           </a:extLst>
         </p:spPr>
@@ -3293,7 +3293,7 @@
           <a:p>
             <a:r>
               <a:rPr lang="en-US" sz="2400" b="1" dirty="0"/>
-              <a:t>1</a:t>
+              <a:t>0</a:t>
             </a:r>
             <a:r>
               <a:rPr dirty="0"/>
@@ -3321,7 +3321,7 @@
           </a:ln>
           <a:extLst>
             <a:ext uri="{C572A759-6A51-4108-AA02-DFA0A04FC94B}">
-              <ma14:wrappingTextBoxFlag xmlns="" xmlns:m="http://schemas.openxmlformats.org/officeDocument/2006/math" xmlns:a14="http://schemas.microsoft.com/office/drawing/2010/main" xmlns:ma14="http://schemas.microsoft.com/office/mac/drawingml/2011/main" val="1"/>
+              <ma14:wrappingTextBoxFlag xmlns:ma14="http://schemas.microsoft.com/office/mac/drawingml/2011/main" xmlns:a14="http://schemas.microsoft.com/office/drawing/2010/main" xmlns:m="http://schemas.openxmlformats.org/officeDocument/2006/math" xmlns="" val="1"/>
             </a:ext>
           </a:extLst>
         </p:spPr>
@@ -3373,7 +3373,7 @@
           </a:ln>
           <a:extLst>
             <a:ext uri="{C572A759-6A51-4108-AA02-DFA0A04FC94B}">
-              <ma14:wrappingTextBoxFlag xmlns="" xmlns:m="http://schemas.openxmlformats.org/officeDocument/2006/math" xmlns:a14="http://schemas.microsoft.com/office/drawing/2010/main" xmlns:ma14="http://schemas.microsoft.com/office/mac/drawingml/2011/main" val="1"/>
+              <ma14:wrappingTextBoxFlag xmlns:ma14="http://schemas.microsoft.com/office/mac/drawingml/2011/main" xmlns:a14="http://schemas.microsoft.com/office/drawing/2010/main" xmlns:m="http://schemas.openxmlformats.org/officeDocument/2006/math" xmlns="" val="1"/>
             </a:ext>
           </a:extLst>
         </p:spPr>
@@ -3397,7 +3397,7 @@
           <a:p>
             <a:r>
               <a:rPr lang="en-US" sz="2400" b="1" dirty="0"/>
-              <a:t>4</a:t>
+              <a:t>2</a:t>
             </a:r>
             <a:r>
               <a:rPr dirty="0"/>
@@ -3425,7 +3425,7 @@
           </a:ln>
           <a:extLst>
             <a:ext uri="{C572A759-6A51-4108-AA02-DFA0A04FC94B}">
-              <ma14:wrappingTextBoxFlag xmlns="" xmlns:m="http://schemas.openxmlformats.org/officeDocument/2006/math" xmlns:a14="http://schemas.microsoft.com/office/drawing/2010/main" xmlns:ma14="http://schemas.microsoft.com/office/mac/drawingml/2011/main" val="1"/>
+              <ma14:wrappingTextBoxFlag xmlns:ma14="http://schemas.microsoft.com/office/mac/drawingml/2011/main" xmlns:a14="http://schemas.microsoft.com/office/drawing/2010/main" xmlns:m="http://schemas.openxmlformats.org/officeDocument/2006/math" xmlns="" val="1"/>
             </a:ext>
           </a:extLst>
         </p:spPr>
@@ -3477,7 +3477,7 @@
           </a:ln>
           <a:extLst>
             <a:ext uri="{C572A759-6A51-4108-AA02-DFA0A04FC94B}">
-              <ma14:wrappingTextBoxFlag xmlns="" xmlns:m="http://schemas.openxmlformats.org/officeDocument/2006/math" xmlns:a14="http://schemas.microsoft.com/office/drawing/2010/main" xmlns:ma14="http://schemas.microsoft.com/office/mac/drawingml/2011/main" val="1"/>
+              <ma14:wrappingTextBoxFlag xmlns:ma14="http://schemas.microsoft.com/office/mac/drawingml/2011/main" xmlns:a14="http://schemas.microsoft.com/office/drawing/2010/main" xmlns:m="http://schemas.openxmlformats.org/officeDocument/2006/math" xmlns="" val="1"/>
             </a:ext>
           </a:extLst>
         </p:spPr>
@@ -3501,7 +3501,7 @@
           <a:p>
             <a:r>
               <a:rPr lang="en-US" sz="2400" b="1" dirty="0"/>
-              <a:t>NA</a:t>
+              <a:t>3</a:t>
             </a:r>
             <a:r>
               <a:rPr dirty="0"/>
@@ -3529,7 +3529,7 @@
           </a:ln>
           <a:extLst>
             <a:ext uri="{C572A759-6A51-4108-AA02-DFA0A04FC94B}">
-              <ma14:wrappingTextBoxFlag xmlns="" xmlns:m="http://schemas.openxmlformats.org/officeDocument/2006/math" xmlns:a14="http://schemas.microsoft.com/office/drawing/2010/main" xmlns:ma14="http://schemas.microsoft.com/office/mac/drawingml/2011/main" val="1"/>
+              <ma14:wrappingTextBoxFlag xmlns:ma14="http://schemas.microsoft.com/office/mac/drawingml/2011/main" xmlns:a14="http://schemas.microsoft.com/office/drawing/2010/main" xmlns:m="http://schemas.openxmlformats.org/officeDocument/2006/math" xmlns="" val="1"/>
             </a:ext>
           </a:extLst>
         </p:spPr>
@@ -3581,7 +3581,7 @@
           </a:ln>
           <a:extLst>
             <a:ext uri="{C572A759-6A51-4108-AA02-DFA0A04FC94B}">
-              <ma14:wrappingTextBoxFlag xmlns="" xmlns:m="http://schemas.openxmlformats.org/officeDocument/2006/math" xmlns:a14="http://schemas.microsoft.com/office/drawing/2010/main" xmlns:ma14="http://schemas.microsoft.com/office/mac/drawingml/2011/main" val="1"/>
+              <ma14:wrappingTextBoxFlag xmlns:ma14="http://schemas.microsoft.com/office/mac/drawingml/2011/main" xmlns:a14="http://schemas.microsoft.com/office/drawing/2010/main" xmlns:m="http://schemas.openxmlformats.org/officeDocument/2006/math" xmlns="" val="1"/>
             </a:ext>
           </a:extLst>
         </p:spPr>
@@ -3605,7 +3605,7 @@
           <a:p>
             <a:r>
               <a:rPr lang="en-US" sz="2400" b="1" dirty="0"/>
-              <a:t>NA</a:t>
+              <a:t>1</a:t>
             </a:r>
             <a:endParaRPr sz="2400" b="1" dirty="0"/>
           </a:p>
@@ -3630,7 +3630,7 @@
           </a:ln>
           <a:extLst>
             <a:ext uri="{C572A759-6A51-4108-AA02-DFA0A04FC94B}">
-              <ma14:wrappingTextBoxFlag xmlns="" xmlns:m="http://schemas.openxmlformats.org/officeDocument/2006/math" xmlns:a14="http://schemas.microsoft.com/office/drawing/2010/main" xmlns:ma14="http://schemas.microsoft.com/office/mac/drawingml/2011/main" val="1"/>
+              <ma14:wrappingTextBoxFlag xmlns:ma14="http://schemas.microsoft.com/office/mac/drawingml/2011/main" xmlns:a14="http://schemas.microsoft.com/office/drawing/2010/main" xmlns:m="http://schemas.openxmlformats.org/officeDocument/2006/math" xmlns="" val="1"/>
             </a:ext>
           </a:extLst>
         </p:spPr>
@@ -3682,7 +3682,7 @@
           </a:ln>
           <a:extLst>
             <a:ext uri="{C572A759-6A51-4108-AA02-DFA0A04FC94B}">
-              <ma14:wrappingTextBoxFlag xmlns="" xmlns:m="http://schemas.openxmlformats.org/officeDocument/2006/math" xmlns:a14="http://schemas.microsoft.com/office/drawing/2010/main" xmlns:ma14="http://schemas.microsoft.com/office/mac/drawingml/2011/main" val="1"/>
+              <ma14:wrappingTextBoxFlag xmlns:ma14="http://schemas.microsoft.com/office/mac/drawingml/2011/main" xmlns:a14="http://schemas.microsoft.com/office/drawing/2010/main" xmlns:m="http://schemas.openxmlformats.org/officeDocument/2006/math" xmlns="" val="1"/>
             </a:ext>
           </a:extLst>
         </p:spPr>
@@ -3706,7 +3706,7 @@
           <a:p>
             <a:r>
               <a:rPr lang="en-US" sz="2400" b="1" dirty="0"/>
-              <a:t>NA</a:t>
+              <a:t>4</a:t>
             </a:r>
             <a:r>
               <a:rPr dirty="0"/>
@@ -3734,7 +3734,7 @@
           </a:ln>
           <a:extLst>
             <a:ext uri="{C572A759-6A51-4108-AA02-DFA0A04FC94B}">
-              <ma14:wrappingTextBoxFlag xmlns="" xmlns:m="http://schemas.openxmlformats.org/officeDocument/2006/math" xmlns:a14="http://schemas.microsoft.com/office/drawing/2010/main" xmlns:ma14="http://schemas.microsoft.com/office/mac/drawingml/2011/main" val="1"/>
+              <ma14:wrappingTextBoxFlag xmlns:ma14="http://schemas.microsoft.com/office/mac/drawingml/2011/main" xmlns:a14="http://schemas.microsoft.com/office/drawing/2010/main" xmlns:m="http://schemas.openxmlformats.org/officeDocument/2006/math" xmlns="" val="1"/>
             </a:ext>
           </a:extLst>
         </p:spPr>
@@ -3786,7 +3786,7 @@
           </a:ln>
           <a:extLst>
             <a:ext uri="{C572A759-6A51-4108-AA02-DFA0A04FC94B}">
-              <ma14:wrappingTextBoxFlag xmlns="" xmlns:m="http://schemas.openxmlformats.org/officeDocument/2006/math" xmlns:a14="http://schemas.microsoft.com/office/drawing/2010/main" xmlns:ma14="http://schemas.microsoft.com/office/mac/drawingml/2011/main" val="1"/>
+              <ma14:wrappingTextBoxFlag xmlns:ma14="http://schemas.microsoft.com/office/mac/drawingml/2011/main" xmlns:a14="http://schemas.microsoft.com/office/drawing/2010/main" xmlns:m="http://schemas.openxmlformats.org/officeDocument/2006/math" xmlns="" val="1"/>
             </a:ext>
           </a:extLst>
         </p:spPr>
@@ -3810,7 +3810,7 @@
           <a:p>
             <a:r>
               <a:rPr lang="en-US" sz="2400" b="1" dirty="0"/>
-              <a:t>NA</a:t>
+              <a:t>3</a:t>
             </a:r>
             <a:r>
               <a:rPr dirty="0"/>
@@ -3838,7 +3838,7 @@
           </a:ln>
           <a:extLst>
             <a:ext uri="{C572A759-6A51-4108-AA02-DFA0A04FC94B}">
-              <ma14:wrappingTextBoxFlag xmlns="" xmlns:m="http://schemas.openxmlformats.org/officeDocument/2006/math" xmlns:a14="http://schemas.microsoft.com/office/drawing/2010/main" xmlns:ma14="http://schemas.microsoft.com/office/mac/drawingml/2011/main" val="1"/>
+              <ma14:wrappingTextBoxFlag xmlns:ma14="http://schemas.microsoft.com/office/mac/drawingml/2011/main" xmlns:a14="http://schemas.microsoft.com/office/drawing/2010/main" xmlns:m="http://schemas.openxmlformats.org/officeDocument/2006/math" xmlns="" val="1"/>
             </a:ext>
           </a:extLst>
         </p:spPr>
@@ -4234,7 +4234,7 @@
                 <a:latin typeface="Avenir Next Regular"/>
                 <a:sym typeface="Helvetica"/>
               </a:rPr>
-              <a:t>JAI BALAJI</a:t>
+              <a:t>KAMLESH MALVIYA</a:t>
             </a:r>
           </a:p>
         </p:txBody>
@@ -4531,7 +4531,22 @@
                 <a:latin typeface="Avenir Next Regular"/>
                 <a:sym typeface="Helvetica"/>
               </a:rPr>
-              <a:t>Alpha vs Demolishers</a:t>
+              <a:t>Alpha vs </a:t>
+            </a:r>
+            <a:r>
+              <a:rPr kumimoji="0" lang="en-US" sz="2000" b="1" i="0" u="sng" strike="noStrike" cap="none" spc="0" normalizeH="0" baseline="0" dirty="0">
+                <a:ln>
+                  <a:noFill/>
+                </a:ln>
+                <a:solidFill>
+                  <a:srgbClr val="7EBF00"/>
+                </a:solidFill>
+                <a:effectLst/>
+                <a:uFillTx/>
+                <a:latin typeface="Avenir Next Regular"/>
+                <a:sym typeface="Helvetica"/>
+              </a:rPr>
+              <a:t>Mustangs</a:t>
             </a:r>
           </a:p>
           <a:p>
@@ -4564,47 +4579,11 @@
                 <a:latin typeface="Avenir Next Regular"/>
                 <a:sym typeface="Helvetica"/>
               </a:rPr>
-              <a:t>09-Jul-2023</a:t>
+              <a:t>16-Jul-2023</a:t>
             </a:r>
           </a:p>
         </p:txBody>
       </p:sp>
-      <p:pic>
-        <p:nvPicPr>
-          <p:cNvPr id="7" name="Picture 6">
-            <a:extLst>
-              <a:ext uri="{FF2B5EF4-FFF2-40B4-BE49-F238E27FC236}">
-                <a16:creationId xmlns:a16="http://schemas.microsoft.com/office/drawing/2014/main" id="{DA4EC876-85AB-D99C-585A-F715174154D4}"/>
-              </a:ext>
-            </a:extLst>
-          </p:cNvPr>
-          <p:cNvPicPr>
-            <a:picLocks noChangeAspect="1"/>
-          </p:cNvPicPr>
-          <p:nvPr/>
-        </p:nvPicPr>
-        <p:blipFill>
-          <a:blip r:embed="rId12" cstate="print">
-            <a:extLst>
-              <a:ext uri="{28A0092B-C50C-407E-A947-70E740481C1C}">
-                <a14:useLocalDpi xmlns:a14="http://schemas.microsoft.com/office/drawing/2010/main" val="0"/>
-              </a:ext>
-            </a:extLst>
-          </a:blip>
-          <a:stretch>
-            <a:fillRect/>
-          </a:stretch>
-        </p:blipFill>
-        <p:spPr>
-          <a:xfrm>
-            <a:off x="4824326" y="1918059"/>
-            <a:ext cx="2554380" cy="2530483"/>
-          </a:xfrm>
-          <a:prstGeom prst="flowChartConnector">
-            <a:avLst/>
-          </a:prstGeom>
-        </p:spPr>
-      </p:pic>
       <p:sp>
         <p:nvSpPr>
           <p:cNvPr id="6" name="TextBox 52">
@@ -4630,7 +4609,175 @@
           </a:ln>
           <a:extLst>
             <a:ext uri="{C572A759-6A51-4108-AA02-DFA0A04FC94B}">
-              <ma14:wrappingTextBoxFlag xmlns="" xmlns:m="http://schemas.openxmlformats.org/officeDocument/2006/math" xmlns:a14="http://schemas.microsoft.com/office/drawing/2010/main" xmlns:ma14="http://schemas.microsoft.com/office/mac/drawingml/2011/main" val="1"/>
+              <ma14:wrappingTextBoxFlag xmlns:ma14="http://schemas.microsoft.com/office/mac/drawingml/2011/main" xmlns:a14="http://schemas.microsoft.com/office/drawing/2010/main" xmlns:m="http://schemas.openxmlformats.org/officeDocument/2006/math" xmlns="" val="1"/>
+            </a:ext>
+          </a:extLst>
+        </p:spPr>
+        <p:txBody>
+          <a:bodyPr wrap="square" lIns="45718" tIns="45718" rIns="45718" bIns="45718">
+            <a:spAutoFit/>
+          </a:bodyPr>
+          <a:lstStyle>
+            <a:lvl1pPr algn="ctr">
+              <a:defRPr sz="2000">
+                <a:solidFill>
+                  <a:srgbClr val="FFFFFF"/>
+                </a:solidFill>
+                <a:latin typeface="Avenir Next Regular"/>
+                <a:ea typeface="Avenir Next Regular"/>
+                <a:cs typeface="Avenir Next Regular"/>
+                <a:sym typeface="Avenir Next Regular"/>
+              </a:defRPr>
+            </a:lvl1pPr>
+          </a:lstStyle>
+          <a:p>
+            <a:r>
+              <a:rPr lang="en-US" sz="800" dirty="0">
+                <a:solidFill>
+                  <a:srgbClr val="002060"/>
+                </a:solidFill>
+              </a:rPr>
+              <a:t>RIVERVALE ROCKETS CRICKET CLUB RIVERVALE ROCKETS CRICKET CLUB RIVERVALE ROCKETS CRICKET CLUB RIVERVALE ROCKETS CRICKET CLUB RIVERVALE ROCKETS CRICKET CLUB RIVERVALE ROCKETS CRICKET CLUB RIVERVALE ROCKETS CRICKET CLUB RIVERVALE ROCKETS CRICKET CLUB     </a:t>
+            </a:r>
+          </a:p>
+          <a:p>
+            <a:pPr algn="l"/>
+            <a:r>
+              <a:rPr lang="en-US" sz="800" dirty="0">
+                <a:solidFill>
+                  <a:srgbClr val="002060"/>
+                </a:solidFill>
+              </a:rPr>
+              <a:t>    </a:t>
+            </a:r>
+          </a:p>
+          <a:p>
+            <a:pPr algn="l"/>
+            <a:r>
+              <a:rPr lang="en-US" sz="800" dirty="0">
+                <a:solidFill>
+                  <a:srgbClr val="002060"/>
+                </a:solidFill>
+              </a:rPr>
+              <a:t> </a:t>
+            </a:r>
+          </a:p>
+          <a:p>
+            <a:pPr algn="l"/>
+            <a:r>
+              <a:rPr lang="en-US" sz="800" dirty="0">
+                <a:solidFill>
+                  <a:srgbClr val="002060"/>
+                </a:solidFill>
+              </a:rPr>
+              <a:t>  </a:t>
+            </a:r>
+          </a:p>
+          <a:p>
+            <a:pPr algn="l"/>
+            <a:r>
+              <a:rPr lang="en-US" sz="800" dirty="0">
+                <a:solidFill>
+                  <a:srgbClr val="002060"/>
+                </a:solidFill>
+              </a:rPr>
+              <a:t>    </a:t>
+            </a:r>
+          </a:p>
+          <a:p>
+            <a:pPr algn="l"/>
+            <a:r>
+              <a:rPr lang="en-US" sz="800" dirty="0">
+                <a:solidFill>
+                  <a:srgbClr val="002060"/>
+                </a:solidFill>
+              </a:rPr>
+              <a:t>   </a:t>
+            </a:r>
+          </a:p>
+          <a:p>
+            <a:pPr algn="l"/>
+            <a:r>
+              <a:rPr lang="en-US" sz="800" dirty="0">
+                <a:solidFill>
+                  <a:srgbClr val="002060"/>
+                </a:solidFill>
+              </a:rPr>
+              <a:t>     </a:t>
+            </a:r>
+          </a:p>
+          <a:p>
+            <a:pPr algn="l"/>
+            <a:endParaRPr lang="en-US" sz="800" dirty="0">
+              <a:solidFill>
+                <a:srgbClr val="002060"/>
+              </a:solidFill>
+            </a:endParaRPr>
+          </a:p>
+        </p:txBody>
+      </p:sp>
+      <p:pic>
+        <p:nvPicPr>
+          <p:cNvPr id="4" name="Picture 3">
+            <a:extLst>
+              <a:ext uri="{FF2B5EF4-FFF2-40B4-BE49-F238E27FC236}">
+                <a16:creationId xmlns:a16="http://schemas.microsoft.com/office/drawing/2014/main" id="{E4513432-C8D4-5A85-48FB-1C8201511DA7}"/>
+              </a:ext>
+            </a:extLst>
+          </p:cNvPr>
+          <p:cNvPicPr>
+            <a:picLocks noChangeAspect="1"/>
+          </p:cNvPicPr>
+          <p:nvPr/>
+        </p:nvPicPr>
+        <p:blipFill>
+          <a:blip r:embed="rId12" cstate="print">
+            <a:extLst>
+              <a:ext uri="{28A0092B-C50C-407E-A947-70E740481C1C}">
+                <a14:useLocalDpi xmlns:a14="http://schemas.microsoft.com/office/drawing/2010/main" val="0"/>
+              </a:ext>
+            </a:extLst>
+          </a:blip>
+          <a:stretch>
+            <a:fillRect/>
+          </a:stretch>
+        </p:blipFill>
+        <p:spPr>
+          <a:xfrm>
+            <a:off x="4826506" y="1932302"/>
+            <a:ext cx="2535819" cy="2533210"/>
+          </a:xfrm>
+          <a:prstGeom prst="flowChartConnector">
+            <a:avLst/>
+          </a:prstGeom>
+        </p:spPr>
+      </p:pic>
+      <p:sp>
+        <p:nvSpPr>
+          <p:cNvPr id="8" name="TextBox 52">
+            <a:extLst>
+              <a:ext uri="{FF2B5EF4-FFF2-40B4-BE49-F238E27FC236}">
+                <a16:creationId xmlns:a16="http://schemas.microsoft.com/office/drawing/2014/main" id="{AAD59D44-19B1-4BD5-5F1A-193769281E8F}"/>
+              </a:ext>
+            </a:extLst>
+          </p:cNvPr>
+          <p:cNvSpPr txBox="1"/>
+          <p:nvPr/>
+        </p:nvSpPr>
+        <p:spPr>
+          <a:xfrm>
+            <a:off x="53385" y="-33994"/>
+            <a:ext cx="12192000" cy="1077214"/>
+          </a:xfrm>
+          <a:prstGeom prst="rect">
+            <a:avLst/>
+          </a:prstGeom>
+          <a:ln w="12700">
+            <a:miter lim="400000"/>
+          </a:ln>
+          <a:extLst>
+            <a:ext uri="{C572A759-6A51-4108-AA02-DFA0A04FC94B}">
+              <ma14:wrappingTextBoxFlag xmlns:ma14="http://schemas.microsoft.com/office/mac/drawingml/2011/main" xmlns:a14="http://schemas.microsoft.com/office/drawing/2010/main" xmlns:m="http://schemas.openxmlformats.org/officeDocument/2006/math" xmlns="" val="1"/>
             </a:ext>
           </a:extLst>
         </p:spPr>
@@ -6559,6 +6706,49 @@
                                         <p:cTn id="171" dur="600"/>
                                         <p:tgtEl>
                                           <p:spTgt spid="6"/>
+                                        </p:tgtEl>
+                                      </p:cBhvr>
+                                    </p:animEffect>
+                                  </p:childTnLst>
+                                </p:cTn>
+                              </p:par>
+                            </p:childTnLst>
+                          </p:cTn>
+                        </p:par>
+                        <p:par>
+                          <p:cTn id="172" fill="hold">
+                            <p:stCondLst>
+                              <p:cond delay="25200"/>
+                            </p:stCondLst>
+                            <p:childTnLst>
+                              <p:par>
+                                <p:cTn id="173" presetID="22" presetClass="entr" presetSubtype="1" fill="hold" grpId="0" nodeType="afterEffect">
+                                  <p:stCondLst>
+                                    <p:cond delay="0"/>
+                                  </p:stCondLst>
+                                  <p:iterate>
+                                    <p:tmAbs val="0"/>
+                                  </p:iterate>
+                                  <p:childTnLst>
+                                    <p:set>
+                                      <p:cBhvr>
+                                        <p:cTn id="174" fill="hold"/>
+                                        <p:tgtEl>
+                                          <p:spTgt spid="8"/>
+                                        </p:tgtEl>
+                                        <p:attrNameLst>
+                                          <p:attrName>style.visibility</p:attrName>
+                                        </p:attrNameLst>
+                                      </p:cBhvr>
+                                      <p:to>
+                                        <p:strVal val="visible"/>
+                                      </p:to>
+                                    </p:set>
+                                    <p:animEffect transition="in" filter="wipe(up)">
+                                      <p:cBhvr>
+                                        <p:cTn id="175" dur="600"/>
+                                        <p:tgtEl>
+                                          <p:spTgt spid="8"/>
                                         </p:tgtEl>
                                       </p:cBhvr>
                                     </p:animEffect>
@@ -6635,6 +6825,7 @@
       <p:bldP spid="1131" grpId="0" animBg="1" advAuto="0"/>
       <p:bldP spid="1132" grpId="0" animBg="1" advAuto="0"/>
       <p:bldP spid="6" grpId="0" animBg="1" advAuto="0"/>
+      <p:bldP spid="8" grpId="0" animBg="1" advAuto="0"/>
     </p:bldLst>
   </p:timing>
 </p:sld>

</xml_diff>

<commit_message>
20230730 Mom - Mandeep
</commit_message>
<xml_diff>
--- a/Manage/Rocket singh.pptx
+++ b/Manage/Rocket singh.pptx
@@ -197,7 +197,7 @@
           <a:p>
             <a:fld id="{292C6D61-626B-4E73-943C-6526CCA7F53A}" type="datetimeFigureOut">
               <a:rPr lang="en-US" smtClean="0"/>
-              <a:t>7/24/2023</a:t>
+              <a:t>7/30/2023</a:t>
             </a:fld>
             <a:endParaRPr lang="en-US"/>
           </a:p>
@@ -698,7 +698,7 @@
           </a:ln>
           <a:extLst>
             <a:ext uri="{C572A759-6A51-4108-AA02-DFA0A04FC94B}">
-              <ma14:wrappingTextBoxFlag xmlns="" xmlns:m="http://schemas.openxmlformats.org/officeDocument/2006/math" xmlns:a14="http://schemas.microsoft.com/office/drawing/2010/main" xmlns:ma14="http://schemas.microsoft.com/office/mac/drawingml/2011/main" val="1"/>
+              <ma14:wrappingTextBoxFlag xmlns:ma14="http://schemas.microsoft.com/office/mac/drawingml/2011/main" xmlns:a14="http://schemas.microsoft.com/office/drawing/2010/main" xmlns:m="http://schemas.openxmlformats.org/officeDocument/2006/math" xmlns="" val="1"/>
             </a:ext>
           </a:extLst>
         </p:spPr>
@@ -756,7 +756,7 @@
           </a:ln>
           <a:extLst>
             <a:ext uri="{C572A759-6A51-4108-AA02-DFA0A04FC94B}">
-              <ma14:wrappingTextBoxFlag xmlns="" xmlns:m="http://schemas.openxmlformats.org/officeDocument/2006/math" xmlns:a14="http://schemas.microsoft.com/office/drawing/2010/main" xmlns:ma14="http://schemas.microsoft.com/office/mac/drawingml/2011/main" val="1"/>
+              <ma14:wrappingTextBoxFlag xmlns:ma14="http://schemas.microsoft.com/office/mac/drawingml/2011/main" xmlns:a14="http://schemas.microsoft.com/office/drawing/2010/main" xmlns:m="http://schemas.openxmlformats.org/officeDocument/2006/math" xmlns="" val="1"/>
             </a:ext>
           </a:extLst>
         </p:spPr>
@@ -793,7 +793,7 @@
           </a:ln>
           <a:extLst>
             <a:ext uri="{C572A759-6A51-4108-AA02-DFA0A04FC94B}">
-              <ma14:wrappingTextBoxFlag xmlns="" xmlns:m="http://schemas.openxmlformats.org/officeDocument/2006/math" xmlns:a14="http://schemas.microsoft.com/office/drawing/2010/main" xmlns:ma14="http://schemas.microsoft.com/office/mac/drawingml/2011/main" val="1"/>
+              <ma14:wrappingTextBoxFlag xmlns:ma14="http://schemas.microsoft.com/office/mac/drawingml/2011/main" xmlns:a14="http://schemas.microsoft.com/office/drawing/2010/main" xmlns:m="http://schemas.openxmlformats.org/officeDocument/2006/math" xmlns="" val="1"/>
             </a:ext>
           </a:extLst>
         </p:spPr>
@@ -2190,7 +2190,7 @@
           <a:lstStyle/>
           <a:p>
             <a:pPr algn="ctr"/>
-            <a:endParaRPr/>
+            <a:endParaRPr dirty="0"/>
           </a:p>
         </p:txBody>
       </p:sp>
@@ -3061,7 +3061,7 @@
           </a:ln>
           <a:extLst>
             <a:ext uri="{C572A759-6A51-4108-AA02-DFA0A04FC94B}">
-              <ma14:wrappingTextBoxFlag xmlns="" xmlns:m="http://schemas.openxmlformats.org/officeDocument/2006/math" xmlns:a14="http://schemas.microsoft.com/office/drawing/2010/main" xmlns:ma14="http://schemas.microsoft.com/office/mac/drawingml/2011/main" val="1"/>
+              <ma14:wrappingTextBoxFlag xmlns:ma14="http://schemas.microsoft.com/office/mac/drawingml/2011/main" xmlns:a14="http://schemas.microsoft.com/office/drawing/2010/main" xmlns:m="http://schemas.openxmlformats.org/officeDocument/2006/math" xmlns="" val="1"/>
             </a:ext>
           </a:extLst>
         </p:spPr>
@@ -3085,7 +3085,7 @@
           <a:p>
             <a:r>
               <a:rPr lang="en-US" sz="2400" b="1" dirty="0"/>
-              <a:t>6</a:t>
+              <a:t>15</a:t>
             </a:r>
             <a:r>
               <a:rPr dirty="0"/>
@@ -3113,7 +3113,7 @@
           </a:ln>
           <a:extLst>
             <a:ext uri="{C572A759-6A51-4108-AA02-DFA0A04FC94B}">
-              <ma14:wrappingTextBoxFlag xmlns="" xmlns:m="http://schemas.openxmlformats.org/officeDocument/2006/math" xmlns:a14="http://schemas.microsoft.com/office/drawing/2010/main" xmlns:ma14="http://schemas.microsoft.com/office/mac/drawingml/2011/main" val="1"/>
+              <ma14:wrappingTextBoxFlag xmlns:ma14="http://schemas.microsoft.com/office/mac/drawingml/2011/main" xmlns:a14="http://schemas.microsoft.com/office/drawing/2010/main" xmlns:m="http://schemas.openxmlformats.org/officeDocument/2006/math" xmlns="" val="1"/>
             </a:ext>
           </a:extLst>
         </p:spPr>
@@ -3165,7 +3165,7 @@
           </a:ln>
           <a:extLst>
             <a:ext uri="{C572A759-6A51-4108-AA02-DFA0A04FC94B}">
-              <ma14:wrappingTextBoxFlag xmlns="" xmlns:m="http://schemas.openxmlformats.org/officeDocument/2006/math" xmlns:a14="http://schemas.microsoft.com/office/drawing/2010/main" xmlns:ma14="http://schemas.microsoft.com/office/mac/drawingml/2011/main" val="1"/>
+              <ma14:wrappingTextBoxFlag xmlns:ma14="http://schemas.microsoft.com/office/mac/drawingml/2011/main" xmlns:a14="http://schemas.microsoft.com/office/drawing/2010/main" xmlns:m="http://schemas.openxmlformats.org/officeDocument/2006/math" xmlns="" val="1"/>
             </a:ext>
           </a:extLst>
         </p:spPr>
@@ -3189,7 +3189,7 @@
           <a:p>
             <a:r>
               <a:rPr lang="en-US" sz="2400" b="1" dirty="0"/>
-              <a:t>5</a:t>
+              <a:t>9</a:t>
             </a:r>
             <a:r>
               <a:rPr dirty="0"/>
@@ -3217,7 +3217,7 @@
           </a:ln>
           <a:extLst>
             <a:ext uri="{C572A759-6A51-4108-AA02-DFA0A04FC94B}">
-              <ma14:wrappingTextBoxFlag xmlns="" xmlns:m="http://schemas.openxmlformats.org/officeDocument/2006/math" xmlns:a14="http://schemas.microsoft.com/office/drawing/2010/main" xmlns:ma14="http://schemas.microsoft.com/office/mac/drawingml/2011/main" val="1"/>
+              <ma14:wrappingTextBoxFlag xmlns:ma14="http://schemas.microsoft.com/office/mac/drawingml/2011/main" xmlns:a14="http://schemas.microsoft.com/office/drawing/2010/main" xmlns:m="http://schemas.openxmlformats.org/officeDocument/2006/math" xmlns="" val="1"/>
             </a:ext>
           </a:extLst>
         </p:spPr>
@@ -3269,7 +3269,7 @@
           </a:ln>
           <a:extLst>
             <a:ext uri="{C572A759-6A51-4108-AA02-DFA0A04FC94B}">
-              <ma14:wrappingTextBoxFlag xmlns="" xmlns:m="http://schemas.openxmlformats.org/officeDocument/2006/math" xmlns:a14="http://schemas.microsoft.com/office/drawing/2010/main" xmlns:ma14="http://schemas.microsoft.com/office/mac/drawingml/2011/main" val="1"/>
+              <ma14:wrappingTextBoxFlag xmlns:ma14="http://schemas.microsoft.com/office/mac/drawingml/2011/main" xmlns:a14="http://schemas.microsoft.com/office/drawing/2010/main" xmlns:m="http://schemas.openxmlformats.org/officeDocument/2006/math" xmlns="" val="1"/>
             </a:ext>
           </a:extLst>
         </p:spPr>
@@ -3293,7 +3293,7 @@
           <a:p>
             <a:r>
               <a:rPr lang="en-US" sz="2400" b="1" dirty="0"/>
-              <a:t>0</a:t>
+              <a:t>1</a:t>
             </a:r>
             <a:r>
               <a:rPr dirty="0"/>
@@ -3321,7 +3321,7 @@
           </a:ln>
           <a:extLst>
             <a:ext uri="{C572A759-6A51-4108-AA02-DFA0A04FC94B}">
-              <ma14:wrappingTextBoxFlag xmlns="" xmlns:m="http://schemas.openxmlformats.org/officeDocument/2006/math" xmlns:a14="http://schemas.microsoft.com/office/drawing/2010/main" xmlns:ma14="http://schemas.microsoft.com/office/mac/drawingml/2011/main" val="1"/>
+              <ma14:wrappingTextBoxFlag xmlns:ma14="http://schemas.microsoft.com/office/mac/drawingml/2011/main" xmlns:a14="http://schemas.microsoft.com/office/drawing/2010/main" xmlns:m="http://schemas.openxmlformats.org/officeDocument/2006/math" xmlns="" val="1"/>
             </a:ext>
           </a:extLst>
         </p:spPr>
@@ -3373,7 +3373,7 @@
           </a:ln>
           <a:extLst>
             <a:ext uri="{C572A759-6A51-4108-AA02-DFA0A04FC94B}">
-              <ma14:wrappingTextBoxFlag xmlns="" xmlns:m="http://schemas.openxmlformats.org/officeDocument/2006/math" xmlns:a14="http://schemas.microsoft.com/office/drawing/2010/main" xmlns:ma14="http://schemas.microsoft.com/office/mac/drawingml/2011/main" val="1"/>
+              <ma14:wrappingTextBoxFlag xmlns:ma14="http://schemas.microsoft.com/office/mac/drawingml/2011/main" xmlns:a14="http://schemas.microsoft.com/office/drawing/2010/main" xmlns:m="http://schemas.openxmlformats.org/officeDocument/2006/math" xmlns="" val="1"/>
             </a:ext>
           </a:extLst>
         </p:spPr>
@@ -3425,7 +3425,7 @@
           </a:ln>
           <a:extLst>
             <a:ext uri="{C572A759-6A51-4108-AA02-DFA0A04FC94B}">
-              <ma14:wrappingTextBoxFlag xmlns="" xmlns:m="http://schemas.openxmlformats.org/officeDocument/2006/math" xmlns:a14="http://schemas.microsoft.com/office/drawing/2010/main" xmlns:ma14="http://schemas.microsoft.com/office/mac/drawingml/2011/main" val="1"/>
+              <ma14:wrappingTextBoxFlag xmlns:ma14="http://schemas.microsoft.com/office/mac/drawingml/2011/main" xmlns:a14="http://schemas.microsoft.com/office/drawing/2010/main" xmlns:m="http://schemas.openxmlformats.org/officeDocument/2006/math" xmlns="" val="1"/>
             </a:ext>
           </a:extLst>
         </p:spPr>
@@ -3467,7 +3467,7 @@
         <p:spPr>
           <a:xfrm>
             <a:off x="9345600" y="1426757"/>
-            <a:ext cx="1127215" cy="461661"/>
+            <a:ext cx="1127215" cy="400105"/>
           </a:xfrm>
           <a:prstGeom prst="rect">
             <a:avLst/>
@@ -3477,7 +3477,7 @@
           </a:ln>
           <a:extLst>
             <a:ext uri="{C572A759-6A51-4108-AA02-DFA0A04FC94B}">
-              <ma14:wrappingTextBoxFlag xmlns="" xmlns:m="http://schemas.openxmlformats.org/officeDocument/2006/math" xmlns:a14="http://schemas.microsoft.com/office/drawing/2010/main" xmlns:ma14="http://schemas.microsoft.com/office/mac/drawingml/2011/main" val="1"/>
+              <ma14:wrappingTextBoxFlag xmlns:ma14="http://schemas.microsoft.com/office/mac/drawingml/2011/main" xmlns:a14="http://schemas.microsoft.com/office/drawing/2010/main" xmlns:m="http://schemas.openxmlformats.org/officeDocument/2006/math" xmlns="" val="1"/>
             </a:ext>
           </a:extLst>
         </p:spPr>
@@ -3500,8 +3500,8 @@
           </a:lstStyle>
           <a:p>
             <a:r>
-              <a:rPr lang="en-US" sz="2400" b="1" dirty="0"/>
-              <a:t>5.1</a:t>
+              <a:rPr lang="en-US" dirty="0"/>
+              <a:t>6</a:t>
             </a:r>
             <a:r>
               <a:rPr dirty="0"/>
@@ -3529,7 +3529,7 @@
           </a:ln>
           <a:extLst>
             <a:ext uri="{C572A759-6A51-4108-AA02-DFA0A04FC94B}">
-              <ma14:wrappingTextBoxFlag xmlns="" xmlns:m="http://schemas.openxmlformats.org/officeDocument/2006/math" xmlns:a14="http://schemas.microsoft.com/office/drawing/2010/main" xmlns:ma14="http://schemas.microsoft.com/office/mac/drawingml/2011/main" val="1"/>
+              <ma14:wrappingTextBoxFlag xmlns:ma14="http://schemas.microsoft.com/office/mac/drawingml/2011/main" xmlns:a14="http://schemas.microsoft.com/office/drawing/2010/main" xmlns:m="http://schemas.openxmlformats.org/officeDocument/2006/math" xmlns="" val="1"/>
             </a:ext>
           </a:extLst>
         </p:spPr>
@@ -3581,7 +3581,7 @@
           </a:ln>
           <a:extLst>
             <a:ext uri="{C572A759-6A51-4108-AA02-DFA0A04FC94B}">
-              <ma14:wrappingTextBoxFlag xmlns="" xmlns:m="http://schemas.openxmlformats.org/officeDocument/2006/math" xmlns:a14="http://schemas.microsoft.com/office/drawing/2010/main" xmlns:ma14="http://schemas.microsoft.com/office/mac/drawingml/2011/main" val="1"/>
+              <ma14:wrappingTextBoxFlag xmlns:ma14="http://schemas.microsoft.com/office/mac/drawingml/2011/main" xmlns:a14="http://schemas.microsoft.com/office/drawing/2010/main" xmlns:m="http://schemas.openxmlformats.org/officeDocument/2006/math" xmlns="" val="1"/>
             </a:ext>
           </a:extLst>
         </p:spPr>
@@ -3605,7 +3605,7 @@
           <a:p>
             <a:r>
               <a:rPr lang="en-US" sz="2400" b="1" dirty="0"/>
-              <a:t>1</a:t>
+              <a:t>3</a:t>
             </a:r>
             <a:endParaRPr sz="2400" b="1" dirty="0"/>
           </a:p>
@@ -3630,7 +3630,7 @@
           </a:ln>
           <a:extLst>
             <a:ext uri="{C572A759-6A51-4108-AA02-DFA0A04FC94B}">
-              <ma14:wrappingTextBoxFlag xmlns="" xmlns:m="http://schemas.openxmlformats.org/officeDocument/2006/math" xmlns:a14="http://schemas.microsoft.com/office/drawing/2010/main" xmlns:ma14="http://schemas.microsoft.com/office/mac/drawingml/2011/main" val="1"/>
+              <ma14:wrappingTextBoxFlag xmlns:ma14="http://schemas.microsoft.com/office/mac/drawingml/2011/main" xmlns:a14="http://schemas.microsoft.com/office/drawing/2010/main" xmlns:m="http://schemas.openxmlformats.org/officeDocument/2006/math" xmlns="" val="1"/>
             </a:ext>
           </a:extLst>
         </p:spPr>
@@ -3682,7 +3682,7 @@
           </a:ln>
           <a:extLst>
             <a:ext uri="{C572A759-6A51-4108-AA02-DFA0A04FC94B}">
-              <ma14:wrappingTextBoxFlag xmlns="" xmlns:m="http://schemas.openxmlformats.org/officeDocument/2006/math" xmlns:a14="http://schemas.microsoft.com/office/drawing/2010/main" xmlns:ma14="http://schemas.microsoft.com/office/mac/drawingml/2011/main" val="1"/>
+              <ma14:wrappingTextBoxFlag xmlns:ma14="http://schemas.microsoft.com/office/mac/drawingml/2011/main" xmlns:a14="http://schemas.microsoft.com/office/drawing/2010/main" xmlns:m="http://schemas.openxmlformats.org/officeDocument/2006/math" xmlns="" val="1"/>
             </a:ext>
           </a:extLst>
         </p:spPr>
@@ -3706,7 +3706,7 @@
           <a:p>
             <a:r>
               <a:rPr lang="en-US" sz="2400" b="1" dirty="0"/>
-              <a:t>11</a:t>
+              <a:t>12</a:t>
             </a:r>
             <a:r>
               <a:rPr dirty="0"/>
@@ -3734,7 +3734,7 @@
           </a:ln>
           <a:extLst>
             <a:ext uri="{C572A759-6A51-4108-AA02-DFA0A04FC94B}">
-              <ma14:wrappingTextBoxFlag xmlns="" xmlns:m="http://schemas.openxmlformats.org/officeDocument/2006/math" xmlns:a14="http://schemas.microsoft.com/office/drawing/2010/main" xmlns:ma14="http://schemas.microsoft.com/office/mac/drawingml/2011/main" val="1"/>
+              <ma14:wrappingTextBoxFlag xmlns:ma14="http://schemas.microsoft.com/office/mac/drawingml/2011/main" xmlns:a14="http://schemas.microsoft.com/office/drawing/2010/main" xmlns:m="http://schemas.openxmlformats.org/officeDocument/2006/math" xmlns="" val="1"/>
             </a:ext>
           </a:extLst>
         </p:spPr>
@@ -3786,7 +3786,7 @@
           </a:ln>
           <a:extLst>
             <a:ext uri="{C572A759-6A51-4108-AA02-DFA0A04FC94B}">
-              <ma14:wrappingTextBoxFlag xmlns="" xmlns:m="http://schemas.openxmlformats.org/officeDocument/2006/math" xmlns:a14="http://schemas.microsoft.com/office/drawing/2010/main" xmlns:ma14="http://schemas.microsoft.com/office/mac/drawingml/2011/main" val="1"/>
+              <ma14:wrappingTextBoxFlag xmlns:ma14="http://schemas.microsoft.com/office/mac/drawingml/2011/main" xmlns:a14="http://schemas.microsoft.com/office/drawing/2010/main" xmlns:m="http://schemas.openxmlformats.org/officeDocument/2006/math" xmlns="" val="1"/>
             </a:ext>
           </a:extLst>
         </p:spPr>
@@ -3838,7 +3838,7 @@
           </a:ln>
           <a:extLst>
             <a:ext uri="{C572A759-6A51-4108-AA02-DFA0A04FC94B}">
-              <ma14:wrappingTextBoxFlag xmlns="" xmlns:m="http://schemas.openxmlformats.org/officeDocument/2006/math" xmlns:a14="http://schemas.microsoft.com/office/drawing/2010/main" xmlns:ma14="http://schemas.microsoft.com/office/mac/drawingml/2011/main" val="1"/>
+              <ma14:wrappingTextBoxFlag xmlns:ma14="http://schemas.microsoft.com/office/mac/drawingml/2011/main" xmlns:a14="http://schemas.microsoft.com/office/drawing/2010/main" xmlns:m="http://schemas.openxmlformats.org/officeDocument/2006/math" xmlns="" val="1"/>
             </a:ext>
           </a:extLst>
         </p:spPr>
@@ -4174,7 +4174,7 @@
         <p:spPr>
           <a:xfrm>
             <a:off x="4701238" y="4805097"/>
-            <a:ext cx="2975049" cy="523216"/>
+            <a:ext cx="3111072" cy="523216"/>
           </a:xfrm>
           <a:prstGeom prst="rect">
             <a:avLst/>
@@ -4234,7 +4234,7 @@
                 <a:latin typeface="Avenir Next Regular"/>
                 <a:sym typeface="Helvetica"/>
               </a:rPr>
-              <a:t>KAMLESH MALVIYA</a:t>
+              <a:t>MANDEEP JAGOTRA</a:t>
             </a:r>
           </a:p>
         </p:txBody>
@@ -4531,7 +4531,7 @@
                 <a:latin typeface="Avenir Next Regular"/>
                 <a:sym typeface="Helvetica"/>
               </a:rPr>
-              <a:t>Stunners vs </a:t>
+              <a:t>Adra Sakka vs </a:t>
             </a:r>
             <a:r>
               <a:rPr kumimoji="0" lang="en-US" sz="2000" b="1" i="0" u="sng" strike="noStrike" cap="none" spc="0" normalizeH="0" baseline="0" dirty="0">
@@ -4546,7 +4546,7 @@
                 <a:latin typeface="Avenir Next Regular"/>
                 <a:sym typeface="Helvetica"/>
               </a:rPr>
-              <a:t>Mustangs</a:t>
+              <a:t>Demolishers</a:t>
             </a:r>
           </a:p>
           <a:p>
@@ -4567,16 +4567,6 @@
               <a:tabLst/>
             </a:pPr>
             <a:r>
-              <a:rPr lang="en-US" sz="1600" b="1" dirty="0">
-                <a:solidFill>
-                  <a:srgbClr val="7EBF00"/>
-                </a:solidFill>
-                <a:latin typeface="Avenir Next Regular"/>
-                <a:sym typeface="Helvetica"/>
-              </a:rPr>
-              <a:t>23</a:t>
-            </a:r>
-            <a:r>
               <a:rPr kumimoji="0" lang="en-US" sz="1600" b="1" i="0" u="none" strike="noStrike" cap="none" spc="0" normalizeH="0" baseline="0" dirty="0">
                 <a:ln>
                   <a:noFill/>
@@ -4589,7 +4579,7 @@
                 <a:latin typeface="Avenir Next Regular"/>
                 <a:sym typeface="Helvetica"/>
               </a:rPr>
-              <a:t>-Jul-2023</a:t>
+              <a:t>30-Jul-2023</a:t>
             </a:r>
           </a:p>
         </p:txBody>
@@ -4619,7 +4609,7 @@
           </a:ln>
           <a:extLst>
             <a:ext uri="{C572A759-6A51-4108-AA02-DFA0A04FC94B}">
-              <ma14:wrappingTextBoxFlag xmlns="" xmlns:m="http://schemas.openxmlformats.org/officeDocument/2006/math" xmlns:a14="http://schemas.microsoft.com/office/drawing/2010/main" xmlns:ma14="http://schemas.microsoft.com/office/mac/drawingml/2011/main" val="1"/>
+              <ma14:wrappingTextBoxFlag xmlns:ma14="http://schemas.microsoft.com/office/mac/drawingml/2011/main" xmlns:a14="http://schemas.microsoft.com/office/drawing/2010/main" xmlns:m="http://schemas.openxmlformats.org/officeDocument/2006/math" xmlns="" val="1"/>
             </a:ext>
           </a:extLst>
         </p:spPr>
@@ -4726,42 +4716,6 @@
           </a:p>
         </p:txBody>
       </p:sp>
-      <p:pic>
-        <p:nvPicPr>
-          <p:cNvPr id="4" name="Picture 3">
-            <a:extLst>
-              <a:ext uri="{FF2B5EF4-FFF2-40B4-BE49-F238E27FC236}">
-                <a16:creationId xmlns:a16="http://schemas.microsoft.com/office/drawing/2014/main" id="{E4513432-C8D4-5A85-48FB-1C8201511DA7}"/>
-              </a:ext>
-            </a:extLst>
-          </p:cNvPr>
-          <p:cNvPicPr>
-            <a:picLocks noChangeAspect="1"/>
-          </p:cNvPicPr>
-          <p:nvPr/>
-        </p:nvPicPr>
-        <p:blipFill>
-          <a:blip r:embed="rId12" cstate="print">
-            <a:extLst>
-              <a:ext uri="{28A0092B-C50C-407E-A947-70E740481C1C}">
-                <a14:useLocalDpi xmlns:a14="http://schemas.microsoft.com/office/drawing/2010/main" val="0"/>
-              </a:ext>
-            </a:extLst>
-          </a:blip>
-          <a:stretch>
-            <a:fillRect/>
-          </a:stretch>
-        </p:blipFill>
-        <p:spPr>
-          <a:xfrm>
-            <a:off x="4826506" y="1932302"/>
-            <a:ext cx="2535819" cy="2533210"/>
-          </a:xfrm>
-          <a:prstGeom prst="flowChartConnector">
-            <a:avLst/>
-          </a:prstGeom>
-        </p:spPr>
-      </p:pic>
       <p:sp>
         <p:nvSpPr>
           <p:cNvPr id="8" name="TextBox 52">
@@ -4787,7 +4741,7 @@
           </a:ln>
           <a:extLst>
             <a:ext uri="{C572A759-6A51-4108-AA02-DFA0A04FC94B}">
-              <ma14:wrappingTextBoxFlag xmlns="" xmlns:m="http://schemas.openxmlformats.org/officeDocument/2006/math" xmlns:a14="http://schemas.microsoft.com/office/drawing/2010/main" xmlns:ma14="http://schemas.microsoft.com/office/mac/drawingml/2011/main" val="1"/>
+              <ma14:wrappingTextBoxFlag xmlns:ma14="http://schemas.microsoft.com/office/mac/drawingml/2011/main" xmlns:a14="http://schemas.microsoft.com/office/drawing/2010/main" xmlns:m="http://schemas.openxmlformats.org/officeDocument/2006/math" xmlns="" val="1"/>
             </a:ext>
           </a:extLst>
         </p:spPr>
@@ -4894,6 +4848,42 @@
           </a:p>
         </p:txBody>
       </p:sp>
+      <p:pic>
+        <p:nvPicPr>
+          <p:cNvPr id="10" name="Picture 9">
+            <a:extLst>
+              <a:ext uri="{FF2B5EF4-FFF2-40B4-BE49-F238E27FC236}">
+                <a16:creationId xmlns:a16="http://schemas.microsoft.com/office/drawing/2014/main" id="{83F8BAA1-9A63-C934-EE2E-F96CE1A031D0}"/>
+              </a:ext>
+            </a:extLst>
+          </p:cNvPr>
+          <p:cNvPicPr>
+            <a:picLocks noChangeAspect="1"/>
+          </p:cNvPicPr>
+          <p:nvPr/>
+        </p:nvPicPr>
+        <p:blipFill>
+          <a:blip r:embed="rId12" cstate="print">
+            <a:extLst>
+              <a:ext uri="{28A0092B-C50C-407E-A947-70E740481C1C}">
+                <a14:useLocalDpi xmlns:a14="http://schemas.microsoft.com/office/drawing/2010/main" val="0"/>
+              </a:ext>
+            </a:extLst>
+          </a:blip>
+          <a:stretch>
+            <a:fillRect/>
+          </a:stretch>
+        </p:blipFill>
+        <p:spPr>
+          <a:xfrm>
+            <a:off x="4858766" y="1893487"/>
+            <a:ext cx="2485605" cy="2573591"/>
+          </a:xfrm>
+          <a:prstGeom prst="flowChartConnector">
+            <a:avLst/>
+          </a:prstGeom>
+        </p:spPr>
+      </p:pic>
     </p:spTree>
     <p:extLst>
       <p:ext uri="{BB962C8B-B14F-4D97-AF65-F5344CB8AC3E}">

</xml_diff>

<commit_message>
20230809 Mom Ravi RBI
</commit_message>
<xml_diff>
--- a/Manage/Rocket singh.pptx
+++ b/Manage/Rocket singh.pptx
@@ -197,7 +197,7 @@
           <a:p>
             <a:fld id="{292C6D61-626B-4E73-943C-6526CCA7F53A}" type="datetimeFigureOut">
               <a:rPr lang="en-US" smtClean="0"/>
-              <a:t>8/5/2023</a:t>
+              <a:t>8/9/2023</a:t>
             </a:fld>
             <a:endParaRPr lang="en-US"/>
           </a:p>
@@ -3085,7 +3085,7 @@
           <a:p>
             <a:r>
               <a:rPr lang="en-US" sz="2400" b="1" dirty="0"/>
-              <a:t>72</a:t>
+              <a:t>8</a:t>
             </a:r>
             <a:r>
               <a:rPr dirty="0"/>
@@ -3189,7 +3189,7 @@
           <a:p>
             <a:r>
               <a:rPr lang="en-US" sz="2400" b="1" dirty="0"/>
-              <a:t>33</a:t>
+              <a:t>17</a:t>
             </a:r>
             <a:r>
               <a:rPr dirty="0"/>
@@ -3293,7 +3293,7 @@
           <a:p>
             <a:r>
               <a:rPr lang="en-US" sz="2400" b="1" dirty="0"/>
-              <a:t>3</a:t>
+              <a:t>0</a:t>
             </a:r>
             <a:r>
               <a:rPr dirty="0"/>
@@ -3397,7 +3397,7 @@
           <a:p>
             <a:r>
               <a:rPr lang="en-US" sz="2400" b="1" dirty="0"/>
-              <a:t>8</a:t>
+              <a:t>0</a:t>
             </a:r>
             <a:r>
               <a:rPr dirty="0"/>
@@ -3605,7 +3605,7 @@
           <a:p>
             <a:r>
               <a:rPr lang="en-US" sz="2400" b="1" dirty="0"/>
-              <a:t>0</a:t>
+              <a:t>1</a:t>
             </a:r>
             <a:endParaRPr sz="2400" b="1" dirty="0"/>
           </a:p>
@@ -3706,7 +3706,7 @@
           <a:p>
             <a:r>
               <a:rPr lang="en-US" sz="2400" b="1" dirty="0"/>
-              <a:t>14</a:t>
+              <a:t>4</a:t>
             </a:r>
             <a:endParaRPr dirty="0"/>
           </a:p>
@@ -3773,7 +3773,7 @@
         <p:spPr>
           <a:xfrm>
             <a:off x="9383210" y="4716414"/>
-            <a:ext cx="1127214" cy="461661"/>
+            <a:ext cx="1127214" cy="400105"/>
           </a:xfrm>
           <a:prstGeom prst="rect">
             <a:avLst/>
@@ -3806,8 +3806,8 @@
           </a:lstStyle>
           <a:p>
             <a:r>
-              <a:rPr lang="en-US" sz="2400" b="1" dirty="0"/>
-              <a:t>2</a:t>
+              <a:rPr lang="en-US" dirty="0"/>
+              <a:t>4</a:t>
             </a:r>
             <a:r>
               <a:rPr dirty="0"/>
@@ -4231,7 +4231,7 @@
                 <a:latin typeface="Avenir Next Regular"/>
                 <a:sym typeface="Helvetica"/>
               </a:rPr>
-              <a:t>ROHIT KOUL</a:t>
+              <a:t>RAVI BHARATHI</a:t>
             </a:r>
           </a:p>
         </p:txBody>
@@ -4543,7 +4543,7 @@
                 <a:latin typeface="Avenir Next Regular"/>
                 <a:sym typeface="Helvetica"/>
               </a:rPr>
-              <a:t>Demolishers</a:t>
+              <a:t>Mighty Tigers</a:t>
             </a:r>
           </a:p>
           <a:p>
@@ -4564,17 +4564,7 @@
               <a:tabLst/>
             </a:pPr>
             <a:r>
-              <a:rPr lang="en-US" sz="1600" b="1" dirty="0">
-                <a:solidFill>
-                  <a:srgbClr val="7EBF00"/>
-                </a:solidFill>
-                <a:latin typeface="Avenir Next Regular"/>
-                <a:sym typeface="Helvetica"/>
-              </a:rPr>
-              <a:t>6</a:t>
-            </a:r>
-            <a:r>
-              <a:rPr kumimoji="0" lang="en-US" sz="1600" b="1" i="0" u="none" strike="noStrike" cap="none" spc="0" normalizeH="0" baseline="0" dirty="0">
+              <a:rPr kumimoji="0" lang="en-US" sz="1600" b="1" i="0" u="none" strike="noStrike" cap="none" spc="0" normalizeH="0" baseline="0">
                 <a:ln>
                   <a:noFill/>
                 </a:ln>
@@ -4586,8 +4576,20 @@
                 <a:latin typeface="Avenir Next Regular"/>
                 <a:sym typeface="Helvetica"/>
               </a:rPr>
-              <a:t>-Aug-2023</a:t>
+              <a:t>9-Aug-2023</a:t>
             </a:r>
+            <a:endParaRPr kumimoji="0" lang="en-US" sz="1600" b="1" i="0" u="none" strike="noStrike" cap="none" spc="0" normalizeH="0" baseline="0" dirty="0">
+              <a:ln>
+                <a:noFill/>
+              </a:ln>
+              <a:solidFill>
+                <a:srgbClr val="7EBF00"/>
+              </a:solidFill>
+              <a:effectLst/>
+              <a:uFillTx/>
+              <a:latin typeface="Avenir Next Regular"/>
+              <a:sym typeface="Helvetica"/>
+            </a:endParaRPr>
           </a:p>
         </p:txBody>
       </p:sp>
@@ -4857,10 +4859,10 @@
       </p:sp>
       <p:pic>
         <p:nvPicPr>
-          <p:cNvPr id="9" name="Picture 8">
+          <p:cNvPr id="4" name="Picture 3">
             <a:extLst>
               <a:ext uri="{FF2B5EF4-FFF2-40B4-BE49-F238E27FC236}">
-                <a16:creationId xmlns:a16="http://schemas.microsoft.com/office/drawing/2014/main" id="{056A3D60-5AB8-2AD0-C0EC-83FA3BC9656D}"/>
+                <a16:creationId xmlns:a16="http://schemas.microsoft.com/office/drawing/2014/main" id="{5117F6CC-9BE9-8F83-E1B3-E9E9F1C72A99}"/>
               </a:ext>
             </a:extLst>
           </p:cNvPr>
@@ -4870,7 +4872,7 @@
           <p:nvPr/>
         </p:nvPicPr>
         <p:blipFill>
-          <a:blip r:embed="rId12" cstate="print">
+          <a:blip r:embed="rId12">
             <a:extLst>
               <a:ext uri="{28A0092B-C50C-407E-A947-70E740481C1C}">
                 <a14:useLocalDpi xmlns:a14="http://schemas.microsoft.com/office/drawing/2010/main" val="0"/>
@@ -4883,8 +4885,8 @@
         </p:blipFill>
         <p:spPr>
           <a:xfrm>
-            <a:off x="4767050" y="1857592"/>
-            <a:ext cx="2657900" cy="2644055"/>
+            <a:off x="4819367" y="1939514"/>
+            <a:ext cx="2501170" cy="2519458"/>
           </a:xfrm>
           <a:prstGeom prst="flowChartConnector">
             <a:avLst/>

</xml_diff>

<commit_message>
20230813 Adra Sakka vs Astonishers  -MoM
</commit_message>
<xml_diff>
--- a/Manage/Rocket singh.pptx
+++ b/Manage/Rocket singh.pptx
@@ -197,7 +197,7 @@
           <a:p>
             <a:fld id="{292C6D61-626B-4E73-943C-6526CCA7F53A}" type="datetimeFigureOut">
               <a:rPr lang="en-US" smtClean="0"/>
-              <a:t>8/12/2023</a:t>
+              <a:t>8/13/2023</a:t>
             </a:fld>
             <a:endParaRPr lang="en-US"/>
           </a:p>
@@ -698,7 +698,7 @@
           </a:ln>
           <a:extLst>
             <a:ext uri="{C572A759-6A51-4108-AA02-DFA0A04FC94B}">
-              <ma14:wrappingTextBoxFlag xmlns="" xmlns:m="http://schemas.openxmlformats.org/officeDocument/2006/math" xmlns:a14="http://schemas.microsoft.com/office/drawing/2010/main" xmlns:ma14="http://schemas.microsoft.com/office/mac/drawingml/2011/main" val="1"/>
+              <ma14:wrappingTextBoxFlag xmlns:ma14="http://schemas.microsoft.com/office/mac/drawingml/2011/main" xmlns:a14="http://schemas.microsoft.com/office/drawing/2010/main" xmlns:m="http://schemas.openxmlformats.org/officeDocument/2006/math" xmlns="" val="1"/>
             </a:ext>
           </a:extLst>
         </p:spPr>
@@ -756,7 +756,7 @@
           </a:ln>
           <a:extLst>
             <a:ext uri="{C572A759-6A51-4108-AA02-DFA0A04FC94B}">
-              <ma14:wrappingTextBoxFlag xmlns="" xmlns:m="http://schemas.openxmlformats.org/officeDocument/2006/math" xmlns:a14="http://schemas.microsoft.com/office/drawing/2010/main" xmlns:ma14="http://schemas.microsoft.com/office/mac/drawingml/2011/main" val="1"/>
+              <ma14:wrappingTextBoxFlag xmlns:ma14="http://schemas.microsoft.com/office/mac/drawingml/2011/main" xmlns:a14="http://schemas.microsoft.com/office/drawing/2010/main" xmlns:m="http://schemas.openxmlformats.org/officeDocument/2006/math" xmlns="" val="1"/>
             </a:ext>
           </a:extLst>
         </p:spPr>
@@ -793,7 +793,7 @@
           </a:ln>
           <a:extLst>
             <a:ext uri="{C572A759-6A51-4108-AA02-DFA0A04FC94B}">
-              <ma14:wrappingTextBoxFlag xmlns="" xmlns:m="http://schemas.openxmlformats.org/officeDocument/2006/math" xmlns:a14="http://schemas.microsoft.com/office/drawing/2010/main" xmlns:ma14="http://schemas.microsoft.com/office/mac/drawingml/2011/main" val="1"/>
+              <ma14:wrappingTextBoxFlag xmlns:ma14="http://schemas.microsoft.com/office/mac/drawingml/2011/main" xmlns:a14="http://schemas.microsoft.com/office/drawing/2010/main" xmlns:m="http://schemas.openxmlformats.org/officeDocument/2006/math" xmlns="" val="1"/>
             </a:ext>
           </a:extLst>
         </p:spPr>
@@ -3061,7 +3061,7 @@
           </a:ln>
           <a:extLst>
             <a:ext uri="{C572A759-6A51-4108-AA02-DFA0A04FC94B}">
-              <ma14:wrappingTextBoxFlag xmlns="" xmlns:m="http://schemas.openxmlformats.org/officeDocument/2006/math" xmlns:a14="http://schemas.microsoft.com/office/drawing/2010/main" xmlns:ma14="http://schemas.microsoft.com/office/mac/drawingml/2011/main" val="1"/>
+              <ma14:wrappingTextBoxFlag xmlns:ma14="http://schemas.microsoft.com/office/mac/drawingml/2011/main" xmlns:a14="http://schemas.microsoft.com/office/drawing/2010/main" xmlns:m="http://schemas.openxmlformats.org/officeDocument/2006/math" xmlns="" val="1"/>
             </a:ext>
           </a:extLst>
         </p:spPr>
@@ -3085,7 +3085,7 @@
           <a:p>
             <a:r>
               <a:rPr lang="en-US" sz="2400" b="1" dirty="0"/>
-              <a:t>70</a:t>
+              <a:t>39</a:t>
             </a:r>
             <a:r>
               <a:rPr dirty="0"/>
@@ -3113,7 +3113,7 @@
           </a:ln>
           <a:extLst>
             <a:ext uri="{C572A759-6A51-4108-AA02-DFA0A04FC94B}">
-              <ma14:wrappingTextBoxFlag xmlns="" xmlns:m="http://schemas.openxmlformats.org/officeDocument/2006/math" xmlns:a14="http://schemas.microsoft.com/office/drawing/2010/main" xmlns:ma14="http://schemas.microsoft.com/office/mac/drawingml/2011/main" val="1"/>
+              <ma14:wrappingTextBoxFlag xmlns:ma14="http://schemas.microsoft.com/office/mac/drawingml/2011/main" xmlns:a14="http://schemas.microsoft.com/office/drawing/2010/main" xmlns:m="http://schemas.openxmlformats.org/officeDocument/2006/math" xmlns="" val="1"/>
             </a:ext>
           </a:extLst>
         </p:spPr>
@@ -3165,7 +3165,7 @@
           </a:ln>
           <a:extLst>
             <a:ext uri="{C572A759-6A51-4108-AA02-DFA0A04FC94B}">
-              <ma14:wrappingTextBoxFlag xmlns="" xmlns:m="http://schemas.openxmlformats.org/officeDocument/2006/math" xmlns:a14="http://schemas.microsoft.com/office/drawing/2010/main" xmlns:ma14="http://schemas.microsoft.com/office/mac/drawingml/2011/main" val="1"/>
+              <ma14:wrappingTextBoxFlag xmlns:ma14="http://schemas.microsoft.com/office/mac/drawingml/2011/main" xmlns:a14="http://schemas.microsoft.com/office/drawing/2010/main" xmlns:m="http://schemas.openxmlformats.org/officeDocument/2006/math" xmlns="" val="1"/>
             </a:ext>
           </a:extLst>
         </p:spPr>
@@ -3189,7 +3189,7 @@
           <a:p>
             <a:r>
               <a:rPr lang="en-US" sz="2400" b="1" dirty="0"/>
-              <a:t>55</a:t>
+              <a:t>23</a:t>
             </a:r>
             <a:r>
               <a:rPr dirty="0"/>
@@ -3217,7 +3217,7 @@
           </a:ln>
           <a:extLst>
             <a:ext uri="{C572A759-6A51-4108-AA02-DFA0A04FC94B}">
-              <ma14:wrappingTextBoxFlag xmlns="" xmlns:m="http://schemas.openxmlformats.org/officeDocument/2006/math" xmlns:a14="http://schemas.microsoft.com/office/drawing/2010/main" xmlns:ma14="http://schemas.microsoft.com/office/mac/drawingml/2011/main" val="1"/>
+              <ma14:wrappingTextBoxFlag xmlns:ma14="http://schemas.microsoft.com/office/mac/drawingml/2011/main" xmlns:a14="http://schemas.microsoft.com/office/drawing/2010/main" xmlns:m="http://schemas.openxmlformats.org/officeDocument/2006/math" xmlns="" val="1"/>
             </a:ext>
           </a:extLst>
         </p:spPr>
@@ -3269,7 +3269,7 @@
           </a:ln>
           <a:extLst>
             <a:ext uri="{C572A759-6A51-4108-AA02-DFA0A04FC94B}">
-              <ma14:wrappingTextBoxFlag xmlns="" xmlns:m="http://schemas.openxmlformats.org/officeDocument/2006/math" xmlns:a14="http://schemas.microsoft.com/office/drawing/2010/main" xmlns:ma14="http://schemas.microsoft.com/office/mac/drawingml/2011/main" val="1"/>
+              <ma14:wrappingTextBoxFlag xmlns:ma14="http://schemas.microsoft.com/office/mac/drawingml/2011/main" xmlns:a14="http://schemas.microsoft.com/office/drawing/2010/main" xmlns:m="http://schemas.openxmlformats.org/officeDocument/2006/math" xmlns="" val="1"/>
             </a:ext>
           </a:extLst>
         </p:spPr>
@@ -3293,7 +3293,7 @@
           <a:p>
             <a:r>
               <a:rPr lang="en-US" sz="2400" b="1" dirty="0"/>
-              <a:t>6</a:t>
+              <a:t>3</a:t>
             </a:r>
             <a:r>
               <a:rPr dirty="0"/>
@@ -3321,7 +3321,7 @@
           </a:ln>
           <a:extLst>
             <a:ext uri="{C572A759-6A51-4108-AA02-DFA0A04FC94B}">
-              <ma14:wrappingTextBoxFlag xmlns="" xmlns:m="http://schemas.openxmlformats.org/officeDocument/2006/math" xmlns:a14="http://schemas.microsoft.com/office/drawing/2010/main" xmlns:ma14="http://schemas.microsoft.com/office/mac/drawingml/2011/main" val="1"/>
+              <ma14:wrappingTextBoxFlag xmlns:ma14="http://schemas.microsoft.com/office/mac/drawingml/2011/main" xmlns:a14="http://schemas.microsoft.com/office/drawing/2010/main" xmlns:m="http://schemas.openxmlformats.org/officeDocument/2006/math" xmlns="" val="1"/>
             </a:ext>
           </a:extLst>
         </p:spPr>
@@ -3373,7 +3373,7 @@
           </a:ln>
           <a:extLst>
             <a:ext uri="{C572A759-6A51-4108-AA02-DFA0A04FC94B}">
-              <ma14:wrappingTextBoxFlag xmlns="" xmlns:m="http://schemas.openxmlformats.org/officeDocument/2006/math" xmlns:a14="http://schemas.microsoft.com/office/drawing/2010/main" xmlns:ma14="http://schemas.microsoft.com/office/mac/drawingml/2011/main" val="1"/>
+              <ma14:wrappingTextBoxFlag xmlns:ma14="http://schemas.microsoft.com/office/mac/drawingml/2011/main" xmlns:a14="http://schemas.microsoft.com/office/drawing/2010/main" xmlns:m="http://schemas.openxmlformats.org/officeDocument/2006/math" xmlns="" val="1"/>
             </a:ext>
           </a:extLst>
         </p:spPr>
@@ -3397,7 +3397,7 @@
           <a:p>
             <a:r>
               <a:rPr lang="en-US" sz="2400" b="1" dirty="0"/>
-              <a:t>4</a:t>
+              <a:t>3</a:t>
             </a:r>
             <a:r>
               <a:rPr dirty="0"/>
@@ -3425,7 +3425,7 @@
           </a:ln>
           <a:extLst>
             <a:ext uri="{C572A759-6A51-4108-AA02-DFA0A04FC94B}">
-              <ma14:wrappingTextBoxFlag xmlns="" xmlns:m="http://schemas.openxmlformats.org/officeDocument/2006/math" xmlns:a14="http://schemas.microsoft.com/office/drawing/2010/main" xmlns:ma14="http://schemas.microsoft.com/office/mac/drawingml/2011/main" val="1"/>
+              <ma14:wrappingTextBoxFlag xmlns:ma14="http://schemas.microsoft.com/office/mac/drawingml/2011/main" xmlns:a14="http://schemas.microsoft.com/office/drawing/2010/main" xmlns:m="http://schemas.openxmlformats.org/officeDocument/2006/math" xmlns="" val="1"/>
             </a:ext>
           </a:extLst>
         </p:spPr>
@@ -3477,7 +3477,7 @@
           </a:ln>
           <a:extLst>
             <a:ext uri="{C572A759-6A51-4108-AA02-DFA0A04FC94B}">
-              <ma14:wrappingTextBoxFlag xmlns="" xmlns:m="http://schemas.openxmlformats.org/officeDocument/2006/math" xmlns:a14="http://schemas.microsoft.com/office/drawing/2010/main" xmlns:ma14="http://schemas.microsoft.com/office/mac/drawingml/2011/main" val="1"/>
+              <ma14:wrappingTextBoxFlag xmlns:ma14="http://schemas.microsoft.com/office/mac/drawingml/2011/main" xmlns:a14="http://schemas.microsoft.com/office/drawing/2010/main" xmlns:m="http://schemas.openxmlformats.org/officeDocument/2006/math" xmlns="" val="1"/>
             </a:ext>
           </a:extLst>
         </p:spPr>
@@ -3501,7 +3501,7 @@
           <a:p>
             <a:r>
               <a:rPr lang="en-US" sz="2400" b="1" dirty="0"/>
-              <a:t>-</a:t>
+              <a:t>3</a:t>
             </a:r>
             <a:r>
               <a:rPr dirty="0"/>
@@ -3529,7 +3529,7 @@
           </a:ln>
           <a:extLst>
             <a:ext uri="{C572A759-6A51-4108-AA02-DFA0A04FC94B}">
-              <ma14:wrappingTextBoxFlag xmlns="" xmlns:m="http://schemas.openxmlformats.org/officeDocument/2006/math" xmlns:a14="http://schemas.microsoft.com/office/drawing/2010/main" xmlns:ma14="http://schemas.microsoft.com/office/mac/drawingml/2011/main" val="1"/>
+              <ma14:wrappingTextBoxFlag xmlns:ma14="http://schemas.microsoft.com/office/mac/drawingml/2011/main" xmlns:a14="http://schemas.microsoft.com/office/drawing/2010/main" xmlns:m="http://schemas.openxmlformats.org/officeDocument/2006/math" xmlns="" val="1"/>
             </a:ext>
           </a:extLst>
         </p:spPr>
@@ -3581,7 +3581,7 @@
           </a:ln>
           <a:extLst>
             <a:ext uri="{C572A759-6A51-4108-AA02-DFA0A04FC94B}">
-              <ma14:wrappingTextBoxFlag xmlns="" xmlns:m="http://schemas.openxmlformats.org/officeDocument/2006/math" xmlns:a14="http://schemas.microsoft.com/office/drawing/2010/main" xmlns:ma14="http://schemas.microsoft.com/office/mac/drawingml/2011/main" val="1"/>
+              <ma14:wrappingTextBoxFlag xmlns:ma14="http://schemas.microsoft.com/office/mac/drawingml/2011/main" xmlns:a14="http://schemas.microsoft.com/office/drawing/2010/main" xmlns:m="http://schemas.openxmlformats.org/officeDocument/2006/math" xmlns="" val="1"/>
             </a:ext>
           </a:extLst>
         </p:spPr>
@@ -3605,7 +3605,7 @@
           <a:p>
             <a:r>
               <a:rPr lang="en-US" sz="2400" b="1" dirty="0"/>
-              <a:t>-</a:t>
+              <a:t>0</a:t>
             </a:r>
             <a:endParaRPr sz="2400" b="1" dirty="0"/>
           </a:p>
@@ -3630,7 +3630,7 @@
           </a:ln>
           <a:extLst>
             <a:ext uri="{C572A759-6A51-4108-AA02-DFA0A04FC94B}">
-              <ma14:wrappingTextBoxFlag xmlns="" xmlns:m="http://schemas.openxmlformats.org/officeDocument/2006/math" xmlns:a14="http://schemas.microsoft.com/office/drawing/2010/main" xmlns:ma14="http://schemas.microsoft.com/office/mac/drawingml/2011/main" val="1"/>
+              <ma14:wrappingTextBoxFlag xmlns:ma14="http://schemas.microsoft.com/office/mac/drawingml/2011/main" xmlns:a14="http://schemas.microsoft.com/office/drawing/2010/main" xmlns:m="http://schemas.openxmlformats.org/officeDocument/2006/math" xmlns="" val="1"/>
             </a:ext>
           </a:extLst>
         </p:spPr>
@@ -3682,7 +3682,7 @@
           </a:ln>
           <a:extLst>
             <a:ext uri="{C572A759-6A51-4108-AA02-DFA0A04FC94B}">
-              <ma14:wrappingTextBoxFlag xmlns="" xmlns:m="http://schemas.openxmlformats.org/officeDocument/2006/math" xmlns:a14="http://schemas.microsoft.com/office/drawing/2010/main" xmlns:ma14="http://schemas.microsoft.com/office/mac/drawingml/2011/main" val="1"/>
+              <ma14:wrappingTextBoxFlag xmlns:ma14="http://schemas.microsoft.com/office/mac/drawingml/2011/main" xmlns:a14="http://schemas.microsoft.com/office/drawing/2010/main" xmlns:m="http://schemas.openxmlformats.org/officeDocument/2006/math" xmlns="" val="1"/>
             </a:ext>
           </a:extLst>
         </p:spPr>
@@ -3706,7 +3706,7 @@
           <a:p>
             <a:r>
               <a:rPr lang="en-US" sz="2400" b="1" dirty="0"/>
-              <a:t>-</a:t>
+              <a:t>8</a:t>
             </a:r>
             <a:endParaRPr dirty="0"/>
           </a:p>
@@ -3731,7 +3731,7 @@
           </a:ln>
           <a:extLst>
             <a:ext uri="{C572A759-6A51-4108-AA02-DFA0A04FC94B}">
-              <ma14:wrappingTextBoxFlag xmlns="" xmlns:m="http://schemas.openxmlformats.org/officeDocument/2006/math" xmlns:a14="http://schemas.microsoft.com/office/drawing/2010/main" xmlns:ma14="http://schemas.microsoft.com/office/mac/drawingml/2011/main" val="1"/>
+              <ma14:wrappingTextBoxFlag xmlns:ma14="http://schemas.microsoft.com/office/mac/drawingml/2011/main" xmlns:a14="http://schemas.microsoft.com/office/drawing/2010/main" xmlns:m="http://schemas.openxmlformats.org/officeDocument/2006/math" xmlns="" val="1"/>
             </a:ext>
           </a:extLst>
         </p:spPr>
@@ -3783,7 +3783,7 @@
           </a:ln>
           <a:extLst>
             <a:ext uri="{C572A759-6A51-4108-AA02-DFA0A04FC94B}">
-              <ma14:wrappingTextBoxFlag xmlns="" xmlns:m="http://schemas.openxmlformats.org/officeDocument/2006/math" xmlns:a14="http://schemas.microsoft.com/office/drawing/2010/main" xmlns:ma14="http://schemas.microsoft.com/office/mac/drawingml/2011/main" val="1"/>
+              <ma14:wrappingTextBoxFlag xmlns:ma14="http://schemas.microsoft.com/office/mac/drawingml/2011/main" xmlns:a14="http://schemas.microsoft.com/office/drawing/2010/main" xmlns:m="http://schemas.openxmlformats.org/officeDocument/2006/math" xmlns="" val="1"/>
             </a:ext>
           </a:extLst>
         </p:spPr>
@@ -3807,7 +3807,7 @@
           <a:p>
             <a:r>
               <a:rPr lang="en-US" sz="2400" b="1" dirty="0"/>
-              <a:t>-</a:t>
+              <a:t>1</a:t>
             </a:r>
             <a:r>
               <a:rPr dirty="0"/>
@@ -3835,7 +3835,7 @@
           </a:ln>
           <a:extLst>
             <a:ext uri="{C572A759-6A51-4108-AA02-DFA0A04FC94B}">
-              <ma14:wrappingTextBoxFlag xmlns="" xmlns:m="http://schemas.openxmlformats.org/officeDocument/2006/math" xmlns:a14="http://schemas.microsoft.com/office/drawing/2010/main" xmlns:ma14="http://schemas.microsoft.com/office/mac/drawingml/2011/main" val="1"/>
+              <ma14:wrappingTextBoxFlag xmlns:ma14="http://schemas.microsoft.com/office/mac/drawingml/2011/main" xmlns:a14="http://schemas.microsoft.com/office/drawing/2010/main" xmlns:m="http://schemas.openxmlformats.org/officeDocument/2006/math" xmlns="" val="1"/>
             </a:ext>
           </a:extLst>
         </p:spPr>
@@ -4226,7 +4226,7 @@
                 <a:latin typeface="Avenir Next Regular"/>
                 <a:sym typeface="Helvetica"/>
               </a:rPr>
-              <a:t>DINAKAR K</a:t>
+              <a:t>KAMLESH MALVIYA</a:t>
             </a:r>
             <a:endParaRPr kumimoji="0" lang="en-US" sz="2800" b="1" i="0" u="none" strike="noStrike" cap="none" spc="0" normalizeH="0" baseline="0" dirty="0">
               <a:ln>
@@ -4530,7 +4530,7 @@
                 <a:latin typeface="Avenir Next Regular"/>
                 <a:sym typeface="Helvetica"/>
               </a:rPr>
-              <a:t>Stunners</a:t>
+              <a:t>Astonishers</a:t>
             </a:r>
             <a:r>
               <a:rPr kumimoji="0" lang="en-US" sz="2000" b="1" i="0" u="none" strike="noStrike" cap="none" spc="0" normalizeH="0" baseline="0" dirty="0">
@@ -4560,7 +4560,7 @@
                 <a:latin typeface="Avenir Next Regular"/>
                 <a:sym typeface="Helvetica"/>
               </a:rPr>
-              <a:t>Mighty Tigers</a:t>
+              <a:t>Adra Sakka</a:t>
             </a:r>
           </a:p>
           <a:p>
@@ -4588,7 +4588,7 @@
                 <a:latin typeface="Avenir Next Regular"/>
                 <a:sym typeface="Helvetica"/>
               </a:rPr>
-              <a:t>12</a:t>
+              <a:t>13</a:t>
             </a:r>
             <a:r>
               <a:rPr kumimoji="0" lang="en-US" sz="1600" b="1" i="0" u="none" strike="noStrike" cap="none" spc="0" normalizeH="0" baseline="0" dirty="0">
@@ -4633,7 +4633,7 @@
           </a:ln>
           <a:extLst>
             <a:ext uri="{C572A759-6A51-4108-AA02-DFA0A04FC94B}">
-              <ma14:wrappingTextBoxFlag xmlns="" xmlns:m="http://schemas.openxmlformats.org/officeDocument/2006/math" xmlns:a14="http://schemas.microsoft.com/office/drawing/2010/main" xmlns:ma14="http://schemas.microsoft.com/office/mac/drawingml/2011/main" val="1"/>
+              <ma14:wrappingTextBoxFlag xmlns:ma14="http://schemas.microsoft.com/office/mac/drawingml/2011/main" xmlns:a14="http://schemas.microsoft.com/office/drawing/2010/main" xmlns:m="http://schemas.openxmlformats.org/officeDocument/2006/math" xmlns="" val="1"/>
             </a:ext>
           </a:extLst>
         </p:spPr>
@@ -4765,7 +4765,7 @@
           </a:ln>
           <a:extLst>
             <a:ext uri="{C572A759-6A51-4108-AA02-DFA0A04FC94B}">
-              <ma14:wrappingTextBoxFlag xmlns="" xmlns:m="http://schemas.openxmlformats.org/officeDocument/2006/math" xmlns:a14="http://schemas.microsoft.com/office/drawing/2010/main" xmlns:ma14="http://schemas.microsoft.com/office/mac/drawingml/2011/main" val="1"/>
+              <ma14:wrappingTextBoxFlag xmlns:ma14="http://schemas.microsoft.com/office/mac/drawingml/2011/main" xmlns:a14="http://schemas.microsoft.com/office/drawing/2010/main" xmlns:m="http://schemas.openxmlformats.org/officeDocument/2006/math" xmlns="" val="1"/>
             </a:ext>
           </a:extLst>
         </p:spPr>
@@ -4874,10 +4874,10 @@
       </p:sp>
       <p:pic>
         <p:nvPicPr>
-          <p:cNvPr id="7" name="Picture 6">
+          <p:cNvPr id="4" name="Picture 3">
             <a:extLst>
               <a:ext uri="{FF2B5EF4-FFF2-40B4-BE49-F238E27FC236}">
-                <a16:creationId xmlns:a16="http://schemas.microsoft.com/office/drawing/2014/main" id="{30A80E44-8AB8-948E-562F-E1FA4AEC31AF}"/>
+                <a16:creationId xmlns:a16="http://schemas.microsoft.com/office/drawing/2014/main" id="{E182D50A-9EEF-8CED-67D4-59E0DDE2EFB4}"/>
               </a:ext>
             </a:extLst>
           </p:cNvPr>
@@ -4900,8 +4900,8 @@
         </p:blipFill>
         <p:spPr>
           <a:xfrm>
-            <a:off x="4858022" y="1913647"/>
-            <a:ext cx="2492785" cy="2547385"/>
+            <a:off x="4838105" y="1934523"/>
+            <a:ext cx="2508577" cy="2505995"/>
           </a:xfrm>
           <a:prstGeom prst="flowChartConnector">
             <a:avLst/>

</xml_diff>

<commit_message>
20230819 Demolishers vs Stunners
</commit_message>
<xml_diff>
--- a/Manage/Rocket singh.pptx
+++ b/Manage/Rocket singh.pptx
@@ -197,7 +197,7 @@
           <a:p>
             <a:fld id="{292C6D61-626B-4E73-943C-6526CCA7F53A}" type="datetimeFigureOut">
               <a:rPr lang="en-US" smtClean="0"/>
-              <a:t>8/13/2023</a:t>
+              <a:t>8/19/2023</a:t>
             </a:fld>
             <a:endParaRPr lang="en-US"/>
           </a:p>
@@ -698,7 +698,7 @@
           </a:ln>
           <a:extLst>
             <a:ext uri="{C572A759-6A51-4108-AA02-DFA0A04FC94B}">
-              <ma14:wrappingTextBoxFlag xmlns:ma14="http://schemas.microsoft.com/office/mac/drawingml/2011/main" xmlns:a14="http://schemas.microsoft.com/office/drawing/2010/main" xmlns:m="http://schemas.openxmlformats.org/officeDocument/2006/math" xmlns="" val="1"/>
+              <ma14:wrappingTextBoxFlag xmlns="" xmlns:m="http://schemas.openxmlformats.org/officeDocument/2006/math" xmlns:a14="http://schemas.microsoft.com/office/drawing/2010/main" xmlns:ma14="http://schemas.microsoft.com/office/mac/drawingml/2011/main" val="1"/>
             </a:ext>
           </a:extLst>
         </p:spPr>
@@ -756,7 +756,7 @@
           </a:ln>
           <a:extLst>
             <a:ext uri="{C572A759-6A51-4108-AA02-DFA0A04FC94B}">
-              <ma14:wrappingTextBoxFlag xmlns:ma14="http://schemas.microsoft.com/office/mac/drawingml/2011/main" xmlns:a14="http://schemas.microsoft.com/office/drawing/2010/main" xmlns:m="http://schemas.openxmlformats.org/officeDocument/2006/math" xmlns="" val="1"/>
+              <ma14:wrappingTextBoxFlag xmlns="" xmlns:m="http://schemas.openxmlformats.org/officeDocument/2006/math" xmlns:a14="http://schemas.microsoft.com/office/drawing/2010/main" xmlns:ma14="http://schemas.microsoft.com/office/mac/drawingml/2011/main" val="1"/>
             </a:ext>
           </a:extLst>
         </p:spPr>
@@ -793,7 +793,7 @@
           </a:ln>
           <a:extLst>
             <a:ext uri="{C572A759-6A51-4108-AA02-DFA0A04FC94B}">
-              <ma14:wrappingTextBoxFlag xmlns:ma14="http://schemas.microsoft.com/office/mac/drawingml/2011/main" xmlns:a14="http://schemas.microsoft.com/office/drawing/2010/main" xmlns:m="http://schemas.openxmlformats.org/officeDocument/2006/math" xmlns="" val="1"/>
+              <ma14:wrappingTextBoxFlag xmlns="" xmlns:m="http://schemas.openxmlformats.org/officeDocument/2006/math" xmlns:a14="http://schemas.microsoft.com/office/drawing/2010/main" xmlns:ma14="http://schemas.microsoft.com/office/mac/drawingml/2011/main" val="1"/>
             </a:ext>
           </a:extLst>
         </p:spPr>
@@ -3061,7 +3061,7 @@
           </a:ln>
           <a:extLst>
             <a:ext uri="{C572A759-6A51-4108-AA02-DFA0A04FC94B}">
-              <ma14:wrappingTextBoxFlag xmlns:ma14="http://schemas.microsoft.com/office/mac/drawingml/2011/main" xmlns:a14="http://schemas.microsoft.com/office/drawing/2010/main" xmlns:m="http://schemas.openxmlformats.org/officeDocument/2006/math" xmlns="" val="1"/>
+              <ma14:wrappingTextBoxFlag xmlns="" xmlns:m="http://schemas.openxmlformats.org/officeDocument/2006/math" xmlns:a14="http://schemas.microsoft.com/office/drawing/2010/main" xmlns:ma14="http://schemas.microsoft.com/office/mac/drawingml/2011/main" val="1"/>
             </a:ext>
           </a:extLst>
         </p:spPr>
@@ -3085,7 +3085,7 @@
           <a:p>
             <a:r>
               <a:rPr lang="en-US" sz="2400" b="1" dirty="0"/>
-              <a:t>39</a:t>
+              <a:t>57</a:t>
             </a:r>
             <a:r>
               <a:rPr dirty="0"/>
@@ -3113,7 +3113,7 @@
           </a:ln>
           <a:extLst>
             <a:ext uri="{C572A759-6A51-4108-AA02-DFA0A04FC94B}">
-              <ma14:wrappingTextBoxFlag xmlns:ma14="http://schemas.microsoft.com/office/mac/drawingml/2011/main" xmlns:a14="http://schemas.microsoft.com/office/drawing/2010/main" xmlns:m="http://schemas.openxmlformats.org/officeDocument/2006/math" xmlns="" val="1"/>
+              <ma14:wrappingTextBoxFlag xmlns="" xmlns:m="http://schemas.openxmlformats.org/officeDocument/2006/math" xmlns:a14="http://schemas.microsoft.com/office/drawing/2010/main" xmlns:ma14="http://schemas.microsoft.com/office/mac/drawingml/2011/main" val="1"/>
             </a:ext>
           </a:extLst>
         </p:spPr>
@@ -3165,7 +3165,7 @@
           </a:ln>
           <a:extLst>
             <a:ext uri="{C572A759-6A51-4108-AA02-DFA0A04FC94B}">
-              <ma14:wrappingTextBoxFlag xmlns:ma14="http://schemas.microsoft.com/office/mac/drawingml/2011/main" xmlns:a14="http://schemas.microsoft.com/office/drawing/2010/main" xmlns:m="http://schemas.openxmlformats.org/officeDocument/2006/math" xmlns="" val="1"/>
+              <ma14:wrappingTextBoxFlag xmlns="" xmlns:m="http://schemas.openxmlformats.org/officeDocument/2006/math" xmlns:a14="http://schemas.microsoft.com/office/drawing/2010/main" xmlns:ma14="http://schemas.microsoft.com/office/mac/drawingml/2011/main" val="1"/>
             </a:ext>
           </a:extLst>
         </p:spPr>
@@ -3189,7 +3189,7 @@
           <a:p>
             <a:r>
               <a:rPr lang="en-US" sz="2400" b="1" dirty="0"/>
-              <a:t>23</a:t>
+              <a:t>35</a:t>
             </a:r>
             <a:r>
               <a:rPr dirty="0"/>
@@ -3217,7 +3217,7 @@
           </a:ln>
           <a:extLst>
             <a:ext uri="{C572A759-6A51-4108-AA02-DFA0A04FC94B}">
-              <ma14:wrappingTextBoxFlag xmlns:ma14="http://schemas.microsoft.com/office/mac/drawingml/2011/main" xmlns:a14="http://schemas.microsoft.com/office/drawing/2010/main" xmlns:m="http://schemas.openxmlformats.org/officeDocument/2006/math" xmlns="" val="1"/>
+              <ma14:wrappingTextBoxFlag xmlns="" xmlns:m="http://schemas.openxmlformats.org/officeDocument/2006/math" xmlns:a14="http://schemas.microsoft.com/office/drawing/2010/main" xmlns:ma14="http://schemas.microsoft.com/office/mac/drawingml/2011/main" val="1"/>
             </a:ext>
           </a:extLst>
         </p:spPr>
@@ -3269,7 +3269,7 @@
           </a:ln>
           <a:extLst>
             <a:ext uri="{C572A759-6A51-4108-AA02-DFA0A04FC94B}">
-              <ma14:wrappingTextBoxFlag xmlns:ma14="http://schemas.microsoft.com/office/mac/drawingml/2011/main" xmlns:a14="http://schemas.microsoft.com/office/drawing/2010/main" xmlns:m="http://schemas.openxmlformats.org/officeDocument/2006/math" xmlns="" val="1"/>
+              <ma14:wrappingTextBoxFlag xmlns="" xmlns:m="http://schemas.openxmlformats.org/officeDocument/2006/math" xmlns:a14="http://schemas.microsoft.com/office/drawing/2010/main" xmlns:ma14="http://schemas.microsoft.com/office/mac/drawingml/2011/main" val="1"/>
             </a:ext>
           </a:extLst>
         </p:spPr>
@@ -3293,7 +3293,7 @@
           <a:p>
             <a:r>
               <a:rPr lang="en-US" sz="2400" b="1" dirty="0"/>
-              <a:t>3</a:t>
+              <a:t>4</a:t>
             </a:r>
             <a:r>
               <a:rPr dirty="0"/>
@@ -3321,7 +3321,7 @@
           </a:ln>
           <a:extLst>
             <a:ext uri="{C572A759-6A51-4108-AA02-DFA0A04FC94B}">
-              <ma14:wrappingTextBoxFlag xmlns:ma14="http://schemas.microsoft.com/office/mac/drawingml/2011/main" xmlns:a14="http://schemas.microsoft.com/office/drawing/2010/main" xmlns:m="http://schemas.openxmlformats.org/officeDocument/2006/math" xmlns="" val="1"/>
+              <ma14:wrappingTextBoxFlag xmlns="" xmlns:m="http://schemas.openxmlformats.org/officeDocument/2006/math" xmlns:a14="http://schemas.microsoft.com/office/drawing/2010/main" xmlns:ma14="http://schemas.microsoft.com/office/mac/drawingml/2011/main" val="1"/>
             </a:ext>
           </a:extLst>
         </p:spPr>
@@ -3373,7 +3373,7 @@
           </a:ln>
           <a:extLst>
             <a:ext uri="{C572A759-6A51-4108-AA02-DFA0A04FC94B}">
-              <ma14:wrappingTextBoxFlag xmlns:ma14="http://schemas.microsoft.com/office/mac/drawingml/2011/main" xmlns:a14="http://schemas.microsoft.com/office/drawing/2010/main" xmlns:m="http://schemas.openxmlformats.org/officeDocument/2006/math" xmlns="" val="1"/>
+              <ma14:wrappingTextBoxFlag xmlns="" xmlns:m="http://schemas.openxmlformats.org/officeDocument/2006/math" xmlns:a14="http://schemas.microsoft.com/office/drawing/2010/main" xmlns:ma14="http://schemas.microsoft.com/office/mac/drawingml/2011/main" val="1"/>
             </a:ext>
           </a:extLst>
         </p:spPr>
@@ -3397,7 +3397,7 @@
           <a:p>
             <a:r>
               <a:rPr lang="en-US" sz="2400" b="1" dirty="0"/>
-              <a:t>3</a:t>
+              <a:t>4</a:t>
             </a:r>
             <a:r>
               <a:rPr dirty="0"/>
@@ -3425,7 +3425,7 @@
           </a:ln>
           <a:extLst>
             <a:ext uri="{C572A759-6A51-4108-AA02-DFA0A04FC94B}">
-              <ma14:wrappingTextBoxFlag xmlns:ma14="http://schemas.microsoft.com/office/mac/drawingml/2011/main" xmlns:a14="http://schemas.microsoft.com/office/drawing/2010/main" xmlns:m="http://schemas.openxmlformats.org/officeDocument/2006/math" xmlns="" val="1"/>
+              <ma14:wrappingTextBoxFlag xmlns="" xmlns:m="http://schemas.openxmlformats.org/officeDocument/2006/math" xmlns:a14="http://schemas.microsoft.com/office/drawing/2010/main" xmlns:ma14="http://schemas.microsoft.com/office/mac/drawingml/2011/main" val="1"/>
             </a:ext>
           </a:extLst>
         </p:spPr>
@@ -3477,7 +3477,7 @@
           </a:ln>
           <a:extLst>
             <a:ext uri="{C572A759-6A51-4108-AA02-DFA0A04FC94B}">
-              <ma14:wrappingTextBoxFlag xmlns:ma14="http://schemas.microsoft.com/office/mac/drawingml/2011/main" xmlns:a14="http://schemas.microsoft.com/office/drawing/2010/main" xmlns:m="http://schemas.openxmlformats.org/officeDocument/2006/math" xmlns="" val="1"/>
+              <ma14:wrappingTextBoxFlag xmlns="" xmlns:m="http://schemas.openxmlformats.org/officeDocument/2006/math" xmlns:a14="http://schemas.microsoft.com/office/drawing/2010/main" xmlns:ma14="http://schemas.microsoft.com/office/mac/drawingml/2011/main" val="1"/>
             </a:ext>
           </a:extLst>
         </p:spPr>
@@ -3501,7 +3501,7 @@
           <a:p>
             <a:r>
               <a:rPr lang="en-US" sz="2400" b="1" dirty="0"/>
-              <a:t>3</a:t>
+              <a:t>-</a:t>
             </a:r>
             <a:r>
               <a:rPr dirty="0"/>
@@ -3529,7 +3529,7 @@
           </a:ln>
           <a:extLst>
             <a:ext uri="{C572A759-6A51-4108-AA02-DFA0A04FC94B}">
-              <ma14:wrappingTextBoxFlag xmlns:ma14="http://schemas.microsoft.com/office/mac/drawingml/2011/main" xmlns:a14="http://schemas.microsoft.com/office/drawing/2010/main" xmlns:m="http://schemas.openxmlformats.org/officeDocument/2006/math" xmlns="" val="1"/>
+              <ma14:wrappingTextBoxFlag xmlns="" xmlns:m="http://schemas.openxmlformats.org/officeDocument/2006/math" xmlns:a14="http://schemas.microsoft.com/office/drawing/2010/main" xmlns:ma14="http://schemas.microsoft.com/office/mac/drawingml/2011/main" val="1"/>
             </a:ext>
           </a:extLst>
         </p:spPr>
@@ -3581,7 +3581,7 @@
           </a:ln>
           <a:extLst>
             <a:ext uri="{C572A759-6A51-4108-AA02-DFA0A04FC94B}">
-              <ma14:wrappingTextBoxFlag xmlns:ma14="http://schemas.microsoft.com/office/mac/drawingml/2011/main" xmlns:a14="http://schemas.microsoft.com/office/drawing/2010/main" xmlns:m="http://schemas.openxmlformats.org/officeDocument/2006/math" xmlns="" val="1"/>
+              <ma14:wrappingTextBoxFlag xmlns="" xmlns:m="http://schemas.openxmlformats.org/officeDocument/2006/math" xmlns:a14="http://schemas.microsoft.com/office/drawing/2010/main" xmlns:ma14="http://schemas.microsoft.com/office/mac/drawingml/2011/main" val="1"/>
             </a:ext>
           </a:extLst>
         </p:spPr>
@@ -3605,7 +3605,7 @@
           <a:p>
             <a:r>
               <a:rPr lang="en-US" sz="2400" b="1" dirty="0"/>
-              <a:t>0</a:t>
+              <a:t>-</a:t>
             </a:r>
             <a:endParaRPr sz="2400" b="1" dirty="0"/>
           </a:p>
@@ -3630,7 +3630,7 @@
           </a:ln>
           <a:extLst>
             <a:ext uri="{C572A759-6A51-4108-AA02-DFA0A04FC94B}">
-              <ma14:wrappingTextBoxFlag xmlns:ma14="http://schemas.microsoft.com/office/mac/drawingml/2011/main" xmlns:a14="http://schemas.microsoft.com/office/drawing/2010/main" xmlns:m="http://schemas.openxmlformats.org/officeDocument/2006/math" xmlns="" val="1"/>
+              <ma14:wrappingTextBoxFlag xmlns="" xmlns:m="http://schemas.openxmlformats.org/officeDocument/2006/math" xmlns:a14="http://schemas.microsoft.com/office/drawing/2010/main" xmlns:ma14="http://schemas.microsoft.com/office/mac/drawingml/2011/main" val="1"/>
             </a:ext>
           </a:extLst>
         </p:spPr>
@@ -3682,7 +3682,7 @@
           </a:ln>
           <a:extLst>
             <a:ext uri="{C572A759-6A51-4108-AA02-DFA0A04FC94B}">
-              <ma14:wrappingTextBoxFlag xmlns:ma14="http://schemas.microsoft.com/office/mac/drawingml/2011/main" xmlns:a14="http://schemas.microsoft.com/office/drawing/2010/main" xmlns:m="http://schemas.openxmlformats.org/officeDocument/2006/math" xmlns="" val="1"/>
+              <ma14:wrappingTextBoxFlag xmlns="" xmlns:m="http://schemas.openxmlformats.org/officeDocument/2006/math" xmlns:a14="http://schemas.microsoft.com/office/drawing/2010/main" xmlns:ma14="http://schemas.microsoft.com/office/mac/drawingml/2011/main" val="1"/>
             </a:ext>
           </a:extLst>
         </p:spPr>
@@ -3706,7 +3706,7 @@
           <a:p>
             <a:r>
               <a:rPr lang="en-US" sz="2400" b="1" dirty="0"/>
-              <a:t>8</a:t>
+              <a:t>-</a:t>
             </a:r>
             <a:endParaRPr dirty="0"/>
           </a:p>
@@ -3731,7 +3731,7 @@
           </a:ln>
           <a:extLst>
             <a:ext uri="{C572A759-6A51-4108-AA02-DFA0A04FC94B}">
-              <ma14:wrappingTextBoxFlag xmlns:ma14="http://schemas.microsoft.com/office/mac/drawingml/2011/main" xmlns:a14="http://schemas.microsoft.com/office/drawing/2010/main" xmlns:m="http://schemas.openxmlformats.org/officeDocument/2006/math" xmlns="" val="1"/>
+              <ma14:wrappingTextBoxFlag xmlns="" xmlns:m="http://schemas.openxmlformats.org/officeDocument/2006/math" xmlns:a14="http://schemas.microsoft.com/office/drawing/2010/main" xmlns:ma14="http://schemas.microsoft.com/office/mac/drawingml/2011/main" val="1"/>
             </a:ext>
           </a:extLst>
         </p:spPr>
@@ -3783,7 +3783,7 @@
           </a:ln>
           <a:extLst>
             <a:ext uri="{C572A759-6A51-4108-AA02-DFA0A04FC94B}">
-              <ma14:wrappingTextBoxFlag xmlns:ma14="http://schemas.microsoft.com/office/mac/drawingml/2011/main" xmlns:a14="http://schemas.microsoft.com/office/drawing/2010/main" xmlns:m="http://schemas.openxmlformats.org/officeDocument/2006/math" xmlns="" val="1"/>
+              <ma14:wrappingTextBoxFlag xmlns="" xmlns:m="http://schemas.openxmlformats.org/officeDocument/2006/math" xmlns:a14="http://schemas.microsoft.com/office/drawing/2010/main" xmlns:ma14="http://schemas.microsoft.com/office/mac/drawingml/2011/main" val="1"/>
             </a:ext>
           </a:extLst>
         </p:spPr>
@@ -3807,7 +3807,7 @@
           <a:p>
             <a:r>
               <a:rPr lang="en-US" sz="2400" b="1" dirty="0"/>
-              <a:t>1</a:t>
+              <a:t>-</a:t>
             </a:r>
             <a:r>
               <a:rPr dirty="0"/>
@@ -3835,7 +3835,7 @@
           </a:ln>
           <a:extLst>
             <a:ext uri="{C572A759-6A51-4108-AA02-DFA0A04FC94B}">
-              <ma14:wrappingTextBoxFlag xmlns:ma14="http://schemas.microsoft.com/office/mac/drawingml/2011/main" xmlns:a14="http://schemas.microsoft.com/office/drawing/2010/main" xmlns:m="http://schemas.openxmlformats.org/officeDocument/2006/math" xmlns="" val="1"/>
+              <ma14:wrappingTextBoxFlag xmlns="" xmlns:m="http://schemas.openxmlformats.org/officeDocument/2006/math" xmlns:a14="http://schemas.microsoft.com/office/drawing/2010/main" xmlns:ma14="http://schemas.microsoft.com/office/mac/drawingml/2011/main" val="1"/>
             </a:ext>
           </a:extLst>
         </p:spPr>
@@ -4219,27 +4219,20 @@
               <a:tabLst/>
             </a:pPr>
             <a:r>
-              <a:rPr lang="en-US" sz="2800" b="1" dirty="0">
+              <a:rPr kumimoji="0" lang="en-US" sz="2800" b="1" i="0" u="none" strike="noStrike" cap="none" spc="0" normalizeH="0" baseline="0" dirty="0">
+                <a:ln>
+                  <a:noFill/>
+                </a:ln>
                 <a:solidFill>
                   <a:srgbClr val="FFBA00"/>
                 </a:solidFill>
+                <a:effectLst/>
+                <a:uFillTx/>
                 <a:latin typeface="Avenir Next Regular"/>
                 <a:sym typeface="Helvetica"/>
               </a:rPr>
-              <a:t>KAMLESH MALVIYA</a:t>
+              <a:t>PRAKAS KANNAN</a:t>
             </a:r>
-            <a:endParaRPr kumimoji="0" lang="en-US" sz="2800" b="1" i="0" u="none" strike="noStrike" cap="none" spc="0" normalizeH="0" baseline="0" dirty="0">
-              <a:ln>
-                <a:noFill/>
-              </a:ln>
-              <a:solidFill>
-                <a:srgbClr val="FFBA00"/>
-              </a:solidFill>
-              <a:effectLst/>
-              <a:uFillTx/>
-              <a:latin typeface="Avenir Next Regular"/>
-              <a:sym typeface="Helvetica"/>
-            </a:endParaRPr>
           </a:p>
         </p:txBody>
       </p:sp>
@@ -4523,17 +4516,7 @@
               <a:tabLst/>
             </a:pPr>
             <a:r>
-              <a:rPr lang="en-US" sz="2000" b="1" dirty="0">
-                <a:solidFill>
-                  <a:srgbClr val="7EBF00"/>
-                </a:solidFill>
-                <a:latin typeface="Avenir Next Regular"/>
-                <a:sym typeface="Helvetica"/>
-              </a:rPr>
-              <a:t>Astonishers</a:t>
-            </a:r>
-            <a:r>
-              <a:rPr kumimoji="0" lang="en-US" sz="2000" b="1" i="0" u="none" strike="noStrike" cap="none" spc="0" normalizeH="0" baseline="0" dirty="0">
+              <a:rPr kumimoji="0" lang="en-US" sz="2000" b="1" i="0" strike="noStrike" cap="none" spc="0" normalizeH="0" baseline="0" dirty="0">
                 <a:ln>
                   <a:noFill/>
                 </a:ln>
@@ -4545,7 +4528,7 @@
                 <a:latin typeface="Avenir Next Regular"/>
                 <a:sym typeface="Helvetica"/>
               </a:rPr>
-              <a:t> vs </a:t>
+              <a:t>Demolishers vs </a:t>
             </a:r>
             <a:r>
               <a:rPr kumimoji="0" lang="en-US" sz="2000" b="1" i="0" u="sng" strike="noStrike" cap="none" spc="0" normalizeH="0" baseline="0" dirty="0">
@@ -4560,7 +4543,7 @@
                 <a:latin typeface="Avenir Next Regular"/>
                 <a:sym typeface="Helvetica"/>
               </a:rPr>
-              <a:t>Adra Sakka</a:t>
+              <a:t>Stunners</a:t>
             </a:r>
           </a:p>
           <a:p>
@@ -4588,7 +4571,7 @@
                 <a:latin typeface="Avenir Next Regular"/>
                 <a:sym typeface="Helvetica"/>
               </a:rPr>
-              <a:t>13</a:t>
+              <a:t>19</a:t>
             </a:r>
             <a:r>
               <a:rPr kumimoji="0" lang="en-US" sz="1600" b="1" i="0" u="none" strike="noStrike" cap="none" spc="0" normalizeH="0" baseline="0" dirty="0">
@@ -4633,7 +4616,7 @@
           </a:ln>
           <a:extLst>
             <a:ext uri="{C572A759-6A51-4108-AA02-DFA0A04FC94B}">
-              <ma14:wrappingTextBoxFlag xmlns:ma14="http://schemas.microsoft.com/office/mac/drawingml/2011/main" xmlns:a14="http://schemas.microsoft.com/office/drawing/2010/main" xmlns:m="http://schemas.openxmlformats.org/officeDocument/2006/math" xmlns="" val="1"/>
+              <ma14:wrappingTextBoxFlag xmlns="" xmlns:m="http://schemas.openxmlformats.org/officeDocument/2006/math" xmlns:a14="http://schemas.microsoft.com/office/drawing/2010/main" xmlns:ma14="http://schemas.microsoft.com/office/mac/drawingml/2011/main" val="1"/>
             </a:ext>
           </a:extLst>
         </p:spPr>
@@ -4765,7 +4748,7 @@
           </a:ln>
           <a:extLst>
             <a:ext uri="{C572A759-6A51-4108-AA02-DFA0A04FC94B}">
-              <ma14:wrappingTextBoxFlag xmlns:ma14="http://schemas.microsoft.com/office/mac/drawingml/2011/main" xmlns:a14="http://schemas.microsoft.com/office/drawing/2010/main" xmlns:m="http://schemas.openxmlformats.org/officeDocument/2006/math" xmlns="" val="1"/>
+              <ma14:wrappingTextBoxFlag xmlns="" xmlns:m="http://schemas.openxmlformats.org/officeDocument/2006/math" xmlns:a14="http://schemas.microsoft.com/office/drawing/2010/main" xmlns:ma14="http://schemas.microsoft.com/office/mac/drawingml/2011/main" val="1"/>
             </a:ext>
           </a:extLst>
         </p:spPr>
@@ -4874,10 +4857,10 @@
       </p:sp>
       <p:pic>
         <p:nvPicPr>
-          <p:cNvPr id="4" name="Picture 3">
+          <p:cNvPr id="7" name="Picture 6">
             <a:extLst>
               <a:ext uri="{FF2B5EF4-FFF2-40B4-BE49-F238E27FC236}">
-                <a16:creationId xmlns:a16="http://schemas.microsoft.com/office/drawing/2014/main" id="{E182D50A-9EEF-8CED-67D4-59E0DDE2EFB4}"/>
+                <a16:creationId xmlns:a16="http://schemas.microsoft.com/office/drawing/2014/main" id="{E48B94C3-178D-0838-23AA-C85E13D7DB11}"/>
               </a:ext>
             </a:extLst>
           </p:cNvPr>
@@ -4887,7 +4870,7 @@
           <p:nvPr/>
         </p:nvPicPr>
         <p:blipFill>
-          <a:blip r:embed="rId12" cstate="print">
+          <a:blip r:embed="rId12">
             <a:extLst>
               <a:ext uri="{28A0092B-C50C-407E-A947-70E740481C1C}">
                 <a14:useLocalDpi xmlns:a14="http://schemas.microsoft.com/office/drawing/2010/main" val="0"/>
@@ -4900,8 +4883,8 @@
         </p:blipFill>
         <p:spPr>
           <a:xfrm>
-            <a:off x="4838105" y="1934523"/>
-            <a:ext cx="2508577" cy="2505995"/>
+            <a:off x="4798254" y="1898843"/>
+            <a:ext cx="2599690" cy="2553739"/>
           </a:xfrm>
           <a:prstGeom prst="flowChartConnector">
             <a:avLst/>

</xml_diff>

<commit_message>
20230826 Mighty Tigers vs Mustangs  MOM
</commit_message>
<xml_diff>
--- a/Manage/Rocket singh.pptx
+++ b/Manage/Rocket singh.pptx
@@ -197,7 +197,7 @@
           <a:p>
             <a:fld id="{292C6D61-626B-4E73-943C-6526CCA7F53A}" type="datetimeFigureOut">
               <a:rPr lang="en-US" smtClean="0"/>
-              <a:t>8/21/2023</a:t>
+              <a:t>8/22/2023</a:t>
             </a:fld>
             <a:endParaRPr lang="en-US"/>
           </a:p>
@@ -698,7 +698,7 @@
           </a:ln>
           <a:extLst>
             <a:ext uri="{C572A759-6A51-4108-AA02-DFA0A04FC94B}">
-              <ma14:wrappingTextBoxFlag xmlns:ma14="http://schemas.microsoft.com/office/mac/drawingml/2011/main" xmlns:a14="http://schemas.microsoft.com/office/drawing/2010/main" xmlns:m="http://schemas.openxmlformats.org/officeDocument/2006/math" xmlns="" val="1"/>
+              <ma14:wrappingTextBoxFlag xmlns="" xmlns:m="http://schemas.openxmlformats.org/officeDocument/2006/math" xmlns:a14="http://schemas.microsoft.com/office/drawing/2010/main" xmlns:ma14="http://schemas.microsoft.com/office/mac/drawingml/2011/main" val="1"/>
             </a:ext>
           </a:extLst>
         </p:spPr>
@@ -756,7 +756,7 @@
           </a:ln>
           <a:extLst>
             <a:ext uri="{C572A759-6A51-4108-AA02-DFA0A04FC94B}">
-              <ma14:wrappingTextBoxFlag xmlns:ma14="http://schemas.microsoft.com/office/mac/drawingml/2011/main" xmlns:a14="http://schemas.microsoft.com/office/drawing/2010/main" xmlns:m="http://schemas.openxmlformats.org/officeDocument/2006/math" xmlns="" val="1"/>
+              <ma14:wrappingTextBoxFlag xmlns="" xmlns:m="http://schemas.openxmlformats.org/officeDocument/2006/math" xmlns:a14="http://schemas.microsoft.com/office/drawing/2010/main" xmlns:ma14="http://schemas.microsoft.com/office/mac/drawingml/2011/main" val="1"/>
             </a:ext>
           </a:extLst>
         </p:spPr>
@@ -793,7 +793,7 @@
           </a:ln>
           <a:extLst>
             <a:ext uri="{C572A759-6A51-4108-AA02-DFA0A04FC94B}">
-              <ma14:wrappingTextBoxFlag xmlns:ma14="http://schemas.microsoft.com/office/mac/drawingml/2011/main" xmlns:a14="http://schemas.microsoft.com/office/drawing/2010/main" xmlns:m="http://schemas.openxmlformats.org/officeDocument/2006/math" xmlns="" val="1"/>
+              <ma14:wrappingTextBoxFlag xmlns="" xmlns:m="http://schemas.openxmlformats.org/officeDocument/2006/math" xmlns:a14="http://schemas.microsoft.com/office/drawing/2010/main" xmlns:ma14="http://schemas.microsoft.com/office/mac/drawingml/2011/main" val="1"/>
             </a:ext>
           </a:extLst>
         </p:spPr>
@@ -3061,7 +3061,7 @@
           </a:ln>
           <a:extLst>
             <a:ext uri="{C572A759-6A51-4108-AA02-DFA0A04FC94B}">
-              <ma14:wrappingTextBoxFlag xmlns:ma14="http://schemas.microsoft.com/office/mac/drawingml/2011/main" xmlns:a14="http://schemas.microsoft.com/office/drawing/2010/main" xmlns:m="http://schemas.openxmlformats.org/officeDocument/2006/math" xmlns="" val="1"/>
+              <ma14:wrappingTextBoxFlag xmlns="" xmlns:m="http://schemas.openxmlformats.org/officeDocument/2006/math" xmlns:a14="http://schemas.microsoft.com/office/drawing/2010/main" xmlns:ma14="http://schemas.microsoft.com/office/mac/drawingml/2011/main" val="1"/>
             </a:ext>
           </a:extLst>
         </p:spPr>
@@ -3085,7 +3085,7 @@
           <a:p>
             <a:r>
               <a:rPr lang="en-US" sz="2400" b="1" dirty="0"/>
-              <a:t>8</a:t>
+              <a:t>31</a:t>
             </a:r>
             <a:r>
               <a:rPr dirty="0"/>
@@ -3113,7 +3113,7 @@
           </a:ln>
           <a:extLst>
             <a:ext uri="{C572A759-6A51-4108-AA02-DFA0A04FC94B}">
-              <ma14:wrappingTextBoxFlag xmlns:ma14="http://schemas.microsoft.com/office/mac/drawingml/2011/main" xmlns:a14="http://schemas.microsoft.com/office/drawing/2010/main" xmlns:m="http://schemas.openxmlformats.org/officeDocument/2006/math" xmlns="" val="1"/>
+              <ma14:wrappingTextBoxFlag xmlns="" xmlns:m="http://schemas.openxmlformats.org/officeDocument/2006/math" xmlns:a14="http://schemas.microsoft.com/office/drawing/2010/main" xmlns:ma14="http://schemas.microsoft.com/office/mac/drawingml/2011/main" val="1"/>
             </a:ext>
           </a:extLst>
         </p:spPr>
@@ -3165,7 +3165,7 @@
           </a:ln>
           <a:extLst>
             <a:ext uri="{C572A759-6A51-4108-AA02-DFA0A04FC94B}">
-              <ma14:wrappingTextBoxFlag xmlns:ma14="http://schemas.microsoft.com/office/mac/drawingml/2011/main" xmlns:a14="http://schemas.microsoft.com/office/drawing/2010/main" xmlns:m="http://schemas.openxmlformats.org/officeDocument/2006/math" xmlns="" val="1"/>
+              <ma14:wrappingTextBoxFlag xmlns="" xmlns:m="http://schemas.openxmlformats.org/officeDocument/2006/math" xmlns:a14="http://schemas.microsoft.com/office/drawing/2010/main" xmlns:ma14="http://schemas.microsoft.com/office/mac/drawingml/2011/main" val="1"/>
             </a:ext>
           </a:extLst>
         </p:spPr>
@@ -3189,7 +3189,7 @@
           <a:p>
             <a:r>
               <a:rPr lang="en-US" sz="2400" b="1" dirty="0"/>
-              <a:t>13</a:t>
+              <a:t>32</a:t>
             </a:r>
             <a:r>
               <a:rPr dirty="0"/>
@@ -3217,7 +3217,7 @@
           </a:ln>
           <a:extLst>
             <a:ext uri="{C572A759-6A51-4108-AA02-DFA0A04FC94B}">
-              <ma14:wrappingTextBoxFlag xmlns:ma14="http://schemas.microsoft.com/office/mac/drawingml/2011/main" xmlns:a14="http://schemas.microsoft.com/office/drawing/2010/main" xmlns:m="http://schemas.openxmlformats.org/officeDocument/2006/math" xmlns="" val="1"/>
+              <ma14:wrappingTextBoxFlag xmlns="" xmlns:m="http://schemas.openxmlformats.org/officeDocument/2006/math" xmlns:a14="http://schemas.microsoft.com/office/drawing/2010/main" xmlns:ma14="http://schemas.microsoft.com/office/mac/drawingml/2011/main" val="1"/>
             </a:ext>
           </a:extLst>
         </p:spPr>
@@ -3269,7 +3269,7 @@
           </a:ln>
           <a:extLst>
             <a:ext uri="{C572A759-6A51-4108-AA02-DFA0A04FC94B}">
-              <ma14:wrappingTextBoxFlag xmlns:ma14="http://schemas.microsoft.com/office/mac/drawingml/2011/main" xmlns:a14="http://schemas.microsoft.com/office/drawing/2010/main" xmlns:m="http://schemas.openxmlformats.org/officeDocument/2006/math" xmlns="" val="1"/>
+              <ma14:wrappingTextBoxFlag xmlns="" xmlns:m="http://schemas.openxmlformats.org/officeDocument/2006/math" xmlns:a14="http://schemas.microsoft.com/office/drawing/2010/main" xmlns:ma14="http://schemas.microsoft.com/office/mac/drawingml/2011/main" val="1"/>
             </a:ext>
           </a:extLst>
         </p:spPr>
@@ -3293,7 +3293,7 @@
           <a:p>
             <a:r>
               <a:rPr lang="en-US" sz="2400" b="1" dirty="0"/>
-              <a:t>0</a:t>
+              <a:t>1</a:t>
             </a:r>
             <a:r>
               <a:rPr dirty="0"/>
@@ -3321,7 +3321,7 @@
           </a:ln>
           <a:extLst>
             <a:ext uri="{C572A759-6A51-4108-AA02-DFA0A04FC94B}">
-              <ma14:wrappingTextBoxFlag xmlns:ma14="http://schemas.microsoft.com/office/mac/drawingml/2011/main" xmlns:a14="http://schemas.microsoft.com/office/drawing/2010/main" xmlns:m="http://schemas.openxmlformats.org/officeDocument/2006/math" xmlns="" val="1"/>
+              <ma14:wrappingTextBoxFlag xmlns="" xmlns:m="http://schemas.openxmlformats.org/officeDocument/2006/math" xmlns:a14="http://schemas.microsoft.com/office/drawing/2010/main" xmlns:ma14="http://schemas.microsoft.com/office/mac/drawingml/2011/main" val="1"/>
             </a:ext>
           </a:extLst>
         </p:spPr>
@@ -3373,7 +3373,7 @@
           </a:ln>
           <a:extLst>
             <a:ext uri="{C572A759-6A51-4108-AA02-DFA0A04FC94B}">
-              <ma14:wrappingTextBoxFlag xmlns:ma14="http://schemas.microsoft.com/office/mac/drawingml/2011/main" xmlns:a14="http://schemas.microsoft.com/office/drawing/2010/main" xmlns:m="http://schemas.openxmlformats.org/officeDocument/2006/math" xmlns="" val="1"/>
+              <ma14:wrappingTextBoxFlag xmlns="" xmlns:m="http://schemas.openxmlformats.org/officeDocument/2006/math" xmlns:a14="http://schemas.microsoft.com/office/drawing/2010/main" xmlns:ma14="http://schemas.microsoft.com/office/mac/drawingml/2011/main" val="1"/>
             </a:ext>
           </a:extLst>
         </p:spPr>
@@ -3397,7 +3397,7 @@
           <a:p>
             <a:r>
               <a:rPr lang="en-US" sz="2400" b="1" dirty="0"/>
-              <a:t>0</a:t>
+              <a:t>2</a:t>
             </a:r>
             <a:r>
               <a:rPr dirty="0"/>
@@ -3425,7 +3425,7 @@
           </a:ln>
           <a:extLst>
             <a:ext uri="{C572A759-6A51-4108-AA02-DFA0A04FC94B}">
-              <ma14:wrappingTextBoxFlag xmlns:ma14="http://schemas.microsoft.com/office/mac/drawingml/2011/main" xmlns:a14="http://schemas.microsoft.com/office/drawing/2010/main" xmlns:m="http://schemas.openxmlformats.org/officeDocument/2006/math" xmlns="" val="1"/>
+              <ma14:wrappingTextBoxFlag xmlns="" xmlns:m="http://schemas.openxmlformats.org/officeDocument/2006/math" xmlns:a14="http://schemas.microsoft.com/office/drawing/2010/main" xmlns:ma14="http://schemas.microsoft.com/office/mac/drawingml/2011/main" val="1"/>
             </a:ext>
           </a:extLst>
         </p:spPr>
@@ -3477,7 +3477,7 @@
           </a:ln>
           <a:extLst>
             <a:ext uri="{C572A759-6A51-4108-AA02-DFA0A04FC94B}">
-              <ma14:wrappingTextBoxFlag xmlns:ma14="http://schemas.microsoft.com/office/mac/drawingml/2011/main" xmlns:a14="http://schemas.microsoft.com/office/drawing/2010/main" xmlns:m="http://schemas.openxmlformats.org/officeDocument/2006/math" xmlns="" val="1"/>
+              <ma14:wrappingTextBoxFlag xmlns="" xmlns:m="http://schemas.openxmlformats.org/officeDocument/2006/math" xmlns:a14="http://schemas.microsoft.com/office/drawing/2010/main" xmlns:ma14="http://schemas.microsoft.com/office/mac/drawingml/2011/main" val="1"/>
             </a:ext>
           </a:extLst>
         </p:spPr>
@@ -3529,7 +3529,7 @@
           </a:ln>
           <a:extLst>
             <a:ext uri="{C572A759-6A51-4108-AA02-DFA0A04FC94B}">
-              <ma14:wrappingTextBoxFlag xmlns:ma14="http://schemas.microsoft.com/office/mac/drawingml/2011/main" xmlns:a14="http://schemas.microsoft.com/office/drawing/2010/main" xmlns:m="http://schemas.openxmlformats.org/officeDocument/2006/math" xmlns="" val="1"/>
+              <ma14:wrappingTextBoxFlag xmlns="" xmlns:m="http://schemas.openxmlformats.org/officeDocument/2006/math" xmlns:a14="http://schemas.microsoft.com/office/drawing/2010/main" xmlns:ma14="http://schemas.microsoft.com/office/mac/drawingml/2011/main" val="1"/>
             </a:ext>
           </a:extLst>
         </p:spPr>
@@ -3581,7 +3581,7 @@
           </a:ln>
           <a:extLst>
             <a:ext uri="{C572A759-6A51-4108-AA02-DFA0A04FC94B}">
-              <ma14:wrappingTextBoxFlag xmlns:ma14="http://schemas.microsoft.com/office/mac/drawingml/2011/main" xmlns:a14="http://schemas.microsoft.com/office/drawing/2010/main" xmlns:m="http://schemas.openxmlformats.org/officeDocument/2006/math" xmlns="" val="1"/>
+              <ma14:wrappingTextBoxFlag xmlns="" xmlns:m="http://schemas.openxmlformats.org/officeDocument/2006/math" xmlns:a14="http://schemas.microsoft.com/office/drawing/2010/main" xmlns:ma14="http://schemas.microsoft.com/office/mac/drawingml/2011/main" val="1"/>
             </a:ext>
           </a:extLst>
         </p:spPr>
@@ -3605,7 +3605,7 @@
           <a:p>
             <a:r>
               <a:rPr lang="en-US" sz="2400" b="1" dirty="0"/>
-              <a:t>1</a:t>
+              <a:t>0</a:t>
             </a:r>
             <a:endParaRPr sz="2400" b="1" dirty="0"/>
           </a:p>
@@ -3630,7 +3630,7 @@
           </a:ln>
           <a:extLst>
             <a:ext uri="{C572A759-6A51-4108-AA02-DFA0A04FC94B}">
-              <ma14:wrappingTextBoxFlag xmlns:ma14="http://schemas.microsoft.com/office/mac/drawingml/2011/main" xmlns:a14="http://schemas.microsoft.com/office/drawing/2010/main" xmlns:m="http://schemas.openxmlformats.org/officeDocument/2006/math" xmlns="" val="1"/>
+              <ma14:wrappingTextBoxFlag xmlns="" xmlns:m="http://schemas.openxmlformats.org/officeDocument/2006/math" xmlns:a14="http://schemas.microsoft.com/office/drawing/2010/main" xmlns:ma14="http://schemas.microsoft.com/office/mac/drawingml/2011/main" val="1"/>
             </a:ext>
           </a:extLst>
         </p:spPr>
@@ -3682,7 +3682,7 @@
           </a:ln>
           <a:extLst>
             <a:ext uri="{C572A759-6A51-4108-AA02-DFA0A04FC94B}">
-              <ma14:wrappingTextBoxFlag xmlns:ma14="http://schemas.microsoft.com/office/mac/drawingml/2011/main" xmlns:a14="http://schemas.microsoft.com/office/drawing/2010/main" xmlns:m="http://schemas.openxmlformats.org/officeDocument/2006/math" xmlns="" val="1"/>
+              <ma14:wrappingTextBoxFlag xmlns="" xmlns:m="http://schemas.openxmlformats.org/officeDocument/2006/math" xmlns:a14="http://schemas.microsoft.com/office/drawing/2010/main" xmlns:ma14="http://schemas.microsoft.com/office/mac/drawingml/2011/main" val="1"/>
             </a:ext>
           </a:extLst>
         </p:spPr>
@@ -3706,7 +3706,7 @@
           <a:p>
             <a:r>
               <a:rPr lang="en-US" sz="2400" b="1" dirty="0"/>
-              <a:t>20</a:t>
+              <a:t>18</a:t>
             </a:r>
             <a:endParaRPr dirty="0"/>
           </a:p>
@@ -3731,7 +3731,7 @@
           </a:ln>
           <a:extLst>
             <a:ext uri="{C572A759-6A51-4108-AA02-DFA0A04FC94B}">
-              <ma14:wrappingTextBoxFlag xmlns:ma14="http://schemas.microsoft.com/office/mac/drawingml/2011/main" xmlns:a14="http://schemas.microsoft.com/office/drawing/2010/main" xmlns:m="http://schemas.openxmlformats.org/officeDocument/2006/math" xmlns="" val="1"/>
+              <ma14:wrappingTextBoxFlag xmlns="" xmlns:m="http://schemas.openxmlformats.org/officeDocument/2006/math" xmlns:a14="http://schemas.microsoft.com/office/drawing/2010/main" xmlns:ma14="http://schemas.microsoft.com/office/mac/drawingml/2011/main" val="1"/>
             </a:ext>
           </a:extLst>
         </p:spPr>
@@ -3783,7 +3783,7 @@
           </a:ln>
           <a:extLst>
             <a:ext uri="{C572A759-6A51-4108-AA02-DFA0A04FC94B}">
-              <ma14:wrappingTextBoxFlag xmlns:ma14="http://schemas.microsoft.com/office/mac/drawingml/2011/main" xmlns:a14="http://schemas.microsoft.com/office/drawing/2010/main" xmlns:m="http://schemas.openxmlformats.org/officeDocument/2006/math" xmlns="" val="1"/>
+              <ma14:wrappingTextBoxFlag xmlns="" xmlns:m="http://schemas.openxmlformats.org/officeDocument/2006/math" xmlns:a14="http://schemas.microsoft.com/office/drawing/2010/main" xmlns:ma14="http://schemas.microsoft.com/office/mac/drawingml/2011/main" val="1"/>
             </a:ext>
           </a:extLst>
         </p:spPr>
@@ -3807,7 +3807,7 @@
           <a:p>
             <a:r>
               <a:rPr lang="en-US" sz="2400" b="1" dirty="0"/>
-              <a:t>4</a:t>
+              <a:t>2</a:t>
             </a:r>
             <a:r>
               <a:rPr dirty="0"/>
@@ -3835,7 +3835,7 @@
           </a:ln>
           <a:extLst>
             <a:ext uri="{C572A759-6A51-4108-AA02-DFA0A04FC94B}">
-              <ma14:wrappingTextBoxFlag xmlns:ma14="http://schemas.microsoft.com/office/mac/drawingml/2011/main" xmlns:a14="http://schemas.microsoft.com/office/drawing/2010/main" xmlns:m="http://schemas.openxmlformats.org/officeDocument/2006/math" xmlns="" val="1"/>
+              <ma14:wrappingTextBoxFlag xmlns="" xmlns:m="http://schemas.openxmlformats.org/officeDocument/2006/math" xmlns:a14="http://schemas.microsoft.com/office/drawing/2010/main" xmlns:ma14="http://schemas.microsoft.com/office/mac/drawingml/2011/main" val="1"/>
             </a:ext>
           </a:extLst>
         </p:spPr>
@@ -4231,32 +4231,7 @@
                 <a:latin typeface="Avenir Next Regular"/>
                 <a:sym typeface="Helvetica"/>
               </a:rPr>
-              <a:t>NADEEM </a:t>
-            </a:r>
-            <a:r>
-              <a:rPr lang="en-US" sz="2800" b="1" dirty="0">
-                <a:solidFill>
-                  <a:srgbClr val="FFBA00"/>
-                </a:solidFill>
-                <a:latin typeface="Avenir Next Regular"/>
-                <a:sym typeface="Helvetica"/>
-              </a:rPr>
-              <a:t>I</a:t>
-            </a:r>
-            <a:r>
-              <a:rPr kumimoji="0" lang="en-US" sz="2800" b="1" i="0" u="none" strike="noStrike" cap="none" spc="0" normalizeH="0" baseline="0" dirty="0">
-                <a:ln>
-                  <a:noFill/>
-                </a:ln>
-                <a:solidFill>
-                  <a:srgbClr val="FFBA00"/>
-                </a:solidFill>
-                <a:effectLst/>
-                <a:uFillTx/>
-                <a:latin typeface="Avenir Next Regular"/>
-                <a:sym typeface="Helvetica"/>
-              </a:rPr>
-              <a:t>QBAL</a:t>
+              <a:t>KIRAN S</a:t>
             </a:r>
           </a:p>
         </p:txBody>
@@ -4553,7 +4528,7 @@
                 <a:latin typeface="Avenir Next Regular"/>
                 <a:sym typeface="Helvetica"/>
               </a:rPr>
-              <a:t>Astonishers</a:t>
+              <a:t>Mighty Tigers</a:t>
             </a:r>
             <a:r>
               <a:rPr kumimoji="0" lang="en-US" sz="2000" b="1" i="0" strike="noStrike" cap="none" spc="0" normalizeH="0" baseline="0" dirty="0">
@@ -4568,7 +4543,7 @@
                 <a:latin typeface="Avenir Next Regular"/>
                 <a:sym typeface="Helvetica"/>
               </a:rPr>
-              <a:t> vs Adra Sakka</a:t>
+              <a:t> vs Mustangs</a:t>
             </a:r>
           </a:p>
           <a:p>
@@ -4601,7 +4576,7 @@
                 <a:latin typeface="Avenir Next Regular"/>
                 <a:sym typeface="Helvetica"/>
               </a:rPr>
-              <a:t>20-Aug-2023</a:t>
+              <a:t>26-Aug-2023</a:t>
             </a:r>
           </a:p>
         </p:txBody>
@@ -4631,7 +4606,7 @@
           </a:ln>
           <a:extLst>
             <a:ext uri="{C572A759-6A51-4108-AA02-DFA0A04FC94B}">
-              <ma14:wrappingTextBoxFlag xmlns:ma14="http://schemas.microsoft.com/office/mac/drawingml/2011/main" xmlns:a14="http://schemas.microsoft.com/office/drawing/2010/main" xmlns:m="http://schemas.openxmlformats.org/officeDocument/2006/math" xmlns="" val="1"/>
+              <ma14:wrappingTextBoxFlag xmlns="" xmlns:m="http://schemas.openxmlformats.org/officeDocument/2006/math" xmlns:a14="http://schemas.microsoft.com/office/drawing/2010/main" xmlns:ma14="http://schemas.microsoft.com/office/mac/drawingml/2011/main" val="1"/>
             </a:ext>
           </a:extLst>
         </p:spPr>
@@ -4763,7 +4738,7 @@
           </a:ln>
           <a:extLst>
             <a:ext uri="{C572A759-6A51-4108-AA02-DFA0A04FC94B}">
-              <ma14:wrappingTextBoxFlag xmlns:ma14="http://schemas.microsoft.com/office/mac/drawingml/2011/main" xmlns:a14="http://schemas.microsoft.com/office/drawing/2010/main" xmlns:m="http://schemas.openxmlformats.org/officeDocument/2006/math" xmlns="" val="1"/>
+              <ma14:wrappingTextBoxFlag xmlns="" xmlns:m="http://schemas.openxmlformats.org/officeDocument/2006/math" xmlns:a14="http://schemas.microsoft.com/office/drawing/2010/main" xmlns:ma14="http://schemas.microsoft.com/office/mac/drawingml/2011/main" val="1"/>
             </a:ext>
           </a:extLst>
         </p:spPr>
@@ -4872,10 +4847,10 @@
       </p:sp>
       <p:pic>
         <p:nvPicPr>
-          <p:cNvPr id="4" name="Picture 3">
+          <p:cNvPr id="10" name="Picture 9">
             <a:extLst>
               <a:ext uri="{FF2B5EF4-FFF2-40B4-BE49-F238E27FC236}">
-                <a16:creationId xmlns:a16="http://schemas.microsoft.com/office/drawing/2014/main" id="{460A5DFC-4DC3-1F9D-DDED-7B043AFA05AC}"/>
+                <a16:creationId xmlns:a16="http://schemas.microsoft.com/office/drawing/2014/main" id="{0427CC2B-6140-D42C-B27E-378EDC8EFDE7}"/>
               </a:ext>
             </a:extLst>
           </p:cNvPr>
@@ -4884,7 +4859,7 @@
           </p:cNvPicPr>
           <p:nvPr/>
         </p:nvPicPr>
-        <p:blipFill>
+        <p:blipFill rotWithShape="1">
           <a:blip r:embed="rId12" cstate="print">
             <a:extLst>
               <a:ext uri="{28A0092B-C50C-407E-A947-70E740481C1C}">
@@ -4892,14 +4867,13 @@
               </a:ext>
             </a:extLst>
           </a:blip>
-          <a:stretch>
-            <a:fillRect/>
-          </a:stretch>
+          <a:srcRect t="13442" b="35061"/>
+          <a:stretch/>
         </p:blipFill>
         <p:spPr>
           <a:xfrm>
-            <a:off x="4795656" y="1867470"/>
-            <a:ext cx="2578339" cy="2630516"/>
+            <a:off x="4835212" y="1902648"/>
+            <a:ext cx="2560974" cy="2565899"/>
           </a:xfrm>
           <a:prstGeom prst="flowChartConnector">
             <a:avLst/>

</xml_diff>

<commit_message>
20231224 RRR vs Kryptonites
</commit_message>
<xml_diff>
--- a/Manage/Rocket singh.pptx
+++ b/Manage/Rocket singh.pptx
@@ -197,7 +197,7 @@
           <a:p>
             <a:fld id="{292C6D61-626B-4E73-943C-6526CCA7F53A}" type="datetimeFigureOut">
               <a:rPr lang="en-US" smtClean="0"/>
-              <a:t>8/22/2023</a:t>
+              <a:t>8/27/2023</a:t>
             </a:fld>
             <a:endParaRPr lang="en-US"/>
           </a:p>
@@ -698,7 +698,7 @@
           </a:ln>
           <a:extLst>
             <a:ext uri="{C572A759-6A51-4108-AA02-DFA0A04FC94B}">
-              <ma14:wrappingTextBoxFlag xmlns="" xmlns:m="http://schemas.openxmlformats.org/officeDocument/2006/math" xmlns:a14="http://schemas.microsoft.com/office/drawing/2010/main" xmlns:ma14="http://schemas.microsoft.com/office/mac/drawingml/2011/main" val="1"/>
+              <ma14:wrappingTextBoxFlag xmlns:ma14="http://schemas.microsoft.com/office/mac/drawingml/2011/main" xmlns:a14="http://schemas.microsoft.com/office/drawing/2010/main" xmlns:m="http://schemas.openxmlformats.org/officeDocument/2006/math" xmlns="" val="1"/>
             </a:ext>
           </a:extLst>
         </p:spPr>
@@ -756,7 +756,7 @@
           </a:ln>
           <a:extLst>
             <a:ext uri="{C572A759-6A51-4108-AA02-DFA0A04FC94B}">
-              <ma14:wrappingTextBoxFlag xmlns="" xmlns:m="http://schemas.openxmlformats.org/officeDocument/2006/math" xmlns:a14="http://schemas.microsoft.com/office/drawing/2010/main" xmlns:ma14="http://schemas.microsoft.com/office/mac/drawingml/2011/main" val="1"/>
+              <ma14:wrappingTextBoxFlag xmlns:ma14="http://schemas.microsoft.com/office/mac/drawingml/2011/main" xmlns:a14="http://schemas.microsoft.com/office/drawing/2010/main" xmlns:m="http://schemas.openxmlformats.org/officeDocument/2006/math" xmlns="" val="1"/>
             </a:ext>
           </a:extLst>
         </p:spPr>
@@ -793,7 +793,7 @@
           </a:ln>
           <a:extLst>
             <a:ext uri="{C572A759-6A51-4108-AA02-DFA0A04FC94B}">
-              <ma14:wrappingTextBoxFlag xmlns="" xmlns:m="http://schemas.openxmlformats.org/officeDocument/2006/math" xmlns:a14="http://schemas.microsoft.com/office/drawing/2010/main" xmlns:ma14="http://schemas.microsoft.com/office/mac/drawingml/2011/main" val="1"/>
+              <ma14:wrappingTextBoxFlag xmlns:ma14="http://schemas.microsoft.com/office/mac/drawingml/2011/main" xmlns:a14="http://schemas.microsoft.com/office/drawing/2010/main" xmlns:m="http://schemas.openxmlformats.org/officeDocument/2006/math" xmlns="" val="1"/>
             </a:ext>
           </a:extLst>
         </p:spPr>
@@ -3061,7 +3061,7 @@
           </a:ln>
           <a:extLst>
             <a:ext uri="{C572A759-6A51-4108-AA02-DFA0A04FC94B}">
-              <ma14:wrappingTextBoxFlag xmlns="" xmlns:m="http://schemas.openxmlformats.org/officeDocument/2006/math" xmlns:a14="http://schemas.microsoft.com/office/drawing/2010/main" xmlns:ma14="http://schemas.microsoft.com/office/mac/drawingml/2011/main" val="1"/>
+              <ma14:wrappingTextBoxFlag xmlns:ma14="http://schemas.microsoft.com/office/mac/drawingml/2011/main" xmlns:a14="http://schemas.microsoft.com/office/drawing/2010/main" xmlns:m="http://schemas.openxmlformats.org/officeDocument/2006/math" xmlns="" val="1"/>
             </a:ext>
           </a:extLst>
         </p:spPr>
@@ -3085,7 +3085,7 @@
           <a:p>
             <a:r>
               <a:rPr lang="en-US" sz="2400" b="1" dirty="0"/>
-              <a:t>31</a:t>
+              <a:t>-</a:t>
             </a:r>
             <a:r>
               <a:rPr dirty="0"/>
@@ -3113,7 +3113,7 @@
           </a:ln>
           <a:extLst>
             <a:ext uri="{C572A759-6A51-4108-AA02-DFA0A04FC94B}">
-              <ma14:wrappingTextBoxFlag xmlns="" xmlns:m="http://schemas.openxmlformats.org/officeDocument/2006/math" xmlns:a14="http://schemas.microsoft.com/office/drawing/2010/main" xmlns:ma14="http://schemas.microsoft.com/office/mac/drawingml/2011/main" val="1"/>
+              <ma14:wrappingTextBoxFlag xmlns:ma14="http://schemas.microsoft.com/office/mac/drawingml/2011/main" xmlns:a14="http://schemas.microsoft.com/office/drawing/2010/main" xmlns:m="http://schemas.openxmlformats.org/officeDocument/2006/math" xmlns="" val="1"/>
             </a:ext>
           </a:extLst>
         </p:spPr>
@@ -3165,7 +3165,7 @@
           </a:ln>
           <a:extLst>
             <a:ext uri="{C572A759-6A51-4108-AA02-DFA0A04FC94B}">
-              <ma14:wrappingTextBoxFlag xmlns="" xmlns:m="http://schemas.openxmlformats.org/officeDocument/2006/math" xmlns:a14="http://schemas.microsoft.com/office/drawing/2010/main" xmlns:ma14="http://schemas.microsoft.com/office/mac/drawingml/2011/main" val="1"/>
+              <ma14:wrappingTextBoxFlag xmlns:ma14="http://schemas.microsoft.com/office/mac/drawingml/2011/main" xmlns:a14="http://schemas.microsoft.com/office/drawing/2010/main" xmlns:m="http://schemas.openxmlformats.org/officeDocument/2006/math" xmlns="" val="1"/>
             </a:ext>
           </a:extLst>
         </p:spPr>
@@ -3189,7 +3189,7 @@
           <a:p>
             <a:r>
               <a:rPr lang="en-US" sz="2400" b="1" dirty="0"/>
-              <a:t>32</a:t>
+              <a:t>-</a:t>
             </a:r>
             <a:r>
               <a:rPr dirty="0"/>
@@ -3217,7 +3217,7 @@
           </a:ln>
           <a:extLst>
             <a:ext uri="{C572A759-6A51-4108-AA02-DFA0A04FC94B}">
-              <ma14:wrappingTextBoxFlag xmlns="" xmlns:m="http://schemas.openxmlformats.org/officeDocument/2006/math" xmlns:a14="http://schemas.microsoft.com/office/drawing/2010/main" xmlns:ma14="http://schemas.microsoft.com/office/mac/drawingml/2011/main" val="1"/>
+              <ma14:wrappingTextBoxFlag xmlns:ma14="http://schemas.microsoft.com/office/mac/drawingml/2011/main" xmlns:a14="http://schemas.microsoft.com/office/drawing/2010/main" xmlns:m="http://schemas.openxmlformats.org/officeDocument/2006/math" xmlns="" val="1"/>
             </a:ext>
           </a:extLst>
         </p:spPr>
@@ -3269,7 +3269,7 @@
           </a:ln>
           <a:extLst>
             <a:ext uri="{C572A759-6A51-4108-AA02-DFA0A04FC94B}">
-              <ma14:wrappingTextBoxFlag xmlns="" xmlns:m="http://schemas.openxmlformats.org/officeDocument/2006/math" xmlns:a14="http://schemas.microsoft.com/office/drawing/2010/main" xmlns:ma14="http://schemas.microsoft.com/office/mac/drawingml/2011/main" val="1"/>
+              <ma14:wrappingTextBoxFlag xmlns:ma14="http://schemas.microsoft.com/office/mac/drawingml/2011/main" xmlns:a14="http://schemas.microsoft.com/office/drawing/2010/main" xmlns:m="http://schemas.openxmlformats.org/officeDocument/2006/math" xmlns="" val="1"/>
             </a:ext>
           </a:extLst>
         </p:spPr>
@@ -3293,7 +3293,7 @@
           <a:p>
             <a:r>
               <a:rPr lang="en-US" sz="2400" b="1" dirty="0"/>
-              <a:t>1</a:t>
+              <a:t>-</a:t>
             </a:r>
             <a:r>
               <a:rPr dirty="0"/>
@@ -3321,7 +3321,7 @@
           </a:ln>
           <a:extLst>
             <a:ext uri="{C572A759-6A51-4108-AA02-DFA0A04FC94B}">
-              <ma14:wrappingTextBoxFlag xmlns="" xmlns:m="http://schemas.openxmlformats.org/officeDocument/2006/math" xmlns:a14="http://schemas.microsoft.com/office/drawing/2010/main" xmlns:ma14="http://schemas.microsoft.com/office/mac/drawingml/2011/main" val="1"/>
+              <ma14:wrappingTextBoxFlag xmlns:ma14="http://schemas.microsoft.com/office/mac/drawingml/2011/main" xmlns:a14="http://schemas.microsoft.com/office/drawing/2010/main" xmlns:m="http://schemas.openxmlformats.org/officeDocument/2006/math" xmlns="" val="1"/>
             </a:ext>
           </a:extLst>
         </p:spPr>
@@ -3373,7 +3373,7 @@
           </a:ln>
           <a:extLst>
             <a:ext uri="{C572A759-6A51-4108-AA02-DFA0A04FC94B}">
-              <ma14:wrappingTextBoxFlag xmlns="" xmlns:m="http://schemas.openxmlformats.org/officeDocument/2006/math" xmlns:a14="http://schemas.microsoft.com/office/drawing/2010/main" xmlns:ma14="http://schemas.microsoft.com/office/mac/drawingml/2011/main" val="1"/>
+              <ma14:wrappingTextBoxFlag xmlns:ma14="http://schemas.microsoft.com/office/mac/drawingml/2011/main" xmlns:a14="http://schemas.microsoft.com/office/drawing/2010/main" xmlns:m="http://schemas.openxmlformats.org/officeDocument/2006/math" xmlns="" val="1"/>
             </a:ext>
           </a:extLst>
         </p:spPr>
@@ -3397,7 +3397,7 @@
           <a:p>
             <a:r>
               <a:rPr lang="en-US" sz="2400" b="1" dirty="0"/>
-              <a:t>2</a:t>
+              <a:t>-</a:t>
             </a:r>
             <a:r>
               <a:rPr dirty="0"/>
@@ -3425,7 +3425,7 @@
           </a:ln>
           <a:extLst>
             <a:ext uri="{C572A759-6A51-4108-AA02-DFA0A04FC94B}">
-              <ma14:wrappingTextBoxFlag xmlns="" xmlns:m="http://schemas.openxmlformats.org/officeDocument/2006/math" xmlns:a14="http://schemas.microsoft.com/office/drawing/2010/main" xmlns:ma14="http://schemas.microsoft.com/office/mac/drawingml/2011/main" val="1"/>
+              <ma14:wrappingTextBoxFlag xmlns:ma14="http://schemas.microsoft.com/office/mac/drawingml/2011/main" xmlns:a14="http://schemas.microsoft.com/office/drawing/2010/main" xmlns:m="http://schemas.openxmlformats.org/officeDocument/2006/math" xmlns="" val="1"/>
             </a:ext>
           </a:extLst>
         </p:spPr>
@@ -3477,7 +3477,7 @@
           </a:ln>
           <a:extLst>
             <a:ext uri="{C572A759-6A51-4108-AA02-DFA0A04FC94B}">
-              <ma14:wrappingTextBoxFlag xmlns="" xmlns:m="http://schemas.openxmlformats.org/officeDocument/2006/math" xmlns:a14="http://schemas.microsoft.com/office/drawing/2010/main" xmlns:ma14="http://schemas.microsoft.com/office/mac/drawingml/2011/main" val="1"/>
+              <ma14:wrappingTextBoxFlag xmlns:ma14="http://schemas.microsoft.com/office/mac/drawingml/2011/main" xmlns:a14="http://schemas.microsoft.com/office/drawing/2010/main" xmlns:m="http://schemas.openxmlformats.org/officeDocument/2006/math" xmlns="" val="1"/>
             </a:ext>
           </a:extLst>
         </p:spPr>
@@ -3529,7 +3529,7 @@
           </a:ln>
           <a:extLst>
             <a:ext uri="{C572A759-6A51-4108-AA02-DFA0A04FC94B}">
-              <ma14:wrappingTextBoxFlag xmlns="" xmlns:m="http://schemas.openxmlformats.org/officeDocument/2006/math" xmlns:a14="http://schemas.microsoft.com/office/drawing/2010/main" xmlns:ma14="http://schemas.microsoft.com/office/mac/drawingml/2011/main" val="1"/>
+              <ma14:wrappingTextBoxFlag xmlns:ma14="http://schemas.microsoft.com/office/mac/drawingml/2011/main" xmlns:a14="http://schemas.microsoft.com/office/drawing/2010/main" xmlns:m="http://schemas.openxmlformats.org/officeDocument/2006/math" xmlns="" val="1"/>
             </a:ext>
           </a:extLst>
         </p:spPr>
@@ -3581,7 +3581,7 @@
           </a:ln>
           <a:extLst>
             <a:ext uri="{C572A759-6A51-4108-AA02-DFA0A04FC94B}">
-              <ma14:wrappingTextBoxFlag xmlns="" xmlns:m="http://schemas.openxmlformats.org/officeDocument/2006/math" xmlns:a14="http://schemas.microsoft.com/office/drawing/2010/main" xmlns:ma14="http://schemas.microsoft.com/office/mac/drawingml/2011/main" val="1"/>
+              <ma14:wrappingTextBoxFlag xmlns:ma14="http://schemas.microsoft.com/office/mac/drawingml/2011/main" xmlns:a14="http://schemas.microsoft.com/office/drawing/2010/main" xmlns:m="http://schemas.openxmlformats.org/officeDocument/2006/math" xmlns="" val="1"/>
             </a:ext>
           </a:extLst>
         </p:spPr>
@@ -3630,7 +3630,7 @@
           </a:ln>
           <a:extLst>
             <a:ext uri="{C572A759-6A51-4108-AA02-DFA0A04FC94B}">
-              <ma14:wrappingTextBoxFlag xmlns="" xmlns:m="http://schemas.openxmlformats.org/officeDocument/2006/math" xmlns:a14="http://schemas.microsoft.com/office/drawing/2010/main" xmlns:ma14="http://schemas.microsoft.com/office/mac/drawingml/2011/main" val="1"/>
+              <ma14:wrappingTextBoxFlag xmlns:ma14="http://schemas.microsoft.com/office/mac/drawingml/2011/main" xmlns:a14="http://schemas.microsoft.com/office/drawing/2010/main" xmlns:m="http://schemas.openxmlformats.org/officeDocument/2006/math" xmlns="" val="1"/>
             </a:ext>
           </a:extLst>
         </p:spPr>
@@ -3682,7 +3682,7 @@
           </a:ln>
           <a:extLst>
             <a:ext uri="{C572A759-6A51-4108-AA02-DFA0A04FC94B}">
-              <ma14:wrappingTextBoxFlag xmlns="" xmlns:m="http://schemas.openxmlformats.org/officeDocument/2006/math" xmlns:a14="http://schemas.microsoft.com/office/drawing/2010/main" xmlns:ma14="http://schemas.microsoft.com/office/mac/drawingml/2011/main" val="1"/>
+              <ma14:wrappingTextBoxFlag xmlns:ma14="http://schemas.microsoft.com/office/mac/drawingml/2011/main" xmlns:a14="http://schemas.microsoft.com/office/drawing/2010/main" xmlns:m="http://schemas.openxmlformats.org/officeDocument/2006/math" xmlns="" val="1"/>
             </a:ext>
           </a:extLst>
         </p:spPr>
@@ -3706,7 +3706,7 @@
           <a:p>
             <a:r>
               <a:rPr lang="en-US" sz="2400" b="1" dirty="0"/>
-              <a:t>18</a:t>
+              <a:t>11</a:t>
             </a:r>
             <a:endParaRPr dirty="0"/>
           </a:p>
@@ -3731,7 +3731,7 @@
           </a:ln>
           <a:extLst>
             <a:ext uri="{C572A759-6A51-4108-AA02-DFA0A04FC94B}">
-              <ma14:wrappingTextBoxFlag xmlns="" xmlns:m="http://schemas.openxmlformats.org/officeDocument/2006/math" xmlns:a14="http://schemas.microsoft.com/office/drawing/2010/main" xmlns:ma14="http://schemas.microsoft.com/office/mac/drawingml/2011/main" val="1"/>
+              <ma14:wrappingTextBoxFlag xmlns:ma14="http://schemas.microsoft.com/office/mac/drawingml/2011/main" xmlns:a14="http://schemas.microsoft.com/office/drawing/2010/main" xmlns:m="http://schemas.openxmlformats.org/officeDocument/2006/math" xmlns="" val="1"/>
             </a:ext>
           </a:extLst>
         </p:spPr>
@@ -3783,7 +3783,7 @@
           </a:ln>
           <a:extLst>
             <a:ext uri="{C572A759-6A51-4108-AA02-DFA0A04FC94B}">
-              <ma14:wrappingTextBoxFlag xmlns="" xmlns:m="http://schemas.openxmlformats.org/officeDocument/2006/math" xmlns:a14="http://schemas.microsoft.com/office/drawing/2010/main" xmlns:ma14="http://schemas.microsoft.com/office/mac/drawingml/2011/main" val="1"/>
+              <ma14:wrappingTextBoxFlag xmlns:ma14="http://schemas.microsoft.com/office/mac/drawingml/2011/main" xmlns:a14="http://schemas.microsoft.com/office/drawing/2010/main" xmlns:m="http://schemas.openxmlformats.org/officeDocument/2006/math" xmlns="" val="1"/>
             </a:ext>
           </a:extLst>
         </p:spPr>
@@ -3806,13 +3806,13 @@
           </a:lstStyle>
           <a:p>
             <a:r>
-              <a:rPr lang="en-US" sz="2400" b="1" dirty="0"/>
-              <a:t>2</a:t>
+              <a:rPr lang="en-US" sz="2400" b="1"/>
+              <a:t>3</a:t>
             </a:r>
             <a:r>
-              <a:rPr dirty="0"/>
               <a:t>     </a:t>
             </a:r>
+            <a:endParaRPr dirty="0"/>
           </a:p>
         </p:txBody>
       </p:sp>
@@ -3835,7 +3835,7 @@
           </a:ln>
           <a:extLst>
             <a:ext uri="{C572A759-6A51-4108-AA02-DFA0A04FC94B}">
-              <ma14:wrappingTextBoxFlag xmlns="" xmlns:m="http://schemas.openxmlformats.org/officeDocument/2006/math" xmlns:a14="http://schemas.microsoft.com/office/drawing/2010/main" xmlns:ma14="http://schemas.microsoft.com/office/mac/drawingml/2011/main" val="1"/>
+              <ma14:wrappingTextBoxFlag xmlns:ma14="http://schemas.microsoft.com/office/mac/drawingml/2011/main" xmlns:a14="http://schemas.microsoft.com/office/drawing/2010/main" xmlns:m="http://schemas.openxmlformats.org/officeDocument/2006/math" xmlns="" val="1"/>
             </a:ext>
           </a:extLst>
         </p:spPr>
@@ -4231,7 +4231,7 @@
                 <a:latin typeface="Avenir Next Regular"/>
                 <a:sym typeface="Helvetica"/>
               </a:rPr>
-              <a:t>KIRAN S</a:t>
+              <a:t>SIKANDER BASHA</a:t>
             </a:r>
           </a:p>
         </p:txBody>
@@ -4528,7 +4528,37 @@
                 <a:latin typeface="Avenir Next Regular"/>
                 <a:sym typeface="Helvetica"/>
               </a:rPr>
-              <a:t>Mighty Tigers</a:t>
+              <a:t>Adra </a:t>
+            </a:r>
+            <a:r>
+              <a:rPr kumimoji="0" lang="en-US" sz="2000" b="1" i="0" u="sng" strike="noStrike" cap="none" spc="0" normalizeH="0" baseline="0" dirty="0" err="1">
+                <a:ln>
+                  <a:noFill/>
+                </a:ln>
+                <a:solidFill>
+                  <a:srgbClr val="7EBF00"/>
+                </a:solidFill>
+                <a:effectLst/>
+                <a:uFillTx/>
+                <a:latin typeface="Avenir Next Regular"/>
+                <a:sym typeface="Helvetica"/>
+              </a:rPr>
+              <a:t>Sakka</a:t>
+            </a:r>
+            <a:r>
+              <a:rPr kumimoji="0" lang="en-US" sz="2000" b="1" i="0" u="sng" strike="noStrike" cap="none" spc="0" normalizeH="0" baseline="0" dirty="0">
+                <a:ln>
+                  <a:noFill/>
+                </a:ln>
+                <a:solidFill>
+                  <a:srgbClr val="7EBF00"/>
+                </a:solidFill>
+                <a:effectLst/>
+                <a:uFillTx/>
+                <a:latin typeface="Avenir Next Regular"/>
+                <a:sym typeface="Helvetica"/>
+              </a:rPr>
+              <a:t> </a:t>
             </a:r>
             <a:r>
               <a:rPr kumimoji="0" lang="en-US" sz="2000" b="1" i="0" strike="noStrike" cap="none" spc="0" normalizeH="0" baseline="0" dirty="0">
@@ -4543,7 +4573,7 @@
                 <a:latin typeface="Avenir Next Regular"/>
                 <a:sym typeface="Helvetica"/>
               </a:rPr>
-              <a:t> vs Mustangs</a:t>
+              <a:t>vs Demolishers</a:t>
             </a:r>
           </a:p>
           <a:p>
@@ -4576,7 +4606,7 @@
                 <a:latin typeface="Avenir Next Regular"/>
                 <a:sym typeface="Helvetica"/>
               </a:rPr>
-              <a:t>26-Aug-2023</a:t>
+              <a:t>27-Aug-2023</a:t>
             </a:r>
           </a:p>
         </p:txBody>
@@ -4606,7 +4636,7 @@
           </a:ln>
           <a:extLst>
             <a:ext uri="{C572A759-6A51-4108-AA02-DFA0A04FC94B}">
-              <ma14:wrappingTextBoxFlag xmlns="" xmlns:m="http://schemas.openxmlformats.org/officeDocument/2006/math" xmlns:a14="http://schemas.microsoft.com/office/drawing/2010/main" xmlns:ma14="http://schemas.microsoft.com/office/mac/drawingml/2011/main" val="1"/>
+              <ma14:wrappingTextBoxFlag xmlns:ma14="http://schemas.microsoft.com/office/mac/drawingml/2011/main" xmlns:a14="http://schemas.microsoft.com/office/drawing/2010/main" xmlns:m="http://schemas.openxmlformats.org/officeDocument/2006/math" xmlns="" val="1"/>
             </a:ext>
           </a:extLst>
         </p:spPr>
@@ -4738,7 +4768,7 @@
           </a:ln>
           <a:extLst>
             <a:ext uri="{C572A759-6A51-4108-AA02-DFA0A04FC94B}">
-              <ma14:wrappingTextBoxFlag xmlns="" xmlns:m="http://schemas.openxmlformats.org/officeDocument/2006/math" xmlns:a14="http://schemas.microsoft.com/office/drawing/2010/main" xmlns:ma14="http://schemas.microsoft.com/office/mac/drawingml/2011/main" val="1"/>
+              <ma14:wrappingTextBoxFlag xmlns:ma14="http://schemas.microsoft.com/office/mac/drawingml/2011/main" xmlns:a14="http://schemas.microsoft.com/office/drawing/2010/main" xmlns:m="http://schemas.openxmlformats.org/officeDocument/2006/math" xmlns="" val="1"/>
             </a:ext>
           </a:extLst>
         </p:spPr>
@@ -4847,10 +4877,10 @@
       </p:sp>
       <p:pic>
         <p:nvPicPr>
-          <p:cNvPr id="10" name="Picture 9">
+          <p:cNvPr id="4" name="Picture 3">
             <a:extLst>
               <a:ext uri="{FF2B5EF4-FFF2-40B4-BE49-F238E27FC236}">
-                <a16:creationId xmlns:a16="http://schemas.microsoft.com/office/drawing/2014/main" id="{0427CC2B-6140-D42C-B27E-378EDC8EFDE7}"/>
+                <a16:creationId xmlns:a16="http://schemas.microsoft.com/office/drawing/2014/main" id="{3B05318F-2C15-4BC4-0AC0-A5A5FFAE8782}"/>
               </a:ext>
             </a:extLst>
           </p:cNvPr>
@@ -4860,20 +4890,20 @@
           <p:nvPr/>
         </p:nvPicPr>
         <p:blipFill rotWithShape="1">
-          <a:blip r:embed="rId12" cstate="print">
+          <a:blip r:embed="rId12">
             <a:extLst>
               <a:ext uri="{28A0092B-C50C-407E-A947-70E740481C1C}">
                 <a14:useLocalDpi xmlns:a14="http://schemas.microsoft.com/office/drawing/2010/main" val="0"/>
               </a:ext>
             </a:extLst>
           </a:blip>
-          <a:srcRect t="13442" b="35061"/>
+          <a:srcRect l="-84" t="-80" r="16882" b="37288"/>
           <a:stretch/>
         </p:blipFill>
         <p:spPr>
           <a:xfrm>
-            <a:off x="4835212" y="1902648"/>
-            <a:ext cx="2560974" cy="2565899"/>
+            <a:off x="4815013" y="1879461"/>
+            <a:ext cx="2574435" cy="2600367"/>
           </a:xfrm>
           <a:prstGeom prst="flowChartConnector">
             <a:avLst/>

</xml_diff>